<commit_message>
Updating Slides 4, 5, moving slides 6 to 7, adding a new slides 6
</commit_message>
<xml_diff>
--- a/Slides/Slides-04-Elements_of_Validation/Slides-04-Elements_of_Validation.pptx
+++ b/Slides/Slides-04-Elements_of_Validation/Slides-04-Elements_of_Validation.pptx
@@ -5,7 +5,7 @@
     <p:sldMasterId id="2147483673" r:id="rId4"/>
   </p:sldMasterIdLst>
   <p:notesMasterIdLst>
-    <p:notesMasterId r:id="rId30"/>
+    <p:notesMasterId r:id="rId17"/>
   </p:notesMasterIdLst>
   <p:sldIdLst>
     <p:sldId id="257" r:id="rId5"/>
@@ -17,22 +17,9 @@
     <p:sldId id="398" r:id="rId11"/>
     <p:sldId id="384" r:id="rId12"/>
     <p:sldId id="386" r:id="rId13"/>
-    <p:sldId id="388" r:id="rId14"/>
-    <p:sldId id="389" r:id="rId15"/>
-    <p:sldId id="390" r:id="rId16"/>
-    <p:sldId id="391" r:id="rId17"/>
-    <p:sldId id="392" r:id="rId18"/>
-    <p:sldId id="399" r:id="rId19"/>
-    <p:sldId id="263" r:id="rId20"/>
-    <p:sldId id="368" r:id="rId21"/>
-    <p:sldId id="395" r:id="rId22"/>
-    <p:sldId id="382" r:id="rId23"/>
-    <p:sldId id="397" r:id="rId24"/>
-    <p:sldId id="381" r:id="rId25"/>
-    <p:sldId id="400" r:id="rId26"/>
-    <p:sldId id="402" r:id="rId27"/>
-    <p:sldId id="401" r:id="rId28"/>
-    <p:sldId id="403" r:id="rId29"/>
+    <p:sldId id="392" r:id="rId14"/>
+    <p:sldId id="405" r:id="rId15"/>
+    <p:sldId id="399" r:id="rId16"/>
   </p:sldIdLst>
   <p:sldSz cx="12192000" cy="6858000"/>
   <p:notesSz cx="6858000" cy="9144000"/>
@@ -133,7 +120,7 @@
   </p:defaultTextStyle>
   <p:extLst>
     <p:ext uri="{EFAFB233-063F-42B5-8137-9DF3F51BA10A}">
-      <p15:sldGuideLst xmlns="" xmlns:p15="http://schemas.microsoft.com/office/powerpoint/2012/main"/>
+      <p15:sldGuideLst xmlns:p15="http://schemas.microsoft.com/office/powerpoint/2012/main" xmlns=""/>
     </p:ext>
   </p:extLst>
 </p:presentation>
@@ -229,7 +216,7 @@
           <a:p>
             <a:fld id="{AE1375EF-7AC2-40F0-8984-3657FAAC21B8}" type="datetimeFigureOut">
               <a:rPr lang="en-US" smtClean="0"/>
-              <a:t>9/12/2021</a:t>
+              <a:t>10/14/2021</a:t>
             </a:fld>
             <a:endParaRPr lang="en-US"/>
           </a:p>
@@ -641,65 +628,7 @@
               <a:tabLst/>
               <a:defRPr/>
             </a:pPr>
-            <a:r>
-              <a:rPr lang="en-US" dirty="0"/>
-              <a:t>What is necessary to author test cases?</a:t>
-            </a:r>
-          </a:p>
-          <a:p>
-            <a:pPr marL="0" marR="0" lvl="0" indent="0" algn="l" defTabSz="914400" rtl="0" eaLnBrk="1" fontAlgn="auto" latinLnBrk="0" hangingPunct="1">
-              <a:lnSpc>
-                <a:spcPct val="100000"/>
-              </a:lnSpc>
-              <a:spcBef>
-                <a:spcPts val="0"/>
-              </a:spcBef>
-              <a:spcAft>
-                <a:spcPts val="0"/>
-              </a:spcAft>
-              <a:buClrTx/>
-              <a:buSzTx/>
-              <a:buFontTx/>
-              <a:buNone/>
-              <a:tabLst/>
-              <a:defRPr/>
-            </a:pPr>
             <a:endParaRPr lang="en-US" dirty="0"/>
-          </a:p>
-          <a:p>
-            <a:pPr marL="0" marR="0" lvl="0" indent="0" algn="l" defTabSz="914400" rtl="0" eaLnBrk="1" fontAlgn="auto" latinLnBrk="0" hangingPunct="1">
-              <a:lnSpc>
-                <a:spcPct val="100000"/>
-              </a:lnSpc>
-              <a:spcBef>
-                <a:spcPts val="0"/>
-              </a:spcBef>
-              <a:spcAft>
-                <a:spcPts val="0"/>
-              </a:spcAft>
-              <a:buClrTx/>
-              <a:buSzTx/>
-              <a:buFontTx/>
-              <a:buNone/>
-              <a:tabLst/>
-              <a:defRPr/>
-            </a:pPr>
-            <a:r>
-              <a:rPr lang="en-US" dirty="0" err="1"/>
-              <a:t>valtools</a:t>
-            </a:r>
-            <a:r>
-              <a:rPr lang="en-US" dirty="0"/>
-              <a:t>::</a:t>
-            </a:r>
-            <a:r>
-              <a:rPr lang="en-US" dirty="0" err="1"/>
-              <a:t>vt_use_test_cases</a:t>
-            </a:r>
-            <a:r>
-              <a:rPr lang="en-US" dirty="0"/>
-              <a:t> creates a new test case file with prompts for essential elements. The content is written using markdown syntax, with roxygen2 tags for simple meta info.</a:t>
-            </a:r>
           </a:p>
         </p:txBody>
       </p:sp>
@@ -729,7 +658,7 @@
     </p:spTree>
     <p:extLst>
       <p:ext uri="{BB962C8B-B14F-4D97-AF65-F5344CB8AC3E}">
-        <p14:creationId xmlns:p14="http://schemas.microsoft.com/office/powerpoint/2010/main" val="3976014023"/>
+        <p14:creationId xmlns:p14="http://schemas.microsoft.com/office/powerpoint/2010/main" val="3280339938"/>
       </p:ext>
     </p:extLst>
   </p:cSld>
@@ -783,202 +712,7 @@
           <a:bodyPr/>
           <a:lstStyle/>
           <a:p>
-            <a:pPr marL="0" marR="0" lvl="0" indent="0" algn="l" defTabSz="914400" rtl="0" eaLnBrk="1" fontAlgn="auto" latinLnBrk="0" hangingPunct="1">
-              <a:lnSpc>
-                <a:spcPct val="100000"/>
-              </a:lnSpc>
-              <a:spcBef>
-                <a:spcPts val="0"/>
-              </a:spcBef>
-              <a:spcAft>
-                <a:spcPts val="0"/>
-              </a:spcAft>
-              <a:buClrTx/>
-              <a:buSzTx/>
-              <a:buFontTx/>
-              <a:buNone/>
-              <a:tabLst/>
-              <a:defRPr/>
-            </a:pPr>
-            <a:r>
-              <a:rPr lang="en-US" dirty="0"/>
-              <a:t>What is necessary to author test code?</a:t>
-            </a:r>
-          </a:p>
-          <a:p>
-            <a:pPr marL="0" marR="0" lvl="0" indent="0" algn="l" defTabSz="914400" rtl="0" eaLnBrk="1" fontAlgn="auto" latinLnBrk="0" hangingPunct="1">
-              <a:lnSpc>
-                <a:spcPct val="100000"/>
-              </a:lnSpc>
-              <a:spcBef>
-                <a:spcPts val="0"/>
-              </a:spcBef>
-              <a:spcAft>
-                <a:spcPts val="0"/>
-              </a:spcAft>
-              <a:buClrTx/>
-              <a:buSzTx/>
-              <a:buFontTx/>
-              <a:buNone/>
-              <a:tabLst/>
-              <a:defRPr/>
-            </a:pPr>
             <a:endParaRPr lang="en-US" dirty="0"/>
-          </a:p>
-          <a:p>
-            <a:pPr marL="0" marR="0" lvl="0" indent="0" algn="l" defTabSz="914400" rtl="0" eaLnBrk="1" fontAlgn="auto" latinLnBrk="0" hangingPunct="1">
-              <a:lnSpc>
-                <a:spcPct val="100000"/>
-              </a:lnSpc>
-              <a:spcBef>
-                <a:spcPts val="0"/>
-              </a:spcBef>
-              <a:spcAft>
-                <a:spcPts val="0"/>
-              </a:spcAft>
-              <a:buClrTx/>
-              <a:buSzTx/>
-              <a:buFontTx/>
-              <a:buNone/>
-              <a:tabLst/>
-              <a:defRPr/>
-            </a:pPr>
-            <a:r>
-              <a:rPr lang="en-US" dirty="0" err="1"/>
-              <a:t>valtools</a:t>
-            </a:r>
-            <a:r>
-              <a:rPr lang="en-US" dirty="0"/>
-              <a:t>::</a:t>
-            </a:r>
-            <a:r>
-              <a:rPr lang="en-US" dirty="0" err="1"/>
-              <a:t>vt_use_test_code</a:t>
-            </a:r>
-            <a:r>
-              <a:rPr lang="en-US" dirty="0"/>
-              <a:t> creates a new test code file with prompts for essential elements. The content is written using </a:t>
-            </a:r>
-            <a:r>
-              <a:rPr lang="en-US" dirty="0" err="1"/>
-              <a:t>testthat</a:t>
-            </a:r>
-            <a:r>
-              <a:rPr lang="en-US" dirty="0"/>
-              <a:t> syntax, with roxygen2 tags for simple meta info.</a:t>
-            </a:r>
-          </a:p>
-        </p:txBody>
-      </p:sp>
-      <p:sp>
-        <p:nvSpPr>
-          <p:cNvPr id="4" name="Slide Number Placeholder 3"/>
-          <p:cNvSpPr>
-            <a:spLocks noGrp="1"/>
-          </p:cNvSpPr>
-          <p:nvPr>
-            <p:ph type="sldNum" sz="quarter" idx="5"/>
-          </p:nvPr>
-        </p:nvSpPr>
-        <p:spPr/>
-        <p:txBody>
-          <a:bodyPr/>
-          <a:lstStyle/>
-          <a:p>
-            <a:fld id="{B9F26414-4BE6-427A-9F34-1430B41B92D6}" type="slidenum">
-              <a:rPr lang="en-US" smtClean="0"/>
-              <a:t>11</a:t>
-            </a:fld>
-            <a:endParaRPr lang="en-US"/>
-          </a:p>
-        </p:txBody>
-      </p:sp>
-    </p:spTree>
-    <p:extLst>
-      <p:ext uri="{BB962C8B-B14F-4D97-AF65-F5344CB8AC3E}">
-        <p14:creationId xmlns:p14="http://schemas.microsoft.com/office/powerpoint/2010/main" val="2245478203"/>
-      </p:ext>
-    </p:extLst>
-  </p:cSld>
-  <p:clrMapOvr>
-    <a:masterClrMapping/>
-  </p:clrMapOvr>
-</p:notes>
-</file>
-
-<file path=ppt/notesSlides/notesSlide12.xml><?xml version="1.0" encoding="utf-8"?>
-<p:notes xmlns:a="http://schemas.openxmlformats.org/drawingml/2006/main" xmlns:r="http://schemas.openxmlformats.org/officeDocument/2006/relationships" xmlns:p="http://schemas.openxmlformats.org/presentationml/2006/main">
-  <p:cSld>
-    <p:spTree>
-      <p:nvGrpSpPr>
-        <p:cNvPr id="1" name=""/>
-        <p:cNvGrpSpPr/>
-        <p:nvPr/>
-      </p:nvGrpSpPr>
-      <p:grpSpPr>
-        <a:xfrm>
-          <a:off x="0" y="0"/>
-          <a:ext cx="0" cy="0"/>
-          <a:chOff x="0" y="0"/>
-          <a:chExt cx="0" cy="0"/>
-        </a:xfrm>
-      </p:grpSpPr>
-      <p:sp>
-        <p:nvSpPr>
-          <p:cNvPr id="2" name="Slide Image Placeholder 1"/>
-          <p:cNvSpPr>
-            <a:spLocks noGrp="1" noRot="1" noChangeAspect="1"/>
-          </p:cNvSpPr>
-          <p:nvPr>
-            <p:ph type="sldImg"/>
-          </p:nvPr>
-        </p:nvSpPr>
-        <p:spPr/>
-      </p:sp>
-      <p:sp>
-        <p:nvSpPr>
-          <p:cNvPr id="3" name="Notes Placeholder 2"/>
-          <p:cNvSpPr>
-            <a:spLocks noGrp="1"/>
-          </p:cNvSpPr>
-          <p:nvPr>
-            <p:ph type="body" idx="1"/>
-          </p:nvPr>
-        </p:nvSpPr>
-        <p:spPr/>
-        <p:txBody>
-          <a:bodyPr/>
-          <a:lstStyle/>
-          <a:p>
-            <a:pPr marL="0" marR="0" lvl="0" indent="0" algn="l" defTabSz="914400" rtl="0" eaLnBrk="1" fontAlgn="auto" latinLnBrk="0" hangingPunct="1">
-              <a:lnSpc>
-                <a:spcPct val="100000"/>
-              </a:lnSpc>
-              <a:spcBef>
-                <a:spcPts val="0"/>
-              </a:spcBef>
-              <a:spcAft>
-                <a:spcPts val="0"/>
-              </a:spcAft>
-              <a:buClrTx/>
-              <a:buSzTx/>
-              <a:buFontTx/>
-              <a:buNone/>
-              <a:tabLst/>
-              <a:defRPr/>
-            </a:pPr>
-            <a:r>
-              <a:rPr lang="en-US" dirty="0"/>
-              <a:t>{</a:t>
-            </a:r>
-            <a:r>
-              <a:rPr lang="en-US" dirty="0" err="1"/>
-              <a:t>valtools</a:t>
-            </a:r>
-            <a:r>
-              <a:rPr lang="en-US" dirty="0"/>
-              <a:t>} defines users as the group of individuals that need to sign off on the report. </a:t>
-            </a:r>
           </a:p>
         </p:txBody>
       </p:sp>
@@ -1008,800 +742,7 @@
     </p:spTree>
     <p:extLst>
       <p:ext uri="{BB962C8B-B14F-4D97-AF65-F5344CB8AC3E}">
-        <p14:creationId xmlns:p14="http://schemas.microsoft.com/office/powerpoint/2010/main" val="1311026117"/>
-      </p:ext>
-    </p:extLst>
-  </p:cSld>
-  <p:clrMapOvr>
-    <a:masterClrMapping/>
-  </p:clrMapOvr>
-</p:notes>
-</file>
-
-<file path=ppt/notesSlides/notesSlide13.xml><?xml version="1.0" encoding="utf-8"?>
-<p:notes xmlns:a="http://schemas.openxmlformats.org/drawingml/2006/main" xmlns:r="http://schemas.openxmlformats.org/officeDocument/2006/relationships" xmlns:p="http://schemas.openxmlformats.org/presentationml/2006/main">
-  <p:cSld>
-    <p:spTree>
-      <p:nvGrpSpPr>
-        <p:cNvPr id="1" name=""/>
-        <p:cNvGrpSpPr/>
-        <p:nvPr/>
-      </p:nvGrpSpPr>
-      <p:grpSpPr>
-        <a:xfrm>
-          <a:off x="0" y="0"/>
-          <a:ext cx="0" cy="0"/>
-          <a:chOff x="0" y="0"/>
-          <a:chExt cx="0" cy="0"/>
-        </a:xfrm>
-      </p:grpSpPr>
-      <p:sp>
-        <p:nvSpPr>
-          <p:cNvPr id="2" name="Slide Image Placeholder 1"/>
-          <p:cNvSpPr>
-            <a:spLocks noGrp="1" noRot="1" noChangeAspect="1"/>
-          </p:cNvSpPr>
-          <p:nvPr>
-            <p:ph type="sldImg"/>
-          </p:nvPr>
-        </p:nvSpPr>
-        <p:spPr/>
-      </p:sp>
-      <p:sp>
-        <p:nvSpPr>
-          <p:cNvPr id="3" name="Notes Placeholder 2"/>
-          <p:cNvSpPr>
-            <a:spLocks noGrp="1"/>
-          </p:cNvSpPr>
-          <p:nvPr>
-            <p:ph type="body" idx="1"/>
-          </p:nvPr>
-        </p:nvSpPr>
-        <p:spPr/>
-        <p:txBody>
-          <a:bodyPr/>
-          <a:lstStyle/>
-          <a:p>
-            <a:pPr marL="0" marR="0" lvl="0" indent="0" algn="l" defTabSz="914400" rtl="0" eaLnBrk="1" fontAlgn="auto" latinLnBrk="0" hangingPunct="1">
-              <a:lnSpc>
-                <a:spcPct val="100000"/>
-              </a:lnSpc>
-              <a:spcBef>
-                <a:spcPts val="0"/>
-              </a:spcBef>
-              <a:spcAft>
-                <a:spcPts val="0"/>
-              </a:spcAft>
-              <a:buClrTx/>
-              <a:buSzTx/>
-              <a:buFontTx/>
-              <a:buNone/>
-              <a:tabLst/>
-              <a:defRPr/>
-            </a:pPr>
-            <a:endParaRPr lang="en-US" dirty="0"/>
-          </a:p>
-        </p:txBody>
-      </p:sp>
-      <p:sp>
-        <p:nvSpPr>
-          <p:cNvPr id="4" name="Slide Number Placeholder 3"/>
-          <p:cNvSpPr>
-            <a:spLocks noGrp="1"/>
-          </p:cNvSpPr>
-          <p:nvPr>
-            <p:ph type="sldNum" sz="quarter" idx="5"/>
-          </p:nvPr>
-        </p:nvSpPr>
-        <p:spPr/>
-        <p:txBody>
-          <a:bodyPr/>
-          <a:lstStyle/>
-          <a:p>
-            <a:fld id="{B9F26414-4BE6-427A-9F34-1430B41B92D6}" type="slidenum">
-              <a:rPr lang="en-US" smtClean="0"/>
-              <a:t>13</a:t>
-            </a:fld>
-            <a:endParaRPr lang="en-US"/>
-          </a:p>
-        </p:txBody>
-      </p:sp>
-    </p:spTree>
-    <p:extLst>
-      <p:ext uri="{BB962C8B-B14F-4D97-AF65-F5344CB8AC3E}">
-        <p14:creationId xmlns:p14="http://schemas.microsoft.com/office/powerpoint/2010/main" val="1653769225"/>
-      </p:ext>
-    </p:extLst>
-  </p:cSld>
-  <p:clrMapOvr>
-    <a:masterClrMapping/>
-  </p:clrMapOvr>
-</p:notes>
-</file>
-
-<file path=ppt/notesSlides/notesSlide14.xml><?xml version="1.0" encoding="utf-8"?>
-<p:notes xmlns:a="http://schemas.openxmlformats.org/drawingml/2006/main" xmlns:r="http://schemas.openxmlformats.org/officeDocument/2006/relationships" xmlns:p="http://schemas.openxmlformats.org/presentationml/2006/main">
-  <p:cSld>
-    <p:spTree>
-      <p:nvGrpSpPr>
-        <p:cNvPr id="1" name=""/>
-        <p:cNvGrpSpPr/>
-        <p:nvPr/>
-      </p:nvGrpSpPr>
-      <p:grpSpPr>
-        <a:xfrm>
-          <a:off x="0" y="0"/>
-          <a:ext cx="0" cy="0"/>
-          <a:chOff x="0" y="0"/>
-          <a:chExt cx="0" cy="0"/>
-        </a:xfrm>
-      </p:grpSpPr>
-      <p:sp>
-        <p:nvSpPr>
-          <p:cNvPr id="2" name="Slide Image Placeholder 1"/>
-          <p:cNvSpPr>
-            <a:spLocks noGrp="1" noRot="1" noChangeAspect="1"/>
-          </p:cNvSpPr>
-          <p:nvPr>
-            <p:ph type="sldImg"/>
-          </p:nvPr>
-        </p:nvSpPr>
-        <p:spPr/>
-      </p:sp>
-      <p:sp>
-        <p:nvSpPr>
-          <p:cNvPr id="3" name="Notes Placeholder 2"/>
-          <p:cNvSpPr>
-            <a:spLocks noGrp="1"/>
-          </p:cNvSpPr>
-          <p:nvPr>
-            <p:ph type="body" idx="1"/>
-          </p:nvPr>
-        </p:nvSpPr>
-        <p:spPr/>
-        <p:txBody>
-          <a:bodyPr/>
-          <a:lstStyle/>
-          <a:p>
-            <a:pPr marL="0" marR="0" lvl="0" indent="0" algn="l" defTabSz="914400" rtl="0" eaLnBrk="1" fontAlgn="auto" latinLnBrk="0" hangingPunct="1">
-              <a:lnSpc>
-                <a:spcPct val="100000"/>
-              </a:lnSpc>
-              <a:spcBef>
-                <a:spcPts val="0"/>
-              </a:spcBef>
-              <a:spcAft>
-                <a:spcPts val="0"/>
-              </a:spcAft>
-              <a:buClrTx/>
-              <a:buSzTx/>
-              <a:buFontTx/>
-              <a:buNone/>
-              <a:tabLst/>
-              <a:defRPr/>
-            </a:pPr>
-            <a:endParaRPr lang="en-US" dirty="0"/>
-          </a:p>
-        </p:txBody>
-      </p:sp>
-      <p:sp>
-        <p:nvSpPr>
-          <p:cNvPr id="4" name="Slide Number Placeholder 3"/>
-          <p:cNvSpPr>
-            <a:spLocks noGrp="1"/>
-          </p:cNvSpPr>
-          <p:nvPr>
-            <p:ph type="sldNum" sz="quarter" idx="5"/>
-          </p:nvPr>
-        </p:nvSpPr>
-        <p:spPr/>
-        <p:txBody>
-          <a:bodyPr/>
-          <a:lstStyle/>
-          <a:p>
-            <a:fld id="{B9F26414-4BE6-427A-9F34-1430B41B92D6}" type="slidenum">
-              <a:rPr lang="en-US" smtClean="0"/>
-              <a:t>14</a:t>
-            </a:fld>
-            <a:endParaRPr lang="en-US"/>
-          </a:p>
-        </p:txBody>
-      </p:sp>
-    </p:spTree>
-    <p:extLst>
-      <p:ext uri="{BB962C8B-B14F-4D97-AF65-F5344CB8AC3E}">
-        <p14:creationId xmlns:p14="http://schemas.microsoft.com/office/powerpoint/2010/main" val="3280339938"/>
-      </p:ext>
-    </p:extLst>
-  </p:cSld>
-  <p:clrMapOvr>
-    <a:masterClrMapping/>
-  </p:clrMapOvr>
-</p:notes>
-</file>
-
-<file path=ppt/notesSlides/notesSlide15.xml><?xml version="1.0" encoding="utf-8"?>
-<p:notes xmlns:a="http://schemas.openxmlformats.org/drawingml/2006/main" xmlns:r="http://schemas.openxmlformats.org/officeDocument/2006/relationships" xmlns:p="http://schemas.openxmlformats.org/presentationml/2006/main">
-  <p:cSld>
-    <p:spTree>
-      <p:nvGrpSpPr>
-        <p:cNvPr id="1" name=""/>
-        <p:cNvGrpSpPr/>
-        <p:nvPr/>
-      </p:nvGrpSpPr>
-      <p:grpSpPr>
-        <a:xfrm>
-          <a:off x="0" y="0"/>
-          <a:ext cx="0" cy="0"/>
-          <a:chOff x="0" y="0"/>
-          <a:chExt cx="0" cy="0"/>
-        </a:xfrm>
-      </p:grpSpPr>
-      <p:sp>
-        <p:nvSpPr>
-          <p:cNvPr id="2" name="Slide Image Placeholder 1"/>
-          <p:cNvSpPr>
-            <a:spLocks noGrp="1" noRot="1" noChangeAspect="1"/>
-          </p:cNvSpPr>
-          <p:nvPr>
-            <p:ph type="sldImg"/>
-          </p:nvPr>
-        </p:nvSpPr>
-        <p:spPr/>
-      </p:sp>
-      <p:sp>
-        <p:nvSpPr>
-          <p:cNvPr id="3" name="Notes Placeholder 2"/>
-          <p:cNvSpPr>
-            <a:spLocks noGrp="1"/>
-          </p:cNvSpPr>
-          <p:nvPr>
-            <p:ph type="body" idx="1"/>
-          </p:nvPr>
-        </p:nvSpPr>
-        <p:spPr/>
-        <p:txBody>
-          <a:bodyPr/>
-          <a:lstStyle/>
-          <a:p>
-            <a:endParaRPr lang="en-US" dirty="0"/>
-          </a:p>
-        </p:txBody>
-      </p:sp>
-      <p:sp>
-        <p:nvSpPr>
-          <p:cNvPr id="4" name="Slide Number Placeholder 3"/>
-          <p:cNvSpPr>
-            <a:spLocks noGrp="1"/>
-          </p:cNvSpPr>
-          <p:nvPr>
-            <p:ph type="sldNum" sz="quarter" idx="5"/>
-          </p:nvPr>
-        </p:nvSpPr>
-        <p:spPr/>
-        <p:txBody>
-          <a:bodyPr/>
-          <a:lstStyle/>
-          <a:p>
-            <a:fld id="{B9F26414-4BE6-427A-9F34-1430B41B92D6}" type="slidenum">
-              <a:rPr lang="en-US" smtClean="0"/>
-              <a:t>15</a:t>
-            </a:fld>
-            <a:endParaRPr lang="en-US"/>
-          </a:p>
-        </p:txBody>
-      </p:sp>
-    </p:spTree>
-    <p:extLst>
-      <p:ext uri="{BB962C8B-B14F-4D97-AF65-F5344CB8AC3E}">
         <p14:creationId xmlns:p14="http://schemas.microsoft.com/office/powerpoint/2010/main" val="990998011"/>
-      </p:ext>
-    </p:extLst>
-  </p:cSld>
-  <p:clrMapOvr>
-    <a:masterClrMapping/>
-  </p:clrMapOvr>
-</p:notes>
-</file>
-
-<file path=ppt/notesSlides/notesSlide16.xml><?xml version="1.0" encoding="utf-8"?>
-<p:notes xmlns:a="http://schemas.openxmlformats.org/drawingml/2006/main" xmlns:r="http://schemas.openxmlformats.org/officeDocument/2006/relationships" xmlns:p="http://schemas.openxmlformats.org/presentationml/2006/main">
-  <p:cSld>
-    <p:spTree>
-      <p:nvGrpSpPr>
-        <p:cNvPr id="1" name=""/>
-        <p:cNvGrpSpPr/>
-        <p:nvPr/>
-      </p:nvGrpSpPr>
-      <p:grpSpPr>
-        <a:xfrm>
-          <a:off x="0" y="0"/>
-          <a:ext cx="0" cy="0"/>
-          <a:chOff x="0" y="0"/>
-          <a:chExt cx="0" cy="0"/>
-        </a:xfrm>
-      </p:grpSpPr>
-      <p:sp>
-        <p:nvSpPr>
-          <p:cNvPr id="2" name="Slide Image Placeholder 1"/>
-          <p:cNvSpPr>
-            <a:spLocks noGrp="1" noRot="1" noChangeAspect="1"/>
-          </p:cNvSpPr>
-          <p:nvPr>
-            <p:ph type="sldImg"/>
-          </p:nvPr>
-        </p:nvSpPr>
-        <p:spPr/>
-      </p:sp>
-      <p:sp>
-        <p:nvSpPr>
-          <p:cNvPr id="3" name="Notes Placeholder 2"/>
-          <p:cNvSpPr>
-            <a:spLocks noGrp="1"/>
-          </p:cNvSpPr>
-          <p:nvPr>
-            <p:ph type="body" idx="1"/>
-          </p:nvPr>
-        </p:nvSpPr>
-        <p:spPr/>
-        <p:txBody>
-          <a:bodyPr/>
-          <a:lstStyle/>
-          <a:p>
-            <a:pPr marL="0" marR="0" lvl="0" indent="0" algn="l" defTabSz="914400" rtl="0" eaLnBrk="1" fontAlgn="auto" latinLnBrk="0" hangingPunct="1">
-              <a:lnSpc>
-                <a:spcPct val="100000"/>
-              </a:lnSpc>
-              <a:spcBef>
-                <a:spcPts val="0"/>
-              </a:spcBef>
-              <a:spcAft>
-                <a:spcPts val="0"/>
-              </a:spcAft>
-              <a:buClrTx/>
-              <a:buSzTx/>
-              <a:buFontTx/>
-              <a:buNone/>
-              <a:tabLst/>
-              <a:defRPr/>
-            </a:pPr>
-            <a:endParaRPr lang="en-US" dirty="0"/>
-          </a:p>
-        </p:txBody>
-      </p:sp>
-      <p:sp>
-        <p:nvSpPr>
-          <p:cNvPr id="4" name="Slide Number Placeholder 3"/>
-          <p:cNvSpPr>
-            <a:spLocks noGrp="1"/>
-          </p:cNvSpPr>
-          <p:nvPr>
-            <p:ph type="sldNum" sz="quarter" idx="5"/>
-          </p:nvPr>
-        </p:nvSpPr>
-        <p:spPr/>
-        <p:txBody>
-          <a:bodyPr/>
-          <a:lstStyle/>
-          <a:p>
-            <a:fld id="{B9F26414-4BE6-427A-9F34-1430B41B92D6}" type="slidenum">
-              <a:rPr lang="en-US" smtClean="0"/>
-              <a:t>17</a:t>
-            </a:fld>
-            <a:endParaRPr lang="en-US"/>
-          </a:p>
-        </p:txBody>
-      </p:sp>
-    </p:spTree>
-    <p:extLst>
-      <p:ext uri="{BB962C8B-B14F-4D97-AF65-F5344CB8AC3E}">
-        <p14:creationId xmlns:p14="http://schemas.microsoft.com/office/powerpoint/2010/main" val="448676613"/>
-      </p:ext>
-    </p:extLst>
-  </p:cSld>
-  <p:clrMapOvr>
-    <a:masterClrMapping/>
-  </p:clrMapOvr>
-</p:notes>
-</file>
-
-<file path=ppt/notesSlides/notesSlide17.xml><?xml version="1.0" encoding="utf-8"?>
-<p:notes xmlns:a="http://schemas.openxmlformats.org/drawingml/2006/main" xmlns:r="http://schemas.openxmlformats.org/officeDocument/2006/relationships" xmlns:p="http://schemas.openxmlformats.org/presentationml/2006/main">
-  <p:cSld>
-    <p:spTree>
-      <p:nvGrpSpPr>
-        <p:cNvPr id="1" name=""/>
-        <p:cNvGrpSpPr/>
-        <p:nvPr/>
-      </p:nvGrpSpPr>
-      <p:grpSpPr>
-        <a:xfrm>
-          <a:off x="0" y="0"/>
-          <a:ext cx="0" cy="0"/>
-          <a:chOff x="0" y="0"/>
-          <a:chExt cx="0" cy="0"/>
-        </a:xfrm>
-      </p:grpSpPr>
-      <p:sp>
-        <p:nvSpPr>
-          <p:cNvPr id="2" name="Slide Image Placeholder 1"/>
-          <p:cNvSpPr>
-            <a:spLocks noGrp="1" noRot="1" noChangeAspect="1"/>
-          </p:cNvSpPr>
-          <p:nvPr>
-            <p:ph type="sldImg"/>
-          </p:nvPr>
-        </p:nvSpPr>
-        <p:spPr/>
-      </p:sp>
-      <p:sp>
-        <p:nvSpPr>
-          <p:cNvPr id="3" name="Notes Placeholder 2"/>
-          <p:cNvSpPr>
-            <a:spLocks noGrp="1"/>
-          </p:cNvSpPr>
-          <p:nvPr>
-            <p:ph type="body" idx="1"/>
-          </p:nvPr>
-        </p:nvSpPr>
-        <p:spPr/>
-        <p:txBody>
-          <a:bodyPr/>
-          <a:lstStyle/>
-          <a:p>
-            <a:pPr marL="0" marR="0" lvl="0" indent="0" algn="l" defTabSz="914400" rtl="0" eaLnBrk="1" fontAlgn="auto" latinLnBrk="0" hangingPunct="1">
-              <a:lnSpc>
-                <a:spcPct val="100000"/>
-              </a:lnSpc>
-              <a:spcBef>
-                <a:spcPts val="0"/>
-              </a:spcBef>
-              <a:spcAft>
-                <a:spcPts val="0"/>
-              </a:spcAft>
-              <a:buClrTx/>
-              <a:buSzTx/>
-              <a:buFontTx/>
-              <a:buNone/>
-              <a:tabLst/>
-              <a:defRPr/>
-            </a:pPr>
-            <a:endParaRPr lang="en-US" dirty="0"/>
-          </a:p>
-        </p:txBody>
-      </p:sp>
-      <p:sp>
-        <p:nvSpPr>
-          <p:cNvPr id="4" name="Slide Number Placeholder 3"/>
-          <p:cNvSpPr>
-            <a:spLocks noGrp="1"/>
-          </p:cNvSpPr>
-          <p:nvPr>
-            <p:ph type="sldNum" sz="quarter" idx="5"/>
-          </p:nvPr>
-        </p:nvSpPr>
-        <p:spPr/>
-        <p:txBody>
-          <a:bodyPr/>
-          <a:lstStyle/>
-          <a:p>
-            <a:fld id="{B9F26414-4BE6-427A-9F34-1430B41B92D6}" type="slidenum">
-              <a:rPr lang="en-US" smtClean="0"/>
-              <a:t>18</a:t>
-            </a:fld>
-            <a:endParaRPr lang="en-US"/>
-          </a:p>
-        </p:txBody>
-      </p:sp>
-    </p:spTree>
-    <p:extLst>
-      <p:ext uri="{BB962C8B-B14F-4D97-AF65-F5344CB8AC3E}">
-        <p14:creationId xmlns:p14="http://schemas.microsoft.com/office/powerpoint/2010/main" val="199079967"/>
-      </p:ext>
-    </p:extLst>
-  </p:cSld>
-  <p:clrMapOvr>
-    <a:masterClrMapping/>
-  </p:clrMapOvr>
-</p:notes>
-</file>
-
-<file path=ppt/notesSlides/notesSlide18.xml><?xml version="1.0" encoding="utf-8"?>
-<p:notes xmlns:a="http://schemas.openxmlformats.org/drawingml/2006/main" xmlns:r="http://schemas.openxmlformats.org/officeDocument/2006/relationships" xmlns:p="http://schemas.openxmlformats.org/presentationml/2006/main">
-  <p:cSld>
-    <p:spTree>
-      <p:nvGrpSpPr>
-        <p:cNvPr id="1" name=""/>
-        <p:cNvGrpSpPr/>
-        <p:nvPr/>
-      </p:nvGrpSpPr>
-      <p:grpSpPr>
-        <a:xfrm>
-          <a:off x="0" y="0"/>
-          <a:ext cx="0" cy="0"/>
-          <a:chOff x="0" y="0"/>
-          <a:chExt cx="0" cy="0"/>
-        </a:xfrm>
-      </p:grpSpPr>
-      <p:sp>
-        <p:nvSpPr>
-          <p:cNvPr id="2" name="Slide Image Placeholder 1"/>
-          <p:cNvSpPr>
-            <a:spLocks noGrp="1" noRot="1" noChangeAspect="1"/>
-          </p:cNvSpPr>
-          <p:nvPr>
-            <p:ph type="sldImg"/>
-          </p:nvPr>
-        </p:nvSpPr>
-        <p:spPr/>
-      </p:sp>
-      <p:sp>
-        <p:nvSpPr>
-          <p:cNvPr id="3" name="Notes Placeholder 2"/>
-          <p:cNvSpPr>
-            <a:spLocks noGrp="1"/>
-          </p:cNvSpPr>
-          <p:nvPr>
-            <p:ph type="body" idx="1"/>
-          </p:nvPr>
-        </p:nvSpPr>
-        <p:spPr/>
-        <p:txBody>
-          <a:bodyPr/>
-          <a:lstStyle/>
-          <a:p>
-            <a:pPr marL="0" marR="0" lvl="0" indent="0" algn="l" defTabSz="914400" rtl="0" eaLnBrk="1" fontAlgn="auto" latinLnBrk="0" hangingPunct="1">
-              <a:lnSpc>
-                <a:spcPct val="100000"/>
-              </a:lnSpc>
-              <a:spcBef>
-                <a:spcPts val="0"/>
-              </a:spcBef>
-              <a:spcAft>
-                <a:spcPts val="0"/>
-              </a:spcAft>
-              <a:buClrTx/>
-              <a:buSzTx/>
-              <a:buFontTx/>
-              <a:buNone/>
-              <a:tabLst/>
-              <a:defRPr/>
-            </a:pPr>
-            <a:r>
-              <a:rPr lang="en-US" dirty="0"/>
-              <a:t>Validation report helpers manage the expectation of repeated rendering in a variety of scenarios:</a:t>
-            </a:r>
-          </a:p>
-          <a:p>
-            <a:pPr marL="171450" marR="0" lvl="0" indent="-171450" algn="l" defTabSz="914400" rtl="0" eaLnBrk="1" fontAlgn="auto" latinLnBrk="0" hangingPunct="1">
-              <a:lnSpc>
-                <a:spcPct val="100000"/>
-              </a:lnSpc>
-              <a:spcBef>
-                <a:spcPts val="0"/>
-              </a:spcBef>
-              <a:spcAft>
-                <a:spcPts val="0"/>
-              </a:spcAft>
-              <a:buClrTx/>
-              <a:buSzTx/>
-              <a:buFontTx/>
-              <a:buChar char="-"/>
-              <a:tabLst/>
-              <a:defRPr/>
-            </a:pPr>
-            <a:r>
-              <a:rPr lang="en-US" dirty="0"/>
-              <a:t>Validation separate from a package e.g. validation of third party authored packages</a:t>
-            </a:r>
-          </a:p>
-          <a:p>
-            <a:pPr marL="171450" marR="0" lvl="0" indent="-171450" algn="l" defTabSz="914400" rtl="0" eaLnBrk="1" fontAlgn="auto" latinLnBrk="0" hangingPunct="1">
-              <a:lnSpc>
-                <a:spcPct val="100000"/>
-              </a:lnSpc>
-              <a:spcBef>
-                <a:spcPts val="0"/>
-              </a:spcBef>
-              <a:spcAft>
-                <a:spcPts val="0"/>
-              </a:spcAft>
-              <a:buClrTx/>
-              <a:buSzTx/>
-              <a:buFontTx/>
-              <a:buChar char="-"/>
-              <a:tabLst/>
-              <a:defRPr/>
-            </a:pPr>
-            <a:r>
-              <a:rPr lang="en-US" dirty="0"/>
-              <a:t>Validation while developing, e.g. as part of </a:t>
-            </a:r>
-            <a:r>
-              <a:rPr lang="en-US" dirty="0" err="1"/>
-              <a:t>c.i</a:t>
-            </a:r>
-            <a:r>
-              <a:rPr lang="en-US" dirty="0"/>
-              <a:t> or for a git repo</a:t>
-            </a:r>
-          </a:p>
-          <a:p>
-            <a:pPr marL="171450" marR="0" lvl="0" indent="-171450" algn="l" defTabSz="914400" rtl="0" eaLnBrk="1" fontAlgn="auto" latinLnBrk="0" hangingPunct="1">
-              <a:lnSpc>
-                <a:spcPct val="100000"/>
-              </a:lnSpc>
-              <a:spcBef>
-                <a:spcPts val="0"/>
-              </a:spcBef>
-              <a:spcAft>
-                <a:spcPts val="0"/>
-              </a:spcAft>
-              <a:buClrTx/>
-              <a:buSzTx/>
-              <a:buFontTx/>
-              <a:buChar char="-"/>
-              <a:tabLst/>
-              <a:defRPr/>
-            </a:pPr>
-            <a:r>
-              <a:rPr lang="en-US" dirty="0"/>
-              <a:t>Validation after install, e.g. if the working environment has been updated</a:t>
-            </a:r>
-          </a:p>
-          <a:p>
-            <a:pPr marL="171450" marR="0" lvl="0" indent="-171450" algn="l" defTabSz="914400" rtl="0" eaLnBrk="1" fontAlgn="auto" latinLnBrk="0" hangingPunct="1">
-              <a:lnSpc>
-                <a:spcPct val="100000"/>
-              </a:lnSpc>
-              <a:spcBef>
-                <a:spcPts val="0"/>
-              </a:spcBef>
-              <a:spcAft>
-                <a:spcPts val="0"/>
-              </a:spcAft>
-              <a:buClrTx/>
-              <a:buSzTx/>
-              <a:buFontTx/>
-              <a:buChar char="-"/>
-              <a:tabLst/>
-              <a:defRPr/>
-            </a:pPr>
-            <a:r>
-              <a:rPr lang="en-US" dirty="0"/>
-              <a:t>Validation as part of distribution, e.g. when bundling for distribution</a:t>
-            </a:r>
-          </a:p>
-        </p:txBody>
-      </p:sp>
-      <p:sp>
-        <p:nvSpPr>
-          <p:cNvPr id="4" name="Slide Number Placeholder 3"/>
-          <p:cNvSpPr>
-            <a:spLocks noGrp="1"/>
-          </p:cNvSpPr>
-          <p:nvPr>
-            <p:ph type="sldNum" sz="quarter" idx="5"/>
-          </p:nvPr>
-        </p:nvSpPr>
-        <p:spPr/>
-        <p:txBody>
-          <a:bodyPr/>
-          <a:lstStyle/>
-          <a:p>
-            <a:fld id="{B9F26414-4BE6-427A-9F34-1430B41B92D6}" type="slidenum">
-              <a:rPr lang="en-US" smtClean="0"/>
-              <a:t>19</a:t>
-            </a:fld>
-            <a:endParaRPr lang="en-US"/>
-          </a:p>
-        </p:txBody>
-      </p:sp>
-    </p:spTree>
-    <p:extLst>
-      <p:ext uri="{BB962C8B-B14F-4D97-AF65-F5344CB8AC3E}">
-        <p14:creationId xmlns:p14="http://schemas.microsoft.com/office/powerpoint/2010/main" val="4085674437"/>
-      </p:ext>
-    </p:extLst>
-  </p:cSld>
-  <p:clrMapOvr>
-    <a:masterClrMapping/>
-  </p:clrMapOvr>
-</p:notes>
-</file>
-
-<file path=ppt/notesSlides/notesSlide19.xml><?xml version="1.0" encoding="utf-8"?>
-<p:notes xmlns:a="http://schemas.openxmlformats.org/drawingml/2006/main" xmlns:r="http://schemas.openxmlformats.org/officeDocument/2006/relationships" xmlns:p="http://schemas.openxmlformats.org/presentationml/2006/main">
-  <p:cSld>
-    <p:spTree>
-      <p:nvGrpSpPr>
-        <p:cNvPr id="1" name=""/>
-        <p:cNvGrpSpPr/>
-        <p:nvPr/>
-      </p:nvGrpSpPr>
-      <p:grpSpPr>
-        <a:xfrm>
-          <a:off x="0" y="0"/>
-          <a:ext cx="0" cy="0"/>
-          <a:chOff x="0" y="0"/>
-          <a:chExt cx="0" cy="0"/>
-        </a:xfrm>
-      </p:grpSpPr>
-      <p:sp>
-        <p:nvSpPr>
-          <p:cNvPr id="2" name="Slide Image Placeholder 1"/>
-          <p:cNvSpPr>
-            <a:spLocks noGrp="1" noRot="1" noChangeAspect="1"/>
-          </p:cNvSpPr>
-          <p:nvPr>
-            <p:ph type="sldImg"/>
-          </p:nvPr>
-        </p:nvSpPr>
-        <p:spPr/>
-      </p:sp>
-      <p:sp>
-        <p:nvSpPr>
-          <p:cNvPr id="3" name="Notes Placeholder 2"/>
-          <p:cNvSpPr>
-            <a:spLocks noGrp="1"/>
-          </p:cNvSpPr>
-          <p:nvPr>
-            <p:ph type="body" idx="1"/>
-          </p:nvPr>
-        </p:nvSpPr>
-        <p:spPr/>
-        <p:txBody>
-          <a:bodyPr/>
-          <a:lstStyle/>
-          <a:p>
-            <a:pPr marL="0" marR="0" lvl="0" indent="0" algn="l" defTabSz="914400" rtl="0" eaLnBrk="1" fontAlgn="auto" latinLnBrk="0" hangingPunct="1">
-              <a:lnSpc>
-                <a:spcPct val="100000"/>
-              </a:lnSpc>
-              <a:spcBef>
-                <a:spcPts val="0"/>
-              </a:spcBef>
-              <a:spcAft>
-                <a:spcPts val="0"/>
-              </a:spcAft>
-              <a:buClrTx/>
-              <a:buSzTx/>
-              <a:buFontTx/>
-              <a:buNone/>
-              <a:tabLst/>
-              <a:defRPr/>
-            </a:pPr>
-            <a:endParaRPr lang="en-US" dirty="0"/>
-          </a:p>
-        </p:txBody>
-      </p:sp>
-      <p:sp>
-        <p:nvSpPr>
-          <p:cNvPr id="4" name="Slide Number Placeholder 3"/>
-          <p:cNvSpPr>
-            <a:spLocks noGrp="1"/>
-          </p:cNvSpPr>
-          <p:nvPr>
-            <p:ph type="sldNum" sz="quarter" idx="5"/>
-          </p:nvPr>
-        </p:nvSpPr>
-        <p:spPr/>
-        <p:txBody>
-          <a:bodyPr/>
-          <a:lstStyle/>
-          <a:p>
-            <a:fld id="{B9F26414-4BE6-427A-9F34-1430B41B92D6}" type="slidenum">
-              <a:rPr lang="en-US" smtClean="0"/>
-              <a:t>20</a:t>
-            </a:fld>
-            <a:endParaRPr lang="en-US"/>
-          </a:p>
-        </p:txBody>
-      </p:sp>
-    </p:spTree>
-    <p:extLst>
-      <p:ext uri="{BB962C8B-B14F-4D97-AF65-F5344CB8AC3E}">
-        <p14:creationId xmlns:p14="http://schemas.microsoft.com/office/powerpoint/2010/main" val="628796750"/>
       </p:ext>
     </p:extLst>
   </p:cSld>
@@ -1903,387 +844,6 @@
     <p:extLst>
       <p:ext uri="{BB962C8B-B14F-4D97-AF65-F5344CB8AC3E}">
         <p14:creationId xmlns:p14="http://schemas.microsoft.com/office/powerpoint/2010/main" val="2161051035"/>
-      </p:ext>
-    </p:extLst>
-  </p:cSld>
-  <p:clrMapOvr>
-    <a:masterClrMapping/>
-  </p:clrMapOvr>
-</p:notes>
-</file>
-
-<file path=ppt/notesSlides/notesSlide20.xml><?xml version="1.0" encoding="utf-8"?>
-<p:notes xmlns:a="http://schemas.openxmlformats.org/drawingml/2006/main" xmlns:r="http://schemas.openxmlformats.org/officeDocument/2006/relationships" xmlns:p="http://schemas.openxmlformats.org/presentationml/2006/main">
-  <p:cSld>
-    <p:spTree>
-      <p:nvGrpSpPr>
-        <p:cNvPr id="1" name=""/>
-        <p:cNvGrpSpPr/>
-        <p:nvPr/>
-      </p:nvGrpSpPr>
-      <p:grpSpPr>
-        <a:xfrm>
-          <a:off x="0" y="0"/>
-          <a:ext cx="0" cy="0"/>
-          <a:chOff x="0" y="0"/>
-          <a:chExt cx="0" cy="0"/>
-        </a:xfrm>
-      </p:grpSpPr>
-      <p:sp>
-        <p:nvSpPr>
-          <p:cNvPr id="2" name="Slide Image Placeholder 1"/>
-          <p:cNvSpPr>
-            <a:spLocks noGrp="1" noRot="1" noChangeAspect="1"/>
-          </p:cNvSpPr>
-          <p:nvPr>
-            <p:ph type="sldImg"/>
-          </p:nvPr>
-        </p:nvSpPr>
-        <p:spPr/>
-      </p:sp>
-      <p:sp>
-        <p:nvSpPr>
-          <p:cNvPr id="3" name="Notes Placeholder 2"/>
-          <p:cNvSpPr>
-            <a:spLocks noGrp="1"/>
-          </p:cNvSpPr>
-          <p:nvPr>
-            <p:ph type="body" idx="1"/>
-          </p:nvPr>
-        </p:nvSpPr>
-        <p:spPr/>
-        <p:txBody>
-          <a:bodyPr/>
-          <a:lstStyle/>
-          <a:p>
-            <a:pPr marL="0" marR="0" lvl="0" indent="0" algn="l" defTabSz="914400" rtl="0" eaLnBrk="1" fontAlgn="auto" latinLnBrk="0" hangingPunct="1">
-              <a:lnSpc>
-                <a:spcPct val="100000"/>
-              </a:lnSpc>
-              <a:spcBef>
-                <a:spcPts val="0"/>
-              </a:spcBef>
-              <a:spcAft>
-                <a:spcPts val="0"/>
-              </a:spcAft>
-              <a:buClrTx/>
-              <a:buSzTx/>
-              <a:buFontTx/>
-              <a:buNone/>
-              <a:tabLst/>
-              <a:defRPr/>
-            </a:pPr>
-            <a:endParaRPr lang="en-US" dirty="0"/>
-          </a:p>
-        </p:txBody>
-      </p:sp>
-      <p:sp>
-        <p:nvSpPr>
-          <p:cNvPr id="4" name="Slide Number Placeholder 3"/>
-          <p:cNvSpPr>
-            <a:spLocks noGrp="1"/>
-          </p:cNvSpPr>
-          <p:nvPr>
-            <p:ph type="sldNum" sz="quarter" idx="5"/>
-          </p:nvPr>
-        </p:nvSpPr>
-        <p:spPr/>
-        <p:txBody>
-          <a:bodyPr/>
-          <a:lstStyle/>
-          <a:p>
-            <a:fld id="{B9F26414-4BE6-427A-9F34-1430B41B92D6}" type="slidenum">
-              <a:rPr lang="en-US" smtClean="0"/>
-              <a:t>21</a:t>
-            </a:fld>
-            <a:endParaRPr lang="en-US"/>
-          </a:p>
-        </p:txBody>
-      </p:sp>
-    </p:spTree>
-    <p:extLst>
-      <p:ext uri="{BB962C8B-B14F-4D97-AF65-F5344CB8AC3E}">
-        <p14:creationId xmlns:p14="http://schemas.microsoft.com/office/powerpoint/2010/main" val="767338882"/>
-      </p:ext>
-    </p:extLst>
-  </p:cSld>
-  <p:clrMapOvr>
-    <a:masterClrMapping/>
-  </p:clrMapOvr>
-</p:notes>
-</file>
-
-<file path=ppt/notesSlides/notesSlide21.xml><?xml version="1.0" encoding="utf-8"?>
-<p:notes xmlns:a="http://schemas.openxmlformats.org/drawingml/2006/main" xmlns:r="http://schemas.openxmlformats.org/officeDocument/2006/relationships" xmlns:p="http://schemas.openxmlformats.org/presentationml/2006/main">
-  <p:cSld>
-    <p:spTree>
-      <p:nvGrpSpPr>
-        <p:cNvPr id="1" name=""/>
-        <p:cNvGrpSpPr/>
-        <p:nvPr/>
-      </p:nvGrpSpPr>
-      <p:grpSpPr>
-        <a:xfrm>
-          <a:off x="0" y="0"/>
-          <a:ext cx="0" cy="0"/>
-          <a:chOff x="0" y="0"/>
-          <a:chExt cx="0" cy="0"/>
-        </a:xfrm>
-      </p:grpSpPr>
-      <p:sp>
-        <p:nvSpPr>
-          <p:cNvPr id="2" name="Slide Image Placeholder 1"/>
-          <p:cNvSpPr>
-            <a:spLocks noGrp="1" noRot="1" noChangeAspect="1"/>
-          </p:cNvSpPr>
-          <p:nvPr>
-            <p:ph type="sldImg"/>
-          </p:nvPr>
-        </p:nvSpPr>
-        <p:spPr/>
-      </p:sp>
-      <p:sp>
-        <p:nvSpPr>
-          <p:cNvPr id="3" name="Notes Placeholder 2"/>
-          <p:cNvSpPr>
-            <a:spLocks noGrp="1"/>
-          </p:cNvSpPr>
-          <p:nvPr>
-            <p:ph type="body" idx="1"/>
-          </p:nvPr>
-        </p:nvSpPr>
-        <p:spPr/>
-        <p:txBody>
-          <a:bodyPr/>
-          <a:lstStyle/>
-          <a:p>
-            <a:endParaRPr lang="en-US" dirty="0"/>
-          </a:p>
-        </p:txBody>
-      </p:sp>
-      <p:sp>
-        <p:nvSpPr>
-          <p:cNvPr id="4" name="Slide Number Placeholder 3"/>
-          <p:cNvSpPr>
-            <a:spLocks noGrp="1"/>
-          </p:cNvSpPr>
-          <p:nvPr>
-            <p:ph type="sldNum" sz="quarter" idx="5"/>
-          </p:nvPr>
-        </p:nvSpPr>
-        <p:spPr/>
-        <p:txBody>
-          <a:bodyPr/>
-          <a:lstStyle/>
-          <a:p>
-            <a:fld id="{B9F26414-4BE6-427A-9F34-1430B41B92D6}" type="slidenum">
-              <a:rPr lang="en-US" smtClean="0"/>
-              <a:t>22</a:t>
-            </a:fld>
-            <a:endParaRPr lang="en-US"/>
-          </a:p>
-        </p:txBody>
-      </p:sp>
-    </p:spTree>
-    <p:extLst>
-      <p:ext uri="{BB962C8B-B14F-4D97-AF65-F5344CB8AC3E}">
-        <p14:creationId xmlns:p14="http://schemas.microsoft.com/office/powerpoint/2010/main" val="990998011"/>
-      </p:ext>
-    </p:extLst>
-  </p:cSld>
-  <p:clrMapOvr>
-    <a:masterClrMapping/>
-  </p:clrMapOvr>
-</p:notes>
-</file>
-
-<file path=ppt/notesSlides/notesSlide22.xml><?xml version="1.0" encoding="utf-8"?>
-<p:notes xmlns:a="http://schemas.openxmlformats.org/drawingml/2006/main" xmlns:r="http://schemas.openxmlformats.org/officeDocument/2006/relationships" xmlns:p="http://schemas.openxmlformats.org/presentationml/2006/main">
-  <p:cSld>
-    <p:spTree>
-      <p:nvGrpSpPr>
-        <p:cNvPr id="1" name=""/>
-        <p:cNvGrpSpPr/>
-        <p:nvPr/>
-      </p:nvGrpSpPr>
-      <p:grpSpPr>
-        <a:xfrm>
-          <a:off x="0" y="0"/>
-          <a:ext cx="0" cy="0"/>
-          <a:chOff x="0" y="0"/>
-          <a:chExt cx="0" cy="0"/>
-        </a:xfrm>
-      </p:grpSpPr>
-      <p:sp>
-        <p:nvSpPr>
-          <p:cNvPr id="2" name="Slide Image Placeholder 1"/>
-          <p:cNvSpPr>
-            <a:spLocks noGrp="1" noRot="1" noChangeAspect="1"/>
-          </p:cNvSpPr>
-          <p:nvPr>
-            <p:ph type="sldImg"/>
-          </p:nvPr>
-        </p:nvSpPr>
-        <p:spPr/>
-      </p:sp>
-      <p:sp>
-        <p:nvSpPr>
-          <p:cNvPr id="3" name="Notes Placeholder 2"/>
-          <p:cNvSpPr>
-            <a:spLocks noGrp="1"/>
-          </p:cNvSpPr>
-          <p:nvPr>
-            <p:ph type="body" idx="1"/>
-          </p:nvPr>
-        </p:nvSpPr>
-        <p:spPr/>
-        <p:txBody>
-          <a:bodyPr/>
-          <a:lstStyle/>
-          <a:p>
-            <a:pPr marL="0" marR="0" lvl="0" indent="0" algn="l" defTabSz="914400" rtl="0" eaLnBrk="1" fontAlgn="auto" latinLnBrk="0" hangingPunct="1">
-              <a:lnSpc>
-                <a:spcPct val="100000"/>
-              </a:lnSpc>
-              <a:spcBef>
-                <a:spcPts val="0"/>
-              </a:spcBef>
-              <a:spcAft>
-                <a:spcPts val="0"/>
-              </a:spcAft>
-              <a:buClrTx/>
-              <a:buSzTx/>
-              <a:buFontTx/>
-              <a:buNone/>
-              <a:tabLst/>
-              <a:defRPr/>
-            </a:pPr>
-            <a:r>
-              <a:rPr lang="en-US" dirty="0"/>
-              <a:t>{</a:t>
-            </a:r>
-            <a:r>
-              <a:rPr lang="en-US" dirty="0" err="1"/>
-              <a:t>valtools</a:t>
-            </a:r>
-            <a:r>
-              <a:rPr lang="en-US" dirty="0"/>
-              <a:t>} provides tools to quickly grab info including validation components, testing environment details and the results of executing test code in a reproducible manner.</a:t>
-            </a:r>
-          </a:p>
-        </p:txBody>
-      </p:sp>
-      <p:sp>
-        <p:nvSpPr>
-          <p:cNvPr id="4" name="Slide Number Placeholder 3"/>
-          <p:cNvSpPr>
-            <a:spLocks noGrp="1"/>
-          </p:cNvSpPr>
-          <p:nvPr>
-            <p:ph type="sldNum" sz="quarter" idx="5"/>
-          </p:nvPr>
-        </p:nvSpPr>
-        <p:spPr/>
-        <p:txBody>
-          <a:bodyPr/>
-          <a:lstStyle/>
-          <a:p>
-            <a:fld id="{B9F26414-4BE6-427A-9F34-1430B41B92D6}" type="slidenum">
-              <a:rPr lang="en-US" smtClean="0"/>
-              <a:t>24</a:t>
-            </a:fld>
-            <a:endParaRPr lang="en-US"/>
-          </a:p>
-        </p:txBody>
-      </p:sp>
-    </p:spTree>
-    <p:extLst>
-      <p:ext uri="{BB962C8B-B14F-4D97-AF65-F5344CB8AC3E}">
-        <p14:creationId xmlns:p14="http://schemas.microsoft.com/office/powerpoint/2010/main" val="3522713065"/>
-      </p:ext>
-    </p:extLst>
-  </p:cSld>
-  <p:clrMapOvr>
-    <a:masterClrMapping/>
-  </p:clrMapOvr>
-</p:notes>
-</file>
-
-<file path=ppt/notesSlides/notesSlide23.xml><?xml version="1.0" encoding="utf-8"?>
-<p:notes xmlns:a="http://schemas.openxmlformats.org/drawingml/2006/main" xmlns:r="http://schemas.openxmlformats.org/officeDocument/2006/relationships" xmlns:p="http://schemas.openxmlformats.org/presentationml/2006/main">
-  <p:cSld>
-    <p:spTree>
-      <p:nvGrpSpPr>
-        <p:cNvPr id="1" name=""/>
-        <p:cNvGrpSpPr/>
-        <p:nvPr/>
-      </p:nvGrpSpPr>
-      <p:grpSpPr>
-        <a:xfrm>
-          <a:off x="0" y="0"/>
-          <a:ext cx="0" cy="0"/>
-          <a:chOff x="0" y="0"/>
-          <a:chExt cx="0" cy="0"/>
-        </a:xfrm>
-      </p:grpSpPr>
-      <p:sp>
-        <p:nvSpPr>
-          <p:cNvPr id="2" name="Slide Image Placeholder 1"/>
-          <p:cNvSpPr>
-            <a:spLocks noGrp="1" noRot="1" noChangeAspect="1"/>
-          </p:cNvSpPr>
-          <p:nvPr>
-            <p:ph type="sldImg"/>
-          </p:nvPr>
-        </p:nvSpPr>
-        <p:spPr/>
-      </p:sp>
-      <p:sp>
-        <p:nvSpPr>
-          <p:cNvPr id="3" name="Notes Placeholder 2"/>
-          <p:cNvSpPr>
-            <a:spLocks noGrp="1"/>
-          </p:cNvSpPr>
-          <p:nvPr>
-            <p:ph type="body" idx="1"/>
-          </p:nvPr>
-        </p:nvSpPr>
-        <p:spPr/>
-        <p:txBody>
-          <a:bodyPr/>
-          <a:lstStyle/>
-          <a:p>
-            <a:endParaRPr lang="en-US" dirty="0"/>
-          </a:p>
-        </p:txBody>
-      </p:sp>
-      <p:sp>
-        <p:nvSpPr>
-          <p:cNvPr id="4" name="Slide Number Placeholder 3"/>
-          <p:cNvSpPr>
-            <a:spLocks noGrp="1"/>
-          </p:cNvSpPr>
-          <p:nvPr>
-            <p:ph type="sldNum" sz="quarter" idx="5"/>
-          </p:nvPr>
-        </p:nvSpPr>
-        <p:spPr/>
-        <p:txBody>
-          <a:bodyPr/>
-          <a:lstStyle/>
-          <a:p>
-            <a:fld id="{B9F26414-4BE6-427A-9F34-1430B41B92D6}" type="slidenum">
-              <a:rPr lang="en-US" smtClean="0"/>
-              <a:t>25</a:t>
-            </a:fld>
-            <a:endParaRPr lang="en-US"/>
-          </a:p>
-        </p:txBody>
-      </p:sp>
-    </p:spTree>
-    <p:extLst>
-      <p:ext uri="{BB962C8B-B14F-4D97-AF65-F5344CB8AC3E}">
-        <p14:creationId xmlns:p14="http://schemas.microsoft.com/office/powerpoint/2010/main" val="990998011"/>
       </p:ext>
     </p:extLst>
   </p:cSld>
@@ -3541,7 +2101,7 @@
           <p:cNvPr id="5" name="Rectangle 4">
             <a:extLst>
               <a:ext uri="{FF2B5EF4-FFF2-40B4-BE49-F238E27FC236}">
-                <a16:creationId xmlns="" xmlns:a16="http://schemas.microsoft.com/office/drawing/2014/main" id="{904DB13E-F722-4ED6-BB00-556651E95281}"/>
+                <a16:creationId xmlns:a16="http://schemas.microsoft.com/office/drawing/2014/main" xmlns="" id="{904DB13E-F722-4ED6-BB00-556651E95281}"/>
               </a:ext>
             </a:extLst>
           </p:cNvPr>
@@ -3690,7 +2250,7 @@
           <p:cNvPr id="7" name="Group 6">
             <a:extLst>
               <a:ext uri="{FF2B5EF4-FFF2-40B4-BE49-F238E27FC236}">
-                <a16:creationId xmlns="" xmlns:a16="http://schemas.microsoft.com/office/drawing/2014/main" id="{E26428D7-C6F3-473D-A360-A3F5C3E8728C}"/>
+                <a16:creationId xmlns:a16="http://schemas.microsoft.com/office/drawing/2014/main" xmlns="" id="{E26428D7-C6F3-473D-A360-A3F5C3E8728C}"/>
               </a:ext>
             </a:extLst>
           </p:cNvPr>
@@ -3988,7 +2548,7 @@
           <a:p>
             <a:fld id="{EA0C0817-A112-4847-8014-A94B7D2A4EA3}" type="datetime1">
               <a:rPr lang="en-US" smtClean="0"/>
-              <a:t>9/12/2021</a:t>
+              <a:t>10/14/2021</a:t>
             </a:fld>
             <a:endParaRPr lang="en-US" dirty="0"/>
           </a:p>
@@ -4190,7 +2750,7 @@
           <a:p>
             <a:fld id="{7332B432-ACDA-4023-A761-2BAB76577B62}" type="datetime1">
               <a:rPr lang="en-US" smtClean="0"/>
-              <a:t>9/12/2021</a:t>
+              <a:t>10/14/2021</a:t>
             </a:fld>
             <a:endParaRPr lang="en-US" dirty="0"/>
           </a:p>
@@ -4273,7 +2833,7 @@
           <p:cNvPr id="15" name="Rectangle 14">
             <a:extLst>
               <a:ext uri="{FF2B5EF4-FFF2-40B4-BE49-F238E27FC236}">
-                <a16:creationId xmlns="" xmlns:a16="http://schemas.microsoft.com/office/drawing/2014/main" id="{0A4A1889-E37C-4EC3-9E41-9DAD221CF389}"/>
+                <a16:creationId xmlns:a16="http://schemas.microsoft.com/office/drawing/2014/main" xmlns="" id="{0A4A1889-E37C-4EC3-9E41-9DAD221CF389}"/>
               </a:ext>
             </a:extLst>
           </p:cNvPr>
@@ -4470,7 +3030,7 @@
           <p:cNvPr id="16" name="Group 15">
             <a:extLst>
               <a:ext uri="{FF2B5EF4-FFF2-40B4-BE49-F238E27FC236}">
-                <a16:creationId xmlns="" xmlns:a16="http://schemas.microsoft.com/office/drawing/2014/main" id="{1683EB04-C23E-490C-A1A6-030CF79D23C8}"/>
+                <a16:creationId xmlns:a16="http://schemas.microsoft.com/office/drawing/2014/main" xmlns="" id="{1683EB04-C23E-490C-A1A6-030CF79D23C8}"/>
               </a:ext>
             </a:extLst>
           </p:cNvPr>
@@ -4490,7 +3050,7 @@
             <p:cNvPr id="17" name="Straight Connector 16">
               <a:extLst>
                 <a:ext uri="{FF2B5EF4-FFF2-40B4-BE49-F238E27FC236}">
-                  <a16:creationId xmlns="" xmlns:a16="http://schemas.microsoft.com/office/drawing/2014/main" id="{F8A84C03-E1CA-4A4E-81D6-9BB0C335B7A0}"/>
+                  <a16:creationId xmlns:a16="http://schemas.microsoft.com/office/drawing/2014/main" xmlns="" id="{F8A84C03-E1CA-4A4E-81D6-9BB0C335B7A0}"/>
                 </a:ext>
               </a:extLst>
             </p:cNvPr>
@@ -4538,7 +3098,7 @@
             <p:cNvPr id="18" name="Straight Connector 17">
               <a:extLst>
                 <a:ext uri="{FF2B5EF4-FFF2-40B4-BE49-F238E27FC236}">
-                  <a16:creationId xmlns="" xmlns:a16="http://schemas.microsoft.com/office/drawing/2014/main" id="{4A26FB5A-D5D1-4DAB-AC43-7F51A7F2D197}"/>
+                  <a16:creationId xmlns:a16="http://schemas.microsoft.com/office/drawing/2014/main" xmlns="" id="{4A26FB5A-D5D1-4DAB-AC43-7F51A7F2D197}"/>
                 </a:ext>
               </a:extLst>
             </p:cNvPr>
@@ -4586,7 +3146,7 @@
             <p:cNvPr id="19" name="Straight Connector 18">
               <a:extLst>
                 <a:ext uri="{FF2B5EF4-FFF2-40B4-BE49-F238E27FC236}">
-                  <a16:creationId xmlns="" xmlns:a16="http://schemas.microsoft.com/office/drawing/2014/main" id="{49303F14-E560-4C02-94F4-B4695FE26813}"/>
+                  <a16:creationId xmlns:a16="http://schemas.microsoft.com/office/drawing/2014/main" xmlns="" id="{49303F14-E560-4C02-94F4-B4695FE26813}"/>
                 </a:ext>
               </a:extLst>
             </p:cNvPr>
@@ -4789,7 +3349,7 @@
           <a:p>
             <a:fld id="{D9C646AA-F36E-4540-911D-FFFC0A0EF24A}" type="datetime1">
               <a:rPr lang="en-US" smtClean="0"/>
-              <a:t>9/12/2021</a:t>
+              <a:t>10/14/2021</a:t>
             </a:fld>
             <a:endParaRPr lang="en-US" dirty="0"/>
           </a:p>
@@ -5109,7 +3669,7 @@
           <a:p>
             <a:fld id="{69186D26-FA5F-4637-B602-B7C2DC34CFD4}" type="datetime1">
               <a:rPr lang="en-US" smtClean="0"/>
-              <a:t>9/12/2021</a:t>
+              <a:t>10/14/2021</a:t>
             </a:fld>
             <a:endParaRPr lang="en-US" dirty="0"/>
           </a:p>
@@ -5546,7 +4106,7 @@
           <a:p>
             <a:fld id="{8A7F15D8-96D1-4781-BC50-CA8A088B2FE4}" type="datetime1">
               <a:rPr lang="en-US" smtClean="0"/>
-              <a:t>9/12/2021</a:t>
+              <a:t>10/14/2021</a:t>
             </a:fld>
             <a:endParaRPr lang="en-US" dirty="0"/>
           </a:p>
@@ -5664,7 +4224,7 @@
           <a:p>
             <a:fld id="{F9A96C99-B8F8-4528-BD05-0E16E943DC09}" type="datetime1">
               <a:rPr lang="en-US" smtClean="0"/>
-              <a:t>9/12/2021</a:t>
+              <a:t>10/14/2021</a:t>
             </a:fld>
             <a:endParaRPr lang="en-US" dirty="0"/>
           </a:p>
@@ -5759,7 +4319,7 @@
           <a:p>
             <a:fld id="{03636942-C211-4B28-8DBD-C953E00AF71B}" type="datetime1">
               <a:rPr lang="en-US" smtClean="0"/>
-              <a:t>9/12/2021</a:t>
+              <a:t>10/14/2021</a:t>
             </a:fld>
             <a:endParaRPr lang="en-US" dirty="0"/>
           </a:p>
@@ -5842,7 +4402,7 @@
           <p:cNvPr id="10" name="Rectangle 9">
             <a:extLst>
               <a:ext uri="{FF2B5EF4-FFF2-40B4-BE49-F238E27FC236}">
-                <a16:creationId xmlns="" xmlns:a16="http://schemas.microsoft.com/office/drawing/2014/main" id="{D5E1BBF9-8BEF-4353-BA68-30AAF9EBD8D8}"/>
+                <a16:creationId xmlns:a16="http://schemas.microsoft.com/office/drawing/2014/main" xmlns="" id="{D5E1BBF9-8BEF-4353-BA68-30AAF9EBD8D8}"/>
               </a:ext>
             </a:extLst>
           </p:cNvPr>
@@ -5889,7 +4449,7 @@
           <p:cNvPr id="13" name="Rectangle 12">
             <a:extLst>
               <a:ext uri="{FF2B5EF4-FFF2-40B4-BE49-F238E27FC236}">
-                <a16:creationId xmlns="" xmlns:a16="http://schemas.microsoft.com/office/drawing/2014/main" id="{5B941C21-2A5D-4912-AB06-1BB0C0EB6AE1}"/>
+                <a16:creationId xmlns:a16="http://schemas.microsoft.com/office/drawing/2014/main" xmlns="" id="{5B941C21-2A5D-4912-AB06-1BB0C0EB6AE1}"/>
               </a:ext>
             </a:extLst>
           </p:cNvPr>
@@ -6176,7 +4736,7 @@
           <a:p>
             <a:fld id="{7E8D12A6-918A-48BD-8CB9-CA713993B0EA}" type="datetime1">
               <a:rPr lang="en-US" smtClean="0"/>
-              <a:t>9/12/2021</a:t>
+              <a:t>10/14/2021</a:t>
             </a:fld>
             <a:endParaRPr lang="en-US" dirty="0"/>
           </a:p>
@@ -6284,7 +4844,7 @@
           <p:cNvPr id="11" name="Rectangle 10">
             <a:extLst>
               <a:ext uri="{FF2B5EF4-FFF2-40B4-BE49-F238E27FC236}">
-                <a16:creationId xmlns="" xmlns:a16="http://schemas.microsoft.com/office/drawing/2014/main" id="{E687CA98-D9C7-497F-A1DA-7D22F8753BCE}"/>
+                <a16:creationId xmlns:a16="http://schemas.microsoft.com/office/drawing/2014/main" xmlns="" id="{E687CA98-D9C7-497F-A1DA-7D22F8753BCE}"/>
               </a:ext>
             </a:extLst>
           </p:cNvPr>
@@ -6438,7 +4998,7 @@
             <a:fld id="{E778CE86-875F-4587-BCF6-FA054AFC0D53}" type="datetime1">
               <a:rPr lang="en-US" smtClean="0"/>
               <a:pPr/>
-              <a:t>9/12/2021</a:t>
+              <a:t>10/14/2021</a:t>
             </a:fld>
             <a:endParaRPr lang="en-US" dirty="0"/>
           </a:p>
@@ -6520,7 +5080,7 @@
           <p:cNvPr id="12" name="Rectangle 11">
             <a:extLst>
               <a:ext uri="{FF2B5EF4-FFF2-40B4-BE49-F238E27FC236}">
-                <a16:creationId xmlns="" xmlns:a16="http://schemas.microsoft.com/office/drawing/2014/main" id="{F8B3D8CC-BB13-41A5-8F34-B8E84A4F9534}"/>
+                <a16:creationId xmlns:a16="http://schemas.microsoft.com/office/drawing/2014/main" xmlns="" id="{F8B3D8CC-BB13-41A5-8F34-B8E84A4F9534}"/>
               </a:ext>
             </a:extLst>
           </p:cNvPr>
@@ -6722,7 +5282,7 @@
           <p:cNvPr id="9" name="Rectangle 8">
             <a:extLst>
               <a:ext uri="{FF2B5EF4-FFF2-40B4-BE49-F238E27FC236}">
-                <a16:creationId xmlns="" xmlns:a16="http://schemas.microsoft.com/office/drawing/2014/main" id="{1E94681D-2A4C-4A8D-B9B5-31D440D0328D}"/>
+                <a16:creationId xmlns:a16="http://schemas.microsoft.com/office/drawing/2014/main" xmlns="" id="{1E94681D-2A4C-4A8D-B9B5-31D440D0328D}"/>
               </a:ext>
             </a:extLst>
           </p:cNvPr>
@@ -6954,7 +5514,7 @@
           <a:p>
             <a:fld id="{F6FA2B21-3FCD-4721-B95C-427943F61125}" type="datetime1">
               <a:rPr lang="en-US" smtClean="0"/>
-              <a:t>9/12/2021</a:t>
+              <a:t>10/14/2021</a:t>
             </a:fld>
             <a:endParaRPr lang="en-US" dirty="0"/>
           </a:p>
@@ -7434,7 +5994,7 @@
           <p:cNvPr id="6" name="Picture 5" descr="abstract image">
             <a:extLst>
               <a:ext uri="{FF2B5EF4-FFF2-40B4-BE49-F238E27FC236}">
-                <a16:creationId xmlns="" xmlns:a16="http://schemas.microsoft.com/office/drawing/2014/main" id="{8045422F-7258-40AC-BD2E-2469AA448922}"/>
+                <a16:creationId xmlns:a16="http://schemas.microsoft.com/office/drawing/2014/main" xmlns="" id="{8045422F-7258-40AC-BD2E-2469AA448922}"/>
               </a:ext>
             </a:extLst>
           </p:cNvPr>
@@ -7469,10 +6029,10 @@
           <p:cNvPr id="82" name="Rectangle 81">
             <a:extLst>
               <a:ext uri="{FF2B5EF4-FFF2-40B4-BE49-F238E27FC236}">
-                <a16:creationId xmlns="" xmlns:a16="http://schemas.microsoft.com/office/drawing/2014/main" id="{2644B391-9BFE-445C-A9EC-F544BB85FBC7}"/>
+                <a16:creationId xmlns:a16="http://schemas.microsoft.com/office/drawing/2014/main" xmlns="" id="{2644B391-9BFE-445C-A9EC-F544BB85FBC7}"/>
               </a:ext>
               <a:ext uri="{C183D7F6-B498-43B3-948B-1728B52AA6E4}">
-                <adec:decorative xmlns="" xmlns:adec="http://schemas.microsoft.com/office/drawing/2017/decorative" val="1"/>
+                <adec:decorative xmlns:adec="http://schemas.microsoft.com/office/drawing/2017/decorative" xmlns="" val="1"/>
               </a:ext>
             </a:extLst>
           </p:cNvPr>
@@ -7482,7 +6042,7 @@
           <p:nvPr>
             <p:extLst>
               <p:ext uri="{386F3935-93C4-4BCD-93E2-E3B085C9AB24}">
-                <p16:designElem xmlns="" xmlns:p16="http://schemas.microsoft.com/office/powerpoint/2015/main" val="1"/>
+                <p16:designElem xmlns:p16="http://schemas.microsoft.com/office/powerpoint/2015/main" xmlns="" val="1"/>
               </p:ext>
             </p:extLst>
           </p:nvPr>
@@ -7514,10 +6074,10 @@
           <p:cNvPr id="84" name="Rectangle 83">
             <a:extLst>
               <a:ext uri="{FF2B5EF4-FFF2-40B4-BE49-F238E27FC236}">
-                <a16:creationId xmlns="" xmlns:a16="http://schemas.microsoft.com/office/drawing/2014/main" id="{80F26E69-87D9-4655-AE7B-280A87AA3CAD}"/>
+                <a16:creationId xmlns:a16="http://schemas.microsoft.com/office/drawing/2014/main" xmlns="" id="{80F26E69-87D9-4655-AE7B-280A87AA3CAD}"/>
               </a:ext>
               <a:ext uri="{C183D7F6-B498-43B3-948B-1728B52AA6E4}">
-                <adec:decorative xmlns="" xmlns:adec="http://schemas.microsoft.com/office/drawing/2017/decorative" val="1"/>
+                <adec:decorative xmlns:adec="http://schemas.microsoft.com/office/drawing/2017/decorative" xmlns="" val="1"/>
               </a:ext>
             </a:extLst>
           </p:cNvPr>
@@ -7527,7 +6087,7 @@
           <p:nvPr>
             <p:extLst>
               <p:ext uri="{386F3935-93C4-4BCD-93E2-E3B085C9AB24}">
-                <p16:designElem xmlns="" xmlns:p16="http://schemas.microsoft.com/office/powerpoint/2015/main" val="1"/>
+                <p16:designElem xmlns:p16="http://schemas.microsoft.com/office/powerpoint/2015/main" xmlns="" val="1"/>
               </p:ext>
             </p:extLst>
           </p:nvPr>
@@ -7558,7 +6118,7 @@
           <p:cNvPr id="2" name="Title 1">
             <a:extLst>
               <a:ext uri="{FF2B5EF4-FFF2-40B4-BE49-F238E27FC236}">
-                <a16:creationId xmlns="" xmlns:a16="http://schemas.microsoft.com/office/drawing/2014/main" id="{18C3B467-088C-4F3D-A9A7-105C4E1E20CD}"/>
+                <a16:creationId xmlns:a16="http://schemas.microsoft.com/office/drawing/2014/main" xmlns="" id="{18C3B467-088C-4F3D-A9A7-105C4E1E20CD}"/>
               </a:ext>
             </a:extLst>
           </p:cNvPr>
@@ -7605,7 +6165,7 @@
           <p:cNvPr id="3" name="Subtitle 2">
             <a:extLst>
               <a:ext uri="{FF2B5EF4-FFF2-40B4-BE49-F238E27FC236}">
-                <a16:creationId xmlns="" xmlns:a16="http://schemas.microsoft.com/office/drawing/2014/main" id="{C8722DDC-8EEE-4A06-8DFE-B44871EAA2CF}"/>
+                <a16:creationId xmlns:a16="http://schemas.microsoft.com/office/drawing/2014/main" xmlns="" id="{C8722DDC-8EEE-4A06-8DFE-B44871EAA2CF}"/>
               </a:ext>
             </a:extLst>
           </p:cNvPr>
@@ -7664,7 +6224,7 @@
           <p:cNvPr id="5" name="Straight Connector 4">
             <a:extLst>
               <a:ext uri="{FF2B5EF4-FFF2-40B4-BE49-F238E27FC236}">
-                <a16:creationId xmlns="" xmlns:a16="http://schemas.microsoft.com/office/drawing/2014/main" id="{20AC4B09-ED72-42FC-9845-45FC1F4BC29D}"/>
+                <a16:creationId xmlns:a16="http://schemas.microsoft.com/office/drawing/2014/main" xmlns="" id="{20AC4B09-ED72-42FC-9845-45FC1F4BC29D}"/>
               </a:ext>
             </a:extLst>
           </p:cNvPr>
@@ -7730,156 +6290,99 @@
           <a:chExt cx="0" cy="0"/>
         </a:xfrm>
       </p:grpSpPr>
-      <p:sp>
-        <p:nvSpPr>
-          <p:cNvPr id="2" name="Title 1">
+      <p:pic>
+        <p:nvPicPr>
+          <p:cNvPr id="3" name="Picture 2">
             <a:extLst>
               <a:ext uri="{FF2B5EF4-FFF2-40B4-BE49-F238E27FC236}">
-                <a16:creationId xmlns="" xmlns:a16="http://schemas.microsoft.com/office/drawing/2014/main" id="{749E0D1B-C9EF-4CB6-9922-ED9D4AC52C59}"/>
+                <a16:creationId xmlns:a16="http://schemas.microsoft.com/office/drawing/2014/main" xmlns="" id="{D4774AFA-7531-41F9-ACA4-E3C3212778B3}"/>
               </a:ext>
             </a:extLst>
           </p:cNvPr>
-          <p:cNvSpPr>
-            <a:spLocks noGrp="1"/>
-          </p:cNvSpPr>
-          <p:nvPr>
-            <p:ph type="title"/>
-          </p:nvPr>
-        </p:nvSpPr>
-        <p:spPr/>
-        <p:txBody>
-          <a:bodyPr/>
-          <a:lstStyle/>
-          <a:p>
-            <a:r>
-              <a:rPr lang="en-US" dirty="0"/>
-              <a:t>Test Cases - </a:t>
-            </a:r>
-            <a:r>
-              <a:rPr lang="en-US" dirty="0" err="1"/>
-              <a:t>vt_use_test_case</a:t>
-            </a:r>
-            <a:r>
-              <a:rPr lang="en-US" dirty="0"/>
-              <a:t>()</a:t>
-            </a:r>
-          </a:p>
-        </p:txBody>
-      </p:sp>
-      <p:sp>
-        <p:nvSpPr>
-          <p:cNvPr id="5" name="Content Placeholder 4">
+          <p:cNvPicPr>
+            <a:picLocks noChangeAspect="1"/>
+          </p:cNvPicPr>
+          <p:nvPr/>
+        </p:nvPicPr>
+        <p:blipFill>
+          <a:blip r:embed="rId3"/>
+          <a:stretch>
+            <a:fillRect/>
+          </a:stretch>
+        </p:blipFill>
+        <p:spPr>
+          <a:xfrm>
+            <a:off x="1651863" y="1396015"/>
+            <a:ext cx="8800076" cy="4888931"/>
+          </a:xfrm>
+          <a:prstGeom prst="rect">
+            <a:avLst/>
+          </a:prstGeom>
+        </p:spPr>
+      </p:pic>
+      <p:sp>
+        <p:nvSpPr>
+          <p:cNvPr id="9" name="Title 1">
             <a:extLst>
               <a:ext uri="{FF2B5EF4-FFF2-40B4-BE49-F238E27FC236}">
-                <a16:creationId xmlns="" xmlns:a16="http://schemas.microsoft.com/office/drawing/2014/main" id="{7E558183-391D-4056-BC02-A181C5440B05}"/>
+                <a16:creationId xmlns:a16="http://schemas.microsoft.com/office/drawing/2014/main" xmlns="" id="{DE0E812E-FA7B-47C0-BD76-8A0569A8184D}"/>
               </a:ext>
             </a:extLst>
           </p:cNvPr>
-          <p:cNvSpPr>
-            <a:spLocks noGrp="1"/>
-          </p:cNvSpPr>
-          <p:nvPr>
-            <p:ph idx="1"/>
-          </p:nvPr>
-        </p:nvSpPr>
-        <p:spPr/>
-        <p:txBody>
-          <a:bodyPr>
-            <a:normAutofit fontScale="92500" lnSpcReduction="20000"/>
+          <p:cNvSpPr txBox="1">
+            <a:spLocks/>
+          </p:cNvSpPr>
+          <p:nvPr/>
+        </p:nvSpPr>
+        <p:spPr>
+          <a:xfrm>
+            <a:off x="721488" y="332007"/>
+            <a:ext cx="10058400" cy="1371600"/>
+          </a:xfrm>
+          <a:prstGeom prst="rect">
+            <a:avLst/>
+          </a:prstGeom>
+        </p:spPr>
+        <p:txBody>
+          <a:bodyPr vert="horz" lIns="91440" tIns="45720" rIns="91440" bIns="45720" rtlCol="0" anchor="ctr">
+            <a:normAutofit/>
           </a:bodyPr>
-          <a:lstStyle/>
-          <a:p>
-            <a:pPr lvl="1"/>
-            <a:r>
-              <a:rPr lang="en-US" sz="2400" dirty="0"/>
-              <a:t>Key Arguments</a:t>
-            </a:r>
-          </a:p>
-          <a:p>
-            <a:pPr lvl="2"/>
-            <a:r>
-              <a:rPr lang="en-US" sz="2400" dirty="0"/>
-              <a:t> name,</a:t>
-            </a:r>
-          </a:p>
-          <a:p>
-            <a:pPr lvl="2"/>
-            <a:r>
-              <a:rPr lang="en-US" sz="2400" dirty="0"/>
-              <a:t> username</a:t>
-            </a:r>
-          </a:p>
-          <a:p>
-            <a:pPr lvl="2"/>
-            <a:endParaRPr lang="en-US" sz="2400" dirty="0"/>
-          </a:p>
-          <a:p>
-            <a:pPr lvl="1"/>
-            <a:r>
-              <a:rPr lang="en-US" sz="2500" dirty="0"/>
-              <a:t>Name – requirement name</a:t>
-            </a:r>
-          </a:p>
-          <a:p>
-            <a:pPr lvl="1"/>
-            <a:r>
-              <a:rPr lang="en-US" sz="2500" dirty="0"/>
-              <a:t>Username – Person’s name writing test case</a:t>
-            </a:r>
-          </a:p>
-          <a:p>
-            <a:pPr lvl="1"/>
-            <a:endParaRPr lang="en-US" sz="2500" dirty="0"/>
-          </a:p>
-          <a:p>
-            <a:pPr lvl="1"/>
-            <a:r>
-              <a:rPr lang="en-US" sz="2500" dirty="0"/>
-              <a:t>Markdown document with proper roxygen headers</a:t>
-            </a:r>
-          </a:p>
-          <a:p>
-            <a:pPr lvl="2"/>
-            <a:r>
-              <a:rPr lang="en-US" sz="2400" dirty="0"/>
-              <a:t>Editor</a:t>
-            </a:r>
-          </a:p>
-          <a:p>
-            <a:pPr lvl="2"/>
-            <a:r>
-              <a:rPr lang="en-US" sz="2400" dirty="0" err="1"/>
-              <a:t>editDate</a:t>
-            </a:r>
-            <a:endParaRPr lang="en-US" sz="2400" dirty="0"/>
-          </a:p>
-          <a:p>
-            <a:pPr lvl="2"/>
-            <a:r>
-              <a:rPr lang="en-US" sz="2400" dirty="0"/>
-              <a:t>coverage</a:t>
-            </a:r>
-          </a:p>
-          <a:p>
-            <a:pPr lvl="1"/>
-            <a:endParaRPr lang="en-US" sz="2500" dirty="0"/>
-          </a:p>
-          <a:p>
-            <a:pPr lvl="1"/>
-            <a:endParaRPr lang="en-US" sz="2500" dirty="0"/>
-          </a:p>
-          <a:p>
-            <a:pPr marL="274320" lvl="1" indent="0">
+          <a:lstStyle>
+            <a:lvl1pPr algn="l" defTabSz="914400" rtl="0" eaLnBrk="1" latinLnBrk="0" hangingPunct="1">
+              <a:lnSpc>
+                <a:spcPct val="90000"/>
+              </a:lnSpc>
+              <a:spcBef>
+                <a:spcPct val="0"/>
+              </a:spcBef>
               <a:buNone/>
-            </a:pPr>
-            <a:endParaRPr lang="en-US" sz="2500" dirty="0"/>
+              <a:defRPr lang="en-US" sz="4000" i="0" kern="1200" cap="none" spc="0" baseline="0" dirty="0">
+                <a:solidFill>
+                  <a:schemeClr val="tx1">
+                    <a:lumMod val="85000"/>
+                    <a:lumOff val="15000"/>
+                  </a:schemeClr>
+                </a:solidFill>
+                <a:effectLst/>
+                <a:latin typeface="+mj-lt"/>
+                <a:ea typeface="+mn-ea"/>
+                <a:cs typeface="+mn-cs"/>
+              </a:defRPr>
+            </a:lvl1pPr>
+          </a:lstStyle>
+          <a:p>
+            <a:r>
+              <a:rPr lang="en-US" dirty="0" smtClean="0"/>
+              <a:t>** interactive prompting</a:t>
+            </a:r>
+            <a:endParaRPr lang="en-US" dirty="0"/>
           </a:p>
         </p:txBody>
       </p:sp>
     </p:spTree>
     <p:extLst>
       <p:ext uri="{BB962C8B-B14F-4D97-AF65-F5344CB8AC3E}">
-        <p14:creationId xmlns:p14="http://schemas.microsoft.com/office/powerpoint/2010/main" val="3725225043"/>
+        <p14:creationId xmlns:p14="http://schemas.microsoft.com/office/powerpoint/2010/main" val="3285487469"/>
       </p:ext>
     </p:extLst>
   </p:cSld>
@@ -7908,147 +6411,111 @@
       </p:grpSpPr>
       <p:sp>
         <p:nvSpPr>
-          <p:cNvPr id="2" name="Title 1">
+          <p:cNvPr id="2" name="Title 1"/>
+          <p:cNvSpPr>
+            <a:spLocks noGrp="1"/>
+          </p:cNvSpPr>
+          <p:nvPr>
+            <p:ph type="title"/>
+          </p:nvPr>
+        </p:nvSpPr>
+        <p:spPr/>
+        <p:txBody>
+          <a:bodyPr/>
+          <a:lstStyle/>
+          <a:p>
+            <a:r>
+              <a:rPr lang="en-US" dirty="0"/>
+              <a:t>Requirements - </a:t>
+            </a:r>
+            <a:r>
+              <a:rPr lang="en-US" dirty="0" err="1"/>
+              <a:t>vt_use_req</a:t>
+            </a:r>
+            <a:r>
+              <a:rPr lang="en-US" dirty="0"/>
+              <a:t>()</a:t>
+            </a:r>
+          </a:p>
+        </p:txBody>
+      </p:sp>
+      <p:sp>
+        <p:nvSpPr>
+          <p:cNvPr id="3" name="Content Placeholder 2"/>
+          <p:cNvSpPr>
+            <a:spLocks noGrp="1"/>
+          </p:cNvSpPr>
+          <p:nvPr>
+            <p:ph idx="1"/>
+          </p:nvPr>
+        </p:nvSpPr>
+        <p:spPr/>
+        <p:txBody>
+          <a:bodyPr/>
+          <a:lstStyle/>
+          <a:p>
+            <a:endParaRPr lang="en-US" dirty="0"/>
+          </a:p>
+        </p:txBody>
+      </p:sp>
+      <p:pic>
+        <p:nvPicPr>
+          <p:cNvPr id="2050" name="Picture 2"/>
+          <p:cNvPicPr>
+            <a:picLocks noChangeAspect="1" noChangeArrowheads="1"/>
+          </p:cNvPicPr>
+          <p:nvPr/>
+        </p:nvPicPr>
+        <p:blipFill>
+          <a:blip r:embed="rId2">
             <a:extLst>
-              <a:ext uri="{FF2B5EF4-FFF2-40B4-BE49-F238E27FC236}">
-                <a16:creationId xmlns="" xmlns:a16="http://schemas.microsoft.com/office/drawing/2014/main" id="{749E0D1B-C9EF-4CB6-9922-ED9D4AC52C59}"/>
+              <a:ext uri="{28A0092B-C50C-407E-A947-70E740481C1C}">
+                <a14:useLocalDpi xmlns:a14="http://schemas.microsoft.com/office/drawing/2010/main" val="0"/>
               </a:ext>
             </a:extLst>
-          </p:cNvPr>
-          <p:cNvSpPr>
-            <a:spLocks noGrp="1"/>
-          </p:cNvSpPr>
-          <p:nvPr>
-            <p:ph type="title"/>
-          </p:nvPr>
-        </p:nvSpPr>
-        <p:spPr/>
-        <p:txBody>
-          <a:bodyPr/>
-          <a:lstStyle/>
-          <a:p>
-            <a:r>
-              <a:rPr lang="en-US" dirty="0"/>
-              <a:t>Test Code - </a:t>
-            </a:r>
-            <a:r>
-              <a:rPr lang="en-US" dirty="0" err="1"/>
-              <a:t>vt_use_test_code</a:t>
-            </a:r>
-            <a:r>
-              <a:rPr lang="en-US" dirty="0"/>
-              <a:t>()</a:t>
-            </a:r>
-          </a:p>
-        </p:txBody>
-      </p:sp>
-      <p:sp>
-        <p:nvSpPr>
-          <p:cNvPr id="5" name="Content Placeholder 4">
-            <a:extLst>
-              <a:ext uri="{FF2B5EF4-FFF2-40B4-BE49-F238E27FC236}">
-                <a16:creationId xmlns="" xmlns:a16="http://schemas.microsoft.com/office/drawing/2014/main" id="{7E558183-391D-4056-BC02-A181C5440B05}"/>
-              </a:ext>
-            </a:extLst>
-          </p:cNvPr>
-          <p:cNvSpPr>
-            <a:spLocks noGrp="1"/>
-          </p:cNvSpPr>
-          <p:nvPr>
-            <p:ph idx="1"/>
-          </p:nvPr>
-        </p:nvSpPr>
-        <p:spPr/>
-        <p:txBody>
-          <a:bodyPr>
-            <a:normAutofit fontScale="92500" lnSpcReduction="10000"/>
-          </a:bodyPr>
-          <a:lstStyle/>
-          <a:p>
-            <a:pPr lvl="1"/>
-            <a:r>
-              <a:rPr lang="en-US" sz="2400" dirty="0"/>
-              <a:t>Key Arguments</a:t>
-            </a:r>
-          </a:p>
-          <a:p>
-            <a:pPr lvl="2"/>
-            <a:r>
-              <a:rPr lang="en-US" sz="2400" dirty="0"/>
-              <a:t> name,</a:t>
-            </a:r>
-          </a:p>
-          <a:p>
-            <a:pPr lvl="2"/>
-            <a:r>
-              <a:rPr lang="en-US" sz="2400" dirty="0"/>
-              <a:t> username</a:t>
-            </a:r>
-          </a:p>
-          <a:p>
-            <a:pPr lvl="2"/>
-            <a:endParaRPr lang="en-US" sz="2400" dirty="0"/>
-          </a:p>
-          <a:p>
-            <a:pPr lvl="1"/>
-            <a:r>
-              <a:rPr lang="en-US" sz="2500" dirty="0"/>
-              <a:t>Name – requirement name</a:t>
-            </a:r>
-          </a:p>
-          <a:p>
-            <a:pPr lvl="1"/>
-            <a:r>
-              <a:rPr lang="en-US" sz="2500" dirty="0"/>
-              <a:t>Username – Person’s name writing test code</a:t>
-            </a:r>
-          </a:p>
-          <a:p>
-            <a:pPr lvl="1"/>
-            <a:endParaRPr lang="en-US" sz="2500" dirty="0"/>
-          </a:p>
-          <a:p>
-            <a:pPr lvl="1"/>
-            <a:r>
-              <a:rPr lang="en-US" sz="2500" dirty="0"/>
-              <a:t>Markdown document with proper roxygen headers</a:t>
-            </a:r>
-          </a:p>
-          <a:p>
-            <a:pPr lvl="2"/>
-            <a:r>
-              <a:rPr lang="en-US" sz="2400" dirty="0"/>
-              <a:t>Editor</a:t>
-            </a:r>
-          </a:p>
-          <a:p>
-            <a:pPr lvl="2"/>
-            <a:r>
-              <a:rPr lang="en-US" sz="2400" dirty="0" err="1"/>
-              <a:t>editDate</a:t>
-            </a:r>
-            <a:endParaRPr lang="en-US" sz="2400" dirty="0"/>
-          </a:p>
-          <a:p>
-            <a:pPr lvl="1"/>
-            <a:endParaRPr lang="en-US" sz="2500" dirty="0"/>
-          </a:p>
-          <a:p>
-            <a:pPr lvl="1"/>
-            <a:endParaRPr lang="en-US" sz="2500" dirty="0"/>
-          </a:p>
-          <a:p>
-            <a:pPr marL="274320" lvl="1" indent="0">
-              <a:buNone/>
-            </a:pPr>
-            <a:endParaRPr lang="en-US" sz="2500" dirty="0"/>
-          </a:p>
-        </p:txBody>
-      </p:sp>
+          </a:blip>
+          <a:srcRect/>
+          <a:stretch>
+            <a:fillRect/>
+          </a:stretch>
+        </p:blipFill>
+        <p:spPr bwMode="auto">
+          <a:xfrm>
+            <a:off x="243754" y="2145289"/>
+            <a:ext cx="11546818" cy="4068474"/>
+          </a:xfrm>
+          <a:prstGeom prst="rect">
+            <a:avLst/>
+          </a:prstGeom>
+          <a:noFill/>
+          <a:ln>
+            <a:noFill/>
+          </a:ln>
+          <a:extLst>
+            <a:ext uri="{909E8E84-426E-40DD-AFC4-6F175D3DCCD1}">
+              <a14:hiddenFill xmlns:a14="http://schemas.microsoft.com/office/drawing/2010/main">
+                <a:solidFill>
+                  <a:schemeClr val="accent1"/>
+                </a:solidFill>
+              </a14:hiddenFill>
+            </a:ext>
+            <a:ext uri="{91240B29-F687-4F45-9708-019B960494DF}">
+              <a14:hiddenLine xmlns:a14="http://schemas.microsoft.com/office/drawing/2010/main" w="9525">
+                <a:solidFill>
+                  <a:schemeClr val="tx1"/>
+                </a:solidFill>
+                <a:miter lim="800000"/>
+                <a:headEnd/>
+                <a:tailEnd/>
+              </a14:hiddenLine>
+            </a:ext>
+          </a:extLst>
+        </p:spPr>
+      </p:pic>
     </p:spTree>
     <p:extLst>
       <p:ext uri="{BB962C8B-B14F-4D97-AF65-F5344CB8AC3E}">
-        <p14:creationId xmlns:p14="http://schemas.microsoft.com/office/powerpoint/2010/main" val="273055188"/>
+        <p14:creationId xmlns:p14="http://schemas.microsoft.com/office/powerpoint/2010/main" val="2107167373"/>
       </p:ext>
     </p:extLst>
   </p:cSld>
@@ -8080,337 +6547,7 @@
           <p:cNvPr id="2" name="Title 1">
             <a:extLst>
               <a:ext uri="{FF2B5EF4-FFF2-40B4-BE49-F238E27FC236}">
-                <a16:creationId xmlns="" xmlns:a16="http://schemas.microsoft.com/office/drawing/2014/main" id="{749E0D1B-C9EF-4CB6-9922-ED9D4AC52C59}"/>
-              </a:ext>
-            </a:extLst>
-          </p:cNvPr>
-          <p:cNvSpPr>
-            <a:spLocks noGrp="1"/>
-          </p:cNvSpPr>
-          <p:nvPr>
-            <p:ph type="title"/>
-          </p:nvPr>
-        </p:nvSpPr>
-        <p:spPr/>
-        <p:txBody>
-          <a:bodyPr/>
-          <a:lstStyle/>
-          <a:p>
-            <a:r>
-              <a:rPr lang="en-US" dirty="0"/>
-              <a:t>Users</a:t>
-            </a:r>
-          </a:p>
-        </p:txBody>
-      </p:sp>
-      <p:sp>
-        <p:nvSpPr>
-          <p:cNvPr id="5" name="Content Placeholder 4">
-            <a:extLst>
-              <a:ext uri="{FF2B5EF4-FFF2-40B4-BE49-F238E27FC236}">
-                <a16:creationId xmlns="" xmlns:a16="http://schemas.microsoft.com/office/drawing/2014/main" id="{7E558183-391D-4056-BC02-A181C5440B05}"/>
-              </a:ext>
-            </a:extLst>
-          </p:cNvPr>
-          <p:cNvSpPr>
-            <a:spLocks noGrp="1"/>
-          </p:cNvSpPr>
-          <p:nvPr>
-            <p:ph idx="1"/>
-          </p:nvPr>
-        </p:nvSpPr>
-        <p:spPr/>
-        <p:txBody>
-          <a:bodyPr>
-            <a:normAutofit/>
-          </a:bodyPr>
-          <a:lstStyle/>
-          <a:p>
-            <a:pPr lvl="1"/>
-            <a:r>
-              <a:rPr lang="en-US" sz="2500" dirty="0" err="1"/>
-              <a:t>valtools</a:t>
-            </a:r>
-            <a:r>
-              <a:rPr lang="en-US" sz="2500" dirty="0"/>
-              <a:t> tracks users and their roles in the </a:t>
-            </a:r>
-            <a:r>
-              <a:rPr lang="en-US" sz="2500" dirty="0" err="1"/>
-              <a:t>validation.yml</a:t>
-            </a:r>
-            <a:r>
-              <a:rPr lang="en-US" sz="2500" dirty="0"/>
-              <a:t> file</a:t>
-            </a:r>
-          </a:p>
-          <a:p>
-            <a:pPr lvl="1"/>
-            <a:endParaRPr lang="en-US" sz="2500" dirty="0"/>
-          </a:p>
-          <a:p>
-            <a:pPr lvl="1"/>
-            <a:r>
-              <a:rPr lang="en-US" sz="2500" dirty="0"/>
-              <a:t>If a user creates a file not seen before, prompted for their user information</a:t>
-            </a:r>
-          </a:p>
-          <a:p>
-            <a:pPr lvl="1"/>
-            <a:endParaRPr lang="en-US" sz="2500" dirty="0"/>
-          </a:p>
-          <a:p>
-            <a:pPr lvl="1"/>
-            <a:r>
-              <a:rPr lang="en-US" sz="2500" dirty="0"/>
-              <a:t>Manually add a person via </a:t>
-            </a:r>
-            <a:r>
-              <a:rPr lang="en-US" sz="2500" b="1" dirty="0" err="1"/>
-              <a:t>vt_add_user_to_config</a:t>
-            </a:r>
-            <a:r>
-              <a:rPr lang="en-US" sz="2500" b="1" dirty="0"/>
-              <a:t>()</a:t>
-            </a:r>
-          </a:p>
-          <a:p>
-            <a:pPr lvl="2"/>
-            <a:r>
-              <a:rPr lang="en-US" sz="2400" dirty="0"/>
-              <a:t>Need: username, name, role, title</a:t>
-            </a:r>
-          </a:p>
-          <a:p>
-            <a:pPr lvl="1"/>
-            <a:endParaRPr lang="en-US" sz="2500" dirty="0"/>
-          </a:p>
-          <a:p>
-            <a:pPr marL="274320" lvl="1" indent="0">
-              <a:buNone/>
-            </a:pPr>
-            <a:endParaRPr lang="en-US" sz="2500" dirty="0"/>
-          </a:p>
-        </p:txBody>
-      </p:sp>
-    </p:spTree>
-    <p:extLst>
-      <p:ext uri="{BB962C8B-B14F-4D97-AF65-F5344CB8AC3E}">
-        <p14:creationId xmlns:p14="http://schemas.microsoft.com/office/powerpoint/2010/main" val="920667786"/>
-      </p:ext>
-    </p:extLst>
-  </p:cSld>
-  <p:clrMapOvr>
-    <a:masterClrMapping/>
-  </p:clrMapOvr>
-</p:sld>
-</file>
-
-<file path=ppt/slides/slide13.xml><?xml version="1.0" encoding="utf-8"?>
-<p:sld xmlns:a="http://schemas.openxmlformats.org/drawingml/2006/main" xmlns:r="http://schemas.openxmlformats.org/officeDocument/2006/relationships" xmlns:p="http://schemas.openxmlformats.org/presentationml/2006/main">
-  <p:cSld>
-    <p:spTree>
-      <p:nvGrpSpPr>
-        <p:cNvPr id="1" name=""/>
-        <p:cNvGrpSpPr/>
-        <p:nvPr/>
-      </p:nvGrpSpPr>
-      <p:grpSpPr>
-        <a:xfrm>
-          <a:off x="0" y="0"/>
-          <a:ext cx="0" cy="0"/>
-          <a:chOff x="0" y="0"/>
-          <a:chExt cx="0" cy="0"/>
-        </a:xfrm>
-      </p:grpSpPr>
-      <p:pic>
-        <p:nvPicPr>
-          <p:cNvPr id="6" name="Picture 5">
-            <a:extLst>
-              <a:ext uri="{FF2B5EF4-FFF2-40B4-BE49-F238E27FC236}">
-                <a16:creationId xmlns="" xmlns:a16="http://schemas.microsoft.com/office/drawing/2014/main" id="{76A6266C-4A73-4C48-BF96-AC2CB8C71234}"/>
-              </a:ext>
-            </a:extLst>
-          </p:cNvPr>
-          <p:cNvPicPr>
-            <a:picLocks noChangeAspect="1"/>
-          </p:cNvPicPr>
-          <p:nvPr/>
-        </p:nvPicPr>
-        <p:blipFill>
-          <a:blip r:embed="rId3"/>
-          <a:stretch>
-            <a:fillRect/>
-          </a:stretch>
-        </p:blipFill>
-        <p:spPr>
-          <a:xfrm>
-            <a:off x="723333" y="984481"/>
-            <a:ext cx="10745333" cy="4889038"/>
-          </a:xfrm>
-          <a:prstGeom prst="rect">
-            <a:avLst/>
-          </a:prstGeom>
-        </p:spPr>
-      </p:pic>
-    </p:spTree>
-    <p:extLst>
-      <p:ext uri="{BB962C8B-B14F-4D97-AF65-F5344CB8AC3E}">
-        <p14:creationId xmlns:p14="http://schemas.microsoft.com/office/powerpoint/2010/main" val="1522521235"/>
-      </p:ext>
-    </p:extLst>
-  </p:cSld>
-  <p:clrMapOvr>
-    <a:masterClrMapping/>
-  </p:clrMapOvr>
-</p:sld>
-</file>
-
-<file path=ppt/slides/slide14.xml><?xml version="1.0" encoding="utf-8"?>
-<p:sld xmlns:a="http://schemas.openxmlformats.org/drawingml/2006/main" xmlns:r="http://schemas.openxmlformats.org/officeDocument/2006/relationships" xmlns:p="http://schemas.openxmlformats.org/presentationml/2006/main">
-  <p:cSld>
-    <p:spTree>
-      <p:nvGrpSpPr>
-        <p:cNvPr id="1" name=""/>
-        <p:cNvGrpSpPr/>
-        <p:nvPr/>
-      </p:nvGrpSpPr>
-      <p:grpSpPr>
-        <a:xfrm>
-          <a:off x="0" y="0"/>
-          <a:ext cx="0" cy="0"/>
-          <a:chOff x="0" y="0"/>
-          <a:chExt cx="0" cy="0"/>
-        </a:xfrm>
-      </p:grpSpPr>
-      <p:pic>
-        <p:nvPicPr>
-          <p:cNvPr id="3" name="Picture 2">
-            <a:extLst>
-              <a:ext uri="{FF2B5EF4-FFF2-40B4-BE49-F238E27FC236}">
-                <a16:creationId xmlns="" xmlns:a16="http://schemas.microsoft.com/office/drawing/2014/main" id="{D4774AFA-7531-41F9-ACA4-E3C3212778B3}"/>
-              </a:ext>
-            </a:extLst>
-          </p:cNvPr>
-          <p:cNvPicPr>
-            <a:picLocks noChangeAspect="1"/>
-          </p:cNvPicPr>
-          <p:nvPr/>
-        </p:nvPicPr>
-        <p:blipFill>
-          <a:blip r:embed="rId3"/>
-          <a:stretch>
-            <a:fillRect/>
-          </a:stretch>
-        </p:blipFill>
-        <p:spPr>
-          <a:xfrm>
-            <a:off x="1651863" y="1396015"/>
-            <a:ext cx="8800076" cy="4888931"/>
-          </a:xfrm>
-          <a:prstGeom prst="rect">
-            <a:avLst/>
-          </a:prstGeom>
-        </p:spPr>
-      </p:pic>
-      <p:sp>
-        <p:nvSpPr>
-          <p:cNvPr id="9" name="Title 1">
-            <a:extLst>
-              <a:ext uri="{FF2B5EF4-FFF2-40B4-BE49-F238E27FC236}">
-                <a16:creationId xmlns="" xmlns:a16="http://schemas.microsoft.com/office/drawing/2014/main" id="{DE0E812E-FA7B-47C0-BD76-8A0569A8184D}"/>
-              </a:ext>
-            </a:extLst>
-          </p:cNvPr>
-          <p:cNvSpPr txBox="1">
-            <a:spLocks/>
-          </p:cNvSpPr>
-          <p:nvPr/>
-        </p:nvSpPr>
-        <p:spPr>
-          <a:xfrm>
-            <a:off x="721488" y="332007"/>
-            <a:ext cx="10058400" cy="1371600"/>
-          </a:xfrm>
-          <a:prstGeom prst="rect">
-            <a:avLst/>
-          </a:prstGeom>
-        </p:spPr>
-        <p:txBody>
-          <a:bodyPr vert="horz" lIns="91440" tIns="45720" rIns="91440" bIns="45720" rtlCol="0" anchor="ctr">
-            <a:normAutofit/>
-          </a:bodyPr>
-          <a:lstStyle>
-            <a:lvl1pPr algn="l" defTabSz="914400" rtl="0" eaLnBrk="1" latinLnBrk="0" hangingPunct="1">
-              <a:lnSpc>
-                <a:spcPct val="90000"/>
-              </a:lnSpc>
-              <a:spcBef>
-                <a:spcPct val="0"/>
-              </a:spcBef>
-              <a:buNone/>
-              <a:defRPr lang="en-US" sz="4000" i="0" kern="1200" cap="none" spc="0" baseline="0" dirty="0">
-                <a:solidFill>
-                  <a:schemeClr val="tx1">
-                    <a:lumMod val="85000"/>
-                    <a:lumOff val="15000"/>
-                  </a:schemeClr>
-                </a:solidFill>
-                <a:effectLst/>
-                <a:latin typeface="+mj-lt"/>
-                <a:ea typeface="+mn-ea"/>
-                <a:cs typeface="+mn-cs"/>
-              </a:defRPr>
-            </a:lvl1pPr>
-          </a:lstStyle>
-          <a:p>
-            <a:r>
-              <a:rPr lang="en-US" dirty="0" err="1"/>
-              <a:t>vt_use</a:t>
-            </a:r>
-            <a:r>
-              <a:rPr lang="en-US" dirty="0"/>
-              <a:t>_* prompting</a:t>
-            </a:r>
-          </a:p>
-        </p:txBody>
-      </p:sp>
-    </p:spTree>
-    <p:extLst>
-      <p:ext uri="{BB962C8B-B14F-4D97-AF65-F5344CB8AC3E}">
-        <p14:creationId xmlns:p14="http://schemas.microsoft.com/office/powerpoint/2010/main" val="3285487469"/>
-      </p:ext>
-    </p:extLst>
-  </p:cSld>
-  <p:clrMapOvr>
-    <a:masterClrMapping/>
-  </p:clrMapOvr>
-</p:sld>
-</file>
-
-<file path=ppt/slides/slide15.xml><?xml version="1.0" encoding="utf-8"?>
-<p:sld xmlns:a="http://schemas.openxmlformats.org/drawingml/2006/main" xmlns:r="http://schemas.openxmlformats.org/officeDocument/2006/relationships" xmlns:p="http://schemas.openxmlformats.org/presentationml/2006/main">
-  <p:cSld>
-    <p:spTree>
-      <p:nvGrpSpPr>
-        <p:cNvPr id="1" name=""/>
-        <p:cNvGrpSpPr/>
-        <p:nvPr/>
-      </p:nvGrpSpPr>
-      <p:grpSpPr>
-        <a:xfrm>
-          <a:off x="0" y="0"/>
-          <a:ext cx="0" cy="0"/>
-          <a:chOff x="0" y="0"/>
-          <a:chExt cx="0" cy="0"/>
-        </a:xfrm>
-      </p:grpSpPr>
-      <p:sp>
-        <p:nvSpPr>
-          <p:cNvPr id="2" name="Title 1">
-            <a:extLst>
-              <a:ext uri="{FF2B5EF4-FFF2-40B4-BE49-F238E27FC236}">
-                <a16:creationId xmlns="" xmlns:a16="http://schemas.microsoft.com/office/drawing/2014/main" id="{7614332B-4F24-42F4-A704-A6F1183E9470}"/>
+                <a16:creationId xmlns:a16="http://schemas.microsoft.com/office/drawing/2014/main" xmlns="" id="{7614332B-4F24-42F4-A704-A6F1183E9470}"/>
               </a:ext>
             </a:extLst>
           </p:cNvPr>
@@ -8444,7 +6581,11 @@
             </a:br>
             <a:r>
               <a:rPr lang="en-US" dirty="0" smtClean="0"/>
-              <a:t>Exercise 4 Task A</a:t>
+              <a:t>Exercise </a:t>
+            </a:r>
+            <a:r>
+              <a:rPr lang="en-US" dirty="0"/>
+              <a:t>4</a:t>
             </a:r>
             <a:endParaRPr lang="en-US" dirty="0"/>
           </a:p>
@@ -8454,557 +6595,6 @@
     <p:extLst>
       <p:ext uri="{BB962C8B-B14F-4D97-AF65-F5344CB8AC3E}">
         <p14:creationId xmlns:p14="http://schemas.microsoft.com/office/powerpoint/2010/main" val="2364925625"/>
-      </p:ext>
-    </p:extLst>
-  </p:cSld>
-  <p:clrMapOvr>
-    <a:masterClrMapping/>
-  </p:clrMapOvr>
-</p:sld>
-</file>
-
-<file path=ppt/slides/slide16.xml><?xml version="1.0" encoding="utf-8"?>
-<p:sld xmlns:a="http://schemas.openxmlformats.org/drawingml/2006/main" xmlns:r="http://schemas.openxmlformats.org/officeDocument/2006/relationships" xmlns:p="http://schemas.openxmlformats.org/presentationml/2006/main">
-  <p:cSld>
-    <p:spTree>
-      <p:nvGrpSpPr>
-        <p:cNvPr id="1" name=""/>
-        <p:cNvGrpSpPr/>
-        <p:nvPr/>
-      </p:nvGrpSpPr>
-      <p:grpSpPr>
-        <a:xfrm>
-          <a:off x="0" y="0"/>
-          <a:ext cx="0" cy="0"/>
-          <a:chOff x="0" y="0"/>
-          <a:chExt cx="0" cy="0"/>
-        </a:xfrm>
-      </p:grpSpPr>
-      <p:sp>
-        <p:nvSpPr>
-          <p:cNvPr id="2" name="Title 1">
-            <a:extLst>
-              <a:ext uri="{FF2B5EF4-FFF2-40B4-BE49-F238E27FC236}">
-                <a16:creationId xmlns="" xmlns:a16="http://schemas.microsoft.com/office/drawing/2014/main" id="{7614332B-4F24-42F4-A704-A6F1183E9470}"/>
-              </a:ext>
-            </a:extLst>
-          </p:cNvPr>
-          <p:cNvSpPr>
-            <a:spLocks noGrp="1"/>
-          </p:cNvSpPr>
-          <p:nvPr>
-            <p:ph type="ctrTitle"/>
-          </p:nvPr>
-        </p:nvSpPr>
-        <p:spPr>
-          <a:xfrm>
-            <a:off x="1629102" y="2409722"/>
-            <a:ext cx="8933796" cy="2437232"/>
-          </a:xfrm>
-        </p:spPr>
-        <p:txBody>
-          <a:bodyPr>
-            <a:normAutofit/>
-          </a:bodyPr>
-          <a:lstStyle/>
-          <a:p>
-            <a:r>
-              <a:rPr lang="en-US" dirty="0"/>
-              <a:t>Report</a:t>
-            </a:r>
-          </a:p>
-        </p:txBody>
-      </p:sp>
-    </p:spTree>
-    <p:extLst>
-      <p:ext uri="{BB962C8B-B14F-4D97-AF65-F5344CB8AC3E}">
-        <p14:creationId xmlns:p14="http://schemas.microsoft.com/office/powerpoint/2010/main" val="3887044945"/>
-      </p:ext>
-    </p:extLst>
-  </p:cSld>
-  <p:clrMapOvr>
-    <a:masterClrMapping/>
-  </p:clrMapOvr>
-</p:sld>
-</file>
-
-<file path=ppt/slides/slide17.xml><?xml version="1.0" encoding="utf-8"?>
-<p:sld xmlns:a="http://schemas.openxmlformats.org/drawingml/2006/main" xmlns:r="http://schemas.openxmlformats.org/officeDocument/2006/relationships" xmlns:p="http://schemas.openxmlformats.org/presentationml/2006/main">
-  <p:cSld>
-    <p:spTree>
-      <p:nvGrpSpPr>
-        <p:cNvPr id="1" name=""/>
-        <p:cNvGrpSpPr/>
-        <p:nvPr/>
-      </p:nvGrpSpPr>
-      <p:grpSpPr>
-        <a:xfrm>
-          <a:off x="0" y="0"/>
-          <a:ext cx="0" cy="0"/>
-          <a:chOff x="0" y="0"/>
-          <a:chExt cx="0" cy="0"/>
-        </a:xfrm>
-      </p:grpSpPr>
-      <p:sp>
-        <p:nvSpPr>
-          <p:cNvPr id="8" name="Title 7">
-            <a:extLst>
-              <a:ext uri="{FF2B5EF4-FFF2-40B4-BE49-F238E27FC236}">
-                <a16:creationId xmlns="" xmlns:a16="http://schemas.microsoft.com/office/drawing/2014/main" id="{6A34AC25-F9D4-48D7-A664-C590D06BF559}"/>
-              </a:ext>
-            </a:extLst>
-          </p:cNvPr>
-          <p:cNvSpPr>
-            <a:spLocks noGrp="1"/>
-          </p:cNvSpPr>
-          <p:nvPr>
-            <p:ph type="title"/>
-          </p:nvPr>
-        </p:nvSpPr>
-        <p:spPr/>
-        <p:txBody>
-          <a:bodyPr/>
-          <a:lstStyle/>
-          <a:p>
-            <a:r>
-              <a:rPr lang="en-US" dirty="0"/>
-              <a:t>Creating the validation report Rmd</a:t>
-            </a:r>
-          </a:p>
-        </p:txBody>
-      </p:sp>
-      <p:sp>
-        <p:nvSpPr>
-          <p:cNvPr id="11" name="TextBox 10">
-            <a:extLst>
-              <a:ext uri="{FF2B5EF4-FFF2-40B4-BE49-F238E27FC236}">
-                <a16:creationId xmlns="" xmlns:a16="http://schemas.microsoft.com/office/drawing/2014/main" id="{F1F3DA2E-9599-4B03-A261-D34A77F831CE}"/>
-              </a:ext>
-            </a:extLst>
-          </p:cNvPr>
-          <p:cNvSpPr txBox="1"/>
-          <p:nvPr/>
-        </p:nvSpPr>
-        <p:spPr>
-          <a:xfrm>
-            <a:off x="1540934" y="2218267"/>
-            <a:ext cx="10651066" cy="3539430"/>
-          </a:xfrm>
-          <a:prstGeom prst="rect">
-            <a:avLst/>
-          </a:prstGeom>
-          <a:noFill/>
-        </p:spPr>
-        <p:txBody>
-          <a:bodyPr wrap="square" rtlCol="0">
-            <a:spAutoFit/>
-          </a:bodyPr>
-          <a:lstStyle/>
-          <a:p>
-            <a:pPr marL="285750" indent="-285750">
-              <a:buFont typeface="Arial" panose="020B0604020202020204" pitchFamily="34" charset="0"/>
-              <a:buChar char="•"/>
-            </a:pPr>
-            <a:r>
-              <a:rPr lang="en-US" sz="2800" dirty="0" err="1"/>
-              <a:t>vt_use_report</a:t>
-            </a:r>
-            <a:r>
-              <a:rPr lang="en-US" sz="2800" dirty="0"/>
-              <a:t>()</a:t>
-            </a:r>
-          </a:p>
-          <a:p>
-            <a:pPr marL="285750" indent="-285750">
-              <a:buFont typeface="Arial" panose="020B0604020202020204" pitchFamily="34" charset="0"/>
-              <a:buChar char="•"/>
-            </a:pPr>
-            <a:endParaRPr lang="en-US" sz="2800" dirty="0"/>
-          </a:p>
-          <a:p>
-            <a:pPr marL="285750" indent="-285750">
-              <a:buFont typeface="Arial" panose="020B0604020202020204" pitchFamily="34" charset="0"/>
-              <a:buChar char="•"/>
-            </a:pPr>
-            <a:r>
-              <a:rPr lang="en-US" sz="2800" dirty="0"/>
-              <a:t>Creates report from template with suggested contents</a:t>
-            </a:r>
-          </a:p>
-          <a:p>
-            <a:pPr marL="285750" indent="-285750">
-              <a:buFont typeface="Arial" panose="020B0604020202020204" pitchFamily="34" charset="0"/>
-              <a:buChar char="•"/>
-            </a:pPr>
-            <a:endParaRPr lang="en-US" sz="2800" dirty="0"/>
-          </a:p>
-          <a:p>
-            <a:pPr marL="285750" indent="-285750">
-              <a:buFont typeface="Arial" panose="020B0604020202020204" pitchFamily="34" charset="0"/>
-              <a:buChar char="•"/>
-            </a:pPr>
-            <a:r>
-              <a:rPr lang="en-US" sz="2800" dirty="0"/>
-              <a:t>Adds dependencies to package DESCRIPTION</a:t>
-            </a:r>
-          </a:p>
-          <a:p>
-            <a:pPr marL="285750" indent="-285750">
-              <a:buFont typeface="Arial" panose="020B0604020202020204" pitchFamily="34" charset="0"/>
-              <a:buChar char="•"/>
-            </a:pPr>
-            <a:endParaRPr lang="en-US" sz="2800" dirty="0"/>
-          </a:p>
-          <a:p>
-            <a:pPr marL="285750" indent="-285750">
-              <a:buFont typeface="Arial" panose="020B0604020202020204" pitchFamily="34" charset="0"/>
-              <a:buChar char="•"/>
-            </a:pPr>
-            <a:r>
-              <a:rPr lang="en-US" sz="2800" dirty="0"/>
-              <a:t>Two templates included: full validation report and a requirements approval report</a:t>
-            </a:r>
-          </a:p>
-        </p:txBody>
-      </p:sp>
-    </p:spTree>
-    <p:extLst>
-      <p:ext uri="{BB962C8B-B14F-4D97-AF65-F5344CB8AC3E}">
-        <p14:creationId xmlns:p14="http://schemas.microsoft.com/office/powerpoint/2010/main" val="1736176902"/>
-      </p:ext>
-    </p:extLst>
-  </p:cSld>
-  <p:clrMapOvr>
-    <a:masterClrMapping/>
-  </p:clrMapOvr>
-</p:sld>
-</file>
-
-<file path=ppt/slides/slide18.xml><?xml version="1.0" encoding="utf-8"?>
-<p:sld xmlns:a="http://schemas.openxmlformats.org/drawingml/2006/main" xmlns:r="http://schemas.openxmlformats.org/officeDocument/2006/relationships" xmlns:p="http://schemas.openxmlformats.org/presentationml/2006/main">
-  <p:cSld>
-    <p:spTree>
-      <p:nvGrpSpPr>
-        <p:cNvPr id="1" name=""/>
-        <p:cNvGrpSpPr/>
-        <p:nvPr/>
-      </p:nvGrpSpPr>
-      <p:grpSpPr>
-        <a:xfrm>
-          <a:off x="0" y="0"/>
-          <a:ext cx="0" cy="0"/>
-          <a:chOff x="0" y="0"/>
-          <a:chExt cx="0" cy="0"/>
-        </a:xfrm>
-      </p:grpSpPr>
-      <p:sp>
-        <p:nvSpPr>
-          <p:cNvPr id="8" name="Title 7">
-            <a:extLst>
-              <a:ext uri="{FF2B5EF4-FFF2-40B4-BE49-F238E27FC236}">
-                <a16:creationId xmlns="" xmlns:a16="http://schemas.microsoft.com/office/drawing/2014/main" id="{6A34AC25-F9D4-48D7-A664-C590D06BF559}"/>
-              </a:ext>
-            </a:extLst>
-          </p:cNvPr>
-          <p:cNvSpPr>
-            <a:spLocks noGrp="1"/>
-          </p:cNvSpPr>
-          <p:nvPr>
-            <p:ph type="title"/>
-          </p:nvPr>
-        </p:nvSpPr>
-        <p:spPr/>
-        <p:txBody>
-          <a:bodyPr/>
-          <a:lstStyle/>
-          <a:p>
-            <a:r>
-              <a:rPr lang="en-US" dirty="0"/>
-              <a:t>Report basics</a:t>
-            </a:r>
-          </a:p>
-        </p:txBody>
-      </p:sp>
-      <p:sp>
-        <p:nvSpPr>
-          <p:cNvPr id="11" name="TextBox 10">
-            <a:extLst>
-              <a:ext uri="{FF2B5EF4-FFF2-40B4-BE49-F238E27FC236}">
-                <a16:creationId xmlns="" xmlns:a16="http://schemas.microsoft.com/office/drawing/2014/main" id="{F1F3DA2E-9599-4B03-A261-D34A77F831CE}"/>
-              </a:ext>
-            </a:extLst>
-          </p:cNvPr>
-          <p:cNvSpPr txBox="1"/>
-          <p:nvPr/>
-        </p:nvSpPr>
-        <p:spPr>
-          <a:xfrm>
-            <a:off x="1540934" y="2218267"/>
-            <a:ext cx="10186778" cy="3970318"/>
-          </a:xfrm>
-          <a:prstGeom prst="rect">
-            <a:avLst/>
-          </a:prstGeom>
-          <a:noFill/>
-        </p:spPr>
-        <p:txBody>
-          <a:bodyPr wrap="square" rtlCol="0">
-            <a:spAutoFit/>
-          </a:bodyPr>
-          <a:lstStyle/>
-          <a:p>
-            <a:pPr marL="285750" indent="-285750">
-              <a:buFont typeface="Arial" panose="020B0604020202020204" pitchFamily="34" charset="0"/>
-              <a:buChar char="•"/>
-            </a:pPr>
-            <a:r>
-              <a:rPr lang="en-US" sz="2800" dirty="0"/>
-              <a:t>Rmarkdown</a:t>
-            </a:r>
-          </a:p>
-          <a:p>
-            <a:pPr marL="285750" indent="-285750">
-              <a:buFont typeface="Arial" panose="020B0604020202020204" pitchFamily="34" charset="0"/>
-              <a:buChar char="•"/>
-            </a:pPr>
-            <a:endParaRPr lang="en-US" sz="2800" dirty="0"/>
-          </a:p>
-          <a:p>
-            <a:pPr marL="285750" indent="-285750">
-              <a:buFont typeface="Arial" panose="020B0604020202020204" pitchFamily="34" charset="0"/>
-              <a:buChar char="•"/>
-            </a:pPr>
-            <a:r>
-              <a:rPr lang="en-US" sz="2800" dirty="0"/>
-              <a:t>Scrapes information saved across various files</a:t>
-            </a:r>
-          </a:p>
-          <a:p>
-            <a:pPr marL="285750" indent="-285750">
-              <a:buFont typeface="Arial" panose="020B0604020202020204" pitchFamily="34" charset="0"/>
-              <a:buChar char="•"/>
-            </a:pPr>
-            <a:endParaRPr lang="en-US" sz="2800" dirty="0"/>
-          </a:p>
-          <a:p>
-            <a:pPr marL="285750" indent="-285750">
-              <a:buFont typeface="Arial" panose="020B0604020202020204" pitchFamily="34" charset="0"/>
-              <a:buChar char="•"/>
-            </a:pPr>
-            <a:r>
-              <a:rPr lang="en-US" sz="2800" dirty="0"/>
-              <a:t>Produces </a:t>
-            </a:r>
-            <a:r>
-              <a:rPr lang="en-US" sz="2800" dirty="0" err="1"/>
-              <a:t>kables</a:t>
-            </a:r>
-            <a:endParaRPr lang="en-US" sz="2800" dirty="0"/>
-          </a:p>
-          <a:p>
-            <a:pPr marL="285750" indent="-285750">
-              <a:buFont typeface="Arial" panose="020B0604020202020204" pitchFamily="34" charset="0"/>
-              <a:buChar char="•"/>
-            </a:pPr>
-            <a:endParaRPr lang="en-US" sz="2800" dirty="0"/>
-          </a:p>
-          <a:p>
-            <a:pPr marL="285750" indent="-285750">
-              <a:buFont typeface="Arial" panose="020B0604020202020204" pitchFamily="34" charset="0"/>
-              <a:buChar char="•"/>
-            </a:pPr>
-            <a:r>
-              <a:rPr lang="en-US" sz="2800" dirty="0"/>
-              <a:t>Reads in the validation child files and parses them based on order in </a:t>
-            </a:r>
-            <a:r>
-              <a:rPr lang="en-US" sz="2800" dirty="0" err="1"/>
-              <a:t>validation.yml</a:t>
-            </a:r>
-            <a:endParaRPr lang="en-US" sz="2800" dirty="0"/>
-          </a:p>
-          <a:p>
-            <a:pPr marL="285750" indent="-285750">
-              <a:buFont typeface="Arial" panose="020B0604020202020204" pitchFamily="34" charset="0"/>
-              <a:buChar char="•"/>
-            </a:pPr>
-            <a:endParaRPr lang="en-US" sz="2800" dirty="0"/>
-          </a:p>
-        </p:txBody>
-      </p:sp>
-    </p:spTree>
-    <p:extLst>
-      <p:ext uri="{BB962C8B-B14F-4D97-AF65-F5344CB8AC3E}">
-        <p14:creationId xmlns:p14="http://schemas.microsoft.com/office/powerpoint/2010/main" val="3201114276"/>
-      </p:ext>
-    </p:extLst>
-  </p:cSld>
-  <p:clrMapOvr>
-    <a:masterClrMapping/>
-  </p:clrMapOvr>
-</p:sld>
-</file>
-
-<file path=ppt/slides/slide19.xml><?xml version="1.0" encoding="utf-8"?>
-<p:sld xmlns:a="http://schemas.openxmlformats.org/drawingml/2006/main" xmlns:r="http://schemas.openxmlformats.org/officeDocument/2006/relationships" xmlns:p="http://schemas.openxmlformats.org/presentationml/2006/main">
-  <p:cSld>
-    <p:spTree>
-      <p:nvGrpSpPr>
-        <p:cNvPr id="1" name=""/>
-        <p:cNvGrpSpPr/>
-        <p:nvPr/>
-      </p:nvGrpSpPr>
-      <p:grpSpPr>
-        <a:xfrm>
-          <a:off x="0" y="0"/>
-          <a:ext cx="0" cy="0"/>
-          <a:chOff x="0" y="0"/>
-          <a:chExt cx="0" cy="0"/>
-        </a:xfrm>
-      </p:grpSpPr>
-      <p:sp>
-        <p:nvSpPr>
-          <p:cNvPr id="8" name="Title 7">
-            <a:extLst>
-              <a:ext uri="{FF2B5EF4-FFF2-40B4-BE49-F238E27FC236}">
-                <a16:creationId xmlns="" xmlns:a16="http://schemas.microsoft.com/office/drawing/2014/main" id="{6A34AC25-F9D4-48D7-A664-C590D06BF559}"/>
-              </a:ext>
-            </a:extLst>
-          </p:cNvPr>
-          <p:cNvSpPr>
-            <a:spLocks noGrp="1"/>
-          </p:cNvSpPr>
-          <p:nvPr>
-            <p:ph type="title"/>
-          </p:nvPr>
-        </p:nvSpPr>
-        <p:spPr/>
-        <p:txBody>
-          <a:bodyPr/>
-          <a:lstStyle/>
-          <a:p>
-            <a:r>
-              <a:rPr lang="en-US" dirty="0"/>
-              <a:t>Validation Report Helpers</a:t>
-            </a:r>
-          </a:p>
-        </p:txBody>
-      </p:sp>
-      <p:sp>
-        <p:nvSpPr>
-          <p:cNvPr id="11" name="TextBox 10">
-            <a:extLst>
-              <a:ext uri="{FF2B5EF4-FFF2-40B4-BE49-F238E27FC236}">
-                <a16:creationId xmlns="" xmlns:a16="http://schemas.microsoft.com/office/drawing/2014/main" id="{F1F3DA2E-9599-4B03-A261-D34A77F831CE}"/>
-              </a:ext>
-            </a:extLst>
-          </p:cNvPr>
-          <p:cNvSpPr txBox="1"/>
-          <p:nvPr/>
-        </p:nvSpPr>
-        <p:spPr>
-          <a:xfrm>
-            <a:off x="1286933" y="2218267"/>
-            <a:ext cx="10905067" cy="3539430"/>
-          </a:xfrm>
-          <a:prstGeom prst="rect">
-            <a:avLst/>
-          </a:prstGeom>
-          <a:noFill/>
-        </p:spPr>
-        <p:txBody>
-          <a:bodyPr wrap="square" rtlCol="0">
-            <a:spAutoFit/>
-          </a:bodyPr>
-          <a:lstStyle/>
-          <a:p>
-            <a:pPr marL="285750" indent="-285750">
-              <a:buFont typeface="Arial" panose="020B0604020202020204" pitchFamily="34" charset="0"/>
-              <a:buChar char="•"/>
-            </a:pPr>
-            <a:r>
-              <a:rPr lang="en-US" sz="2800" dirty="0" err="1"/>
-              <a:t>vt_path</a:t>
-            </a:r>
-            <a:r>
-              <a:rPr lang="en-US" sz="2800" dirty="0"/>
-              <a:t>()</a:t>
-            </a:r>
-          </a:p>
-          <a:p>
-            <a:pPr marL="742950" lvl="1" indent="-285750">
-              <a:buFont typeface="Arial" panose="020B0604020202020204" pitchFamily="34" charset="0"/>
-              <a:buChar char="•"/>
-            </a:pPr>
-            <a:r>
-              <a:rPr lang="en-US" sz="2800" dirty="0"/>
-              <a:t>here::here(), but for validation contents</a:t>
-            </a:r>
-          </a:p>
-          <a:p>
-            <a:pPr lvl="1"/>
-            <a:endParaRPr lang="en-US" sz="2800" dirty="0"/>
-          </a:p>
-          <a:p>
-            <a:pPr marL="285750" indent="-285750">
-              <a:buFont typeface="Arial" panose="020B0604020202020204" pitchFamily="34" charset="0"/>
-              <a:buChar char="•"/>
-            </a:pPr>
-            <a:r>
-              <a:rPr lang="en-US" sz="2800" dirty="0" err="1"/>
-              <a:t>vt_file</a:t>
-            </a:r>
-            <a:r>
-              <a:rPr lang="en-US" sz="2800" dirty="0"/>
-              <a:t>()</a:t>
-            </a:r>
-          </a:p>
-          <a:p>
-            <a:pPr marL="742950" lvl="1" indent="-285750">
-              <a:buFont typeface="Arial" panose="020B0604020202020204" pitchFamily="34" charset="0"/>
-              <a:buChar char="•"/>
-            </a:pPr>
-            <a:r>
-              <a:rPr lang="en-US" sz="2800" dirty="0"/>
-              <a:t>Renders contents based on extensions</a:t>
-            </a:r>
-          </a:p>
-          <a:p>
-            <a:pPr marL="1200150" lvl="2" indent="-285750">
-              <a:buFont typeface="Arial" panose="020B0604020202020204" pitchFamily="34" charset="0"/>
-              <a:buChar char="•"/>
-            </a:pPr>
-            <a:r>
-              <a:rPr lang="en-US" sz="2800" dirty="0"/>
-              <a:t>Rmd parsed</a:t>
-            </a:r>
-          </a:p>
-          <a:p>
-            <a:pPr marL="1200150" lvl="2" indent="-285750">
-              <a:buFont typeface="Arial" panose="020B0604020202020204" pitchFamily="34" charset="0"/>
-              <a:buChar char="•"/>
-            </a:pPr>
-            <a:r>
-              <a:rPr lang="en-US" sz="2800" dirty="0"/>
-              <a:t>Test code executed and results captured</a:t>
-            </a:r>
-          </a:p>
-          <a:p>
-            <a:pPr marL="1200150" lvl="2" indent="-285750">
-              <a:buFont typeface="Arial" panose="020B0604020202020204" pitchFamily="34" charset="0"/>
-              <a:buChar char="•"/>
-            </a:pPr>
-            <a:r>
-              <a:rPr lang="en-US" sz="2800" dirty="0"/>
-              <a:t>Any other file contents are printed</a:t>
-            </a:r>
-          </a:p>
-        </p:txBody>
-      </p:sp>
-    </p:spTree>
-    <p:extLst>
-      <p:ext uri="{BB962C8B-B14F-4D97-AF65-F5344CB8AC3E}">
-        <p14:creationId xmlns:p14="http://schemas.microsoft.com/office/powerpoint/2010/main" val="595098644"/>
       </p:ext>
     </p:extLst>
   </p:cSld>
@@ -9036,7 +6626,7 @@
           <p:cNvPr id="2" name="Title 1">
             <a:extLst>
               <a:ext uri="{FF2B5EF4-FFF2-40B4-BE49-F238E27FC236}">
-                <a16:creationId xmlns="" xmlns:a16="http://schemas.microsoft.com/office/drawing/2014/main" id="{749E0D1B-C9EF-4CB6-9922-ED9D4AC52C59}"/>
+                <a16:creationId xmlns:a16="http://schemas.microsoft.com/office/drawing/2014/main" xmlns="" id="{749E0D1B-C9EF-4CB6-9922-ED9D4AC52C59}"/>
               </a:ext>
             </a:extLst>
           </p:cNvPr>
@@ -9064,7 +6654,7 @@
           <p:cNvPr id="5" name="Content Placeholder 4">
             <a:extLst>
               <a:ext uri="{FF2B5EF4-FFF2-40B4-BE49-F238E27FC236}">
-                <a16:creationId xmlns="" xmlns:a16="http://schemas.microsoft.com/office/drawing/2014/main" id="{7E558183-391D-4056-BC02-A181C5440B05}"/>
+                <a16:creationId xmlns:a16="http://schemas.microsoft.com/office/drawing/2014/main" xmlns="" id="{7E558183-391D-4056-BC02-A181C5440B05}"/>
               </a:ext>
             </a:extLst>
           </p:cNvPr>
@@ -9116,768 +6706,6 @@
     <p:extLst>
       <p:ext uri="{BB962C8B-B14F-4D97-AF65-F5344CB8AC3E}">
         <p14:creationId xmlns:p14="http://schemas.microsoft.com/office/powerpoint/2010/main" val="1601236187"/>
-      </p:ext>
-    </p:extLst>
-  </p:cSld>
-  <p:clrMapOvr>
-    <a:masterClrMapping/>
-  </p:clrMapOvr>
-</p:sld>
-</file>
-
-<file path=ppt/slides/slide20.xml><?xml version="1.0" encoding="utf-8"?>
-<p:sld xmlns:a="http://schemas.openxmlformats.org/drawingml/2006/main" xmlns:r="http://schemas.openxmlformats.org/officeDocument/2006/relationships" xmlns:p="http://schemas.openxmlformats.org/presentationml/2006/main">
-  <p:cSld>
-    <p:spTree>
-      <p:nvGrpSpPr>
-        <p:cNvPr id="1" name=""/>
-        <p:cNvGrpSpPr/>
-        <p:nvPr/>
-      </p:nvGrpSpPr>
-      <p:grpSpPr>
-        <a:xfrm>
-          <a:off x="0" y="0"/>
-          <a:ext cx="0" cy="0"/>
-          <a:chOff x="0" y="0"/>
-          <a:chExt cx="0" cy="0"/>
-        </a:xfrm>
-      </p:grpSpPr>
-      <p:sp>
-        <p:nvSpPr>
-          <p:cNvPr id="8" name="Title 7">
-            <a:extLst>
-              <a:ext uri="{FF2B5EF4-FFF2-40B4-BE49-F238E27FC236}">
-                <a16:creationId xmlns="" xmlns:a16="http://schemas.microsoft.com/office/drawing/2014/main" id="{6A34AC25-F9D4-48D7-A664-C590D06BF559}"/>
-              </a:ext>
-            </a:extLst>
-          </p:cNvPr>
-          <p:cNvSpPr>
-            <a:spLocks noGrp="1"/>
-          </p:cNvSpPr>
-          <p:nvPr>
-            <p:ph type="title"/>
-          </p:nvPr>
-        </p:nvSpPr>
-        <p:spPr/>
-        <p:txBody>
-          <a:bodyPr/>
-          <a:lstStyle/>
-          <a:p>
-            <a:r>
-              <a:rPr lang="en-US" dirty="0"/>
-              <a:t>Child Files</a:t>
-            </a:r>
-          </a:p>
-        </p:txBody>
-      </p:sp>
-      <p:sp>
-        <p:nvSpPr>
-          <p:cNvPr id="11" name="TextBox 10">
-            <a:extLst>
-              <a:ext uri="{FF2B5EF4-FFF2-40B4-BE49-F238E27FC236}">
-                <a16:creationId xmlns="" xmlns:a16="http://schemas.microsoft.com/office/drawing/2014/main" id="{F1F3DA2E-9599-4B03-A261-D34A77F831CE}"/>
-              </a:ext>
-            </a:extLst>
-          </p:cNvPr>
-          <p:cNvSpPr txBox="1"/>
-          <p:nvPr/>
-        </p:nvSpPr>
-        <p:spPr>
-          <a:xfrm>
-            <a:off x="1552508" y="1859452"/>
-            <a:ext cx="10186778" cy="5570756"/>
-          </a:xfrm>
-          <a:prstGeom prst="rect">
-            <a:avLst/>
-          </a:prstGeom>
-          <a:noFill/>
-        </p:spPr>
-        <p:txBody>
-          <a:bodyPr wrap="square" rtlCol="0">
-            <a:spAutoFit/>
-          </a:bodyPr>
-          <a:lstStyle/>
-          <a:p>
-            <a:pPr marL="285750" indent="-285750">
-              <a:buFont typeface="Arial" panose="020B0604020202020204" pitchFamily="34" charset="0"/>
-              <a:buChar char="•"/>
-            </a:pPr>
-            <a:r>
-              <a:rPr lang="en-US" sz="2800" dirty="0"/>
-              <a:t>Validation Report contains pointers for repeated evaluation across different validation environments</a:t>
-            </a:r>
-          </a:p>
-          <a:p>
-            <a:endParaRPr lang="en-US" sz="2800" dirty="0"/>
-          </a:p>
-          <a:p>
-            <a:pPr marL="285750" indent="-285750">
-              <a:buFont typeface="Arial" panose="020B0604020202020204" pitchFamily="34" charset="0"/>
-              <a:buChar char="•"/>
-            </a:pPr>
-            <a:r>
-              <a:rPr lang="en-US" sz="2800" dirty="0"/>
-              <a:t>Order of child files can be specified by </a:t>
-            </a:r>
-            <a:r>
-              <a:rPr lang="en-US" sz="2800" dirty="0" err="1"/>
-              <a:t>validation.yml</a:t>
-            </a:r>
-            <a:endParaRPr lang="en-US" sz="2800" dirty="0"/>
-          </a:p>
-          <a:p>
-            <a:pPr marL="742950" lvl="1" indent="-285750">
-              <a:buFont typeface="Arial" panose="020B0604020202020204" pitchFamily="34" charset="0"/>
-              <a:buChar char="•"/>
-            </a:pPr>
-            <a:r>
-              <a:rPr lang="en-US" sz="2000" dirty="0"/>
-              <a:t>Default is grouped by “requirements”, “</a:t>
-            </a:r>
-            <a:r>
-              <a:rPr lang="en-US" sz="2000" dirty="0" err="1"/>
-              <a:t>test_cases</a:t>
-            </a:r>
-            <a:r>
-              <a:rPr lang="en-US" sz="2000" dirty="0"/>
-              <a:t>”, “</a:t>
-            </a:r>
-            <a:r>
-              <a:rPr lang="en-US" sz="2000" dirty="0" err="1"/>
-              <a:t>test_code</a:t>
-            </a:r>
-            <a:r>
-              <a:rPr lang="en-US" sz="2000" dirty="0"/>
-              <a:t>” and then alphabetically</a:t>
-            </a:r>
-          </a:p>
-          <a:p>
-            <a:pPr marL="742950" lvl="1" indent="-285750">
-              <a:buFont typeface="Arial" panose="020B0604020202020204" pitchFamily="34" charset="0"/>
-              <a:buChar char="•"/>
-            </a:pPr>
-            <a:r>
-              <a:rPr lang="en-US" sz="2000" dirty="0"/>
-              <a:t>Control via </a:t>
-            </a:r>
-            <a:r>
-              <a:rPr lang="en-US" sz="2000" dirty="0" err="1"/>
-              <a:t>vt_get_child_files</a:t>
-            </a:r>
-            <a:r>
-              <a:rPr lang="en-US" sz="2000" dirty="0"/>
-              <a:t>()</a:t>
-            </a:r>
-          </a:p>
-          <a:p>
-            <a:pPr lvl="1"/>
-            <a:endParaRPr lang="en-US" sz="2800" dirty="0"/>
-          </a:p>
-          <a:p>
-            <a:pPr marL="285750" indent="-285750">
-              <a:buFont typeface="Arial" panose="020B0604020202020204" pitchFamily="34" charset="0"/>
-              <a:buChar char="•"/>
-            </a:pPr>
-            <a:r>
-              <a:rPr lang="en-US" sz="2800" dirty="0" err="1"/>
-              <a:t>vt_add_file_to_config</a:t>
-            </a:r>
-            <a:r>
-              <a:rPr lang="en-US" sz="2800" dirty="0"/>
-              <a:t>() &amp; </a:t>
-            </a:r>
-            <a:r>
-              <a:rPr lang="en-US" sz="2800" dirty="0" err="1"/>
-              <a:t>vt_drop_file_from_config</a:t>
-            </a:r>
-            <a:r>
-              <a:rPr lang="en-US" sz="2800" dirty="0"/>
-              <a:t>()</a:t>
-            </a:r>
-          </a:p>
-          <a:p>
-            <a:pPr marL="742950" lvl="1" indent="-285750">
-              <a:buFont typeface="Arial" panose="020B0604020202020204" pitchFamily="34" charset="0"/>
-              <a:buChar char="•"/>
-            </a:pPr>
-            <a:r>
-              <a:rPr lang="en-US" sz="2400" dirty="0"/>
-              <a:t>Specify validation file (req, test case, test code)</a:t>
-            </a:r>
-          </a:p>
-          <a:p>
-            <a:pPr marL="742950" lvl="1" indent="-285750">
-              <a:buFont typeface="Arial" panose="020B0604020202020204" pitchFamily="34" charset="0"/>
-              <a:buChar char="•"/>
-            </a:pPr>
-            <a:r>
-              <a:rPr lang="en-US" sz="2400" dirty="0"/>
-              <a:t>Specify which file to add after/before using </a:t>
-            </a:r>
-            <a:r>
-              <a:rPr lang="en-US" sz="2400" dirty="0" err="1"/>
-              <a:t>tidyselect</a:t>
-            </a:r>
-            <a:r>
-              <a:rPr lang="en-US" sz="2400" dirty="0"/>
-              <a:t> syntax</a:t>
-            </a:r>
-          </a:p>
-          <a:p>
-            <a:pPr marL="742950" lvl="1" indent="-285750">
-              <a:buFont typeface="Arial" panose="020B0604020202020204" pitchFamily="34" charset="0"/>
-              <a:buChar char="•"/>
-            </a:pPr>
-            <a:r>
-              <a:rPr lang="en-US" sz="2400" dirty="0"/>
-              <a:t>Files added by default to the end by </a:t>
-            </a:r>
-            <a:r>
-              <a:rPr lang="en-US" sz="2400" dirty="0" err="1"/>
-              <a:t>vt_use</a:t>
-            </a:r>
-            <a:r>
-              <a:rPr lang="en-US" sz="2400" dirty="0"/>
-              <a:t>_*</a:t>
-            </a:r>
-          </a:p>
-          <a:p>
-            <a:pPr marL="285750" indent="-285750">
-              <a:buFont typeface="Arial" panose="020B0604020202020204" pitchFamily="34" charset="0"/>
-              <a:buChar char="•"/>
-            </a:pPr>
-            <a:endParaRPr lang="en-US" sz="2800" dirty="0"/>
-          </a:p>
-          <a:p>
-            <a:pPr marL="285750" indent="-285750">
-              <a:buFont typeface="Arial" panose="020B0604020202020204" pitchFamily="34" charset="0"/>
-              <a:buChar char="•"/>
-            </a:pPr>
-            <a:endParaRPr lang="en-US" sz="2800" dirty="0"/>
-          </a:p>
-        </p:txBody>
-      </p:sp>
-    </p:spTree>
-    <p:extLst>
-      <p:ext uri="{BB962C8B-B14F-4D97-AF65-F5344CB8AC3E}">
-        <p14:creationId xmlns:p14="http://schemas.microsoft.com/office/powerpoint/2010/main" val="1817017544"/>
-      </p:ext>
-    </p:extLst>
-  </p:cSld>
-  <p:clrMapOvr>
-    <a:masterClrMapping/>
-  </p:clrMapOvr>
-</p:sld>
-</file>
-
-<file path=ppt/slides/slide21.xml><?xml version="1.0" encoding="utf-8"?>
-<p:sld xmlns:a="http://schemas.openxmlformats.org/drawingml/2006/main" xmlns:r="http://schemas.openxmlformats.org/officeDocument/2006/relationships" xmlns:p="http://schemas.openxmlformats.org/presentationml/2006/main">
-  <p:cSld>
-    <p:spTree>
-      <p:nvGrpSpPr>
-        <p:cNvPr id="1" name=""/>
-        <p:cNvGrpSpPr/>
-        <p:nvPr/>
-      </p:nvGrpSpPr>
-      <p:grpSpPr>
-        <a:xfrm>
-          <a:off x="0" y="0"/>
-          <a:ext cx="0" cy="0"/>
-          <a:chOff x="0" y="0"/>
-          <a:chExt cx="0" cy="0"/>
-        </a:xfrm>
-      </p:grpSpPr>
-      <p:sp>
-        <p:nvSpPr>
-          <p:cNvPr id="8" name="Title 7">
-            <a:extLst>
-              <a:ext uri="{FF2B5EF4-FFF2-40B4-BE49-F238E27FC236}">
-                <a16:creationId xmlns="" xmlns:a16="http://schemas.microsoft.com/office/drawing/2014/main" id="{6A34AC25-F9D4-48D7-A664-C590D06BF559}"/>
-              </a:ext>
-            </a:extLst>
-          </p:cNvPr>
-          <p:cNvSpPr>
-            <a:spLocks noGrp="1"/>
-          </p:cNvSpPr>
-          <p:nvPr>
-            <p:ph type="title"/>
-          </p:nvPr>
-        </p:nvSpPr>
-        <p:spPr/>
-        <p:txBody>
-          <a:bodyPr/>
-          <a:lstStyle/>
-          <a:p>
-            <a:r>
-              <a:rPr lang="en-US" dirty="0"/>
-              <a:t>Rendering Reports</a:t>
-            </a:r>
-          </a:p>
-        </p:txBody>
-      </p:sp>
-      <p:sp>
-        <p:nvSpPr>
-          <p:cNvPr id="5" name="TextBox 4">
-            <a:extLst>
-              <a:ext uri="{FF2B5EF4-FFF2-40B4-BE49-F238E27FC236}">
-                <a16:creationId xmlns="" xmlns:a16="http://schemas.microsoft.com/office/drawing/2014/main" id="{EF5BA94D-0FB3-4C60-9994-8A309B690D97}"/>
-              </a:ext>
-            </a:extLst>
-          </p:cNvPr>
-          <p:cNvSpPr txBox="1"/>
-          <p:nvPr/>
-        </p:nvSpPr>
-        <p:spPr>
-          <a:xfrm>
-            <a:off x="1286933" y="2218267"/>
-            <a:ext cx="10905067" cy="1384995"/>
-          </a:xfrm>
-          <a:prstGeom prst="rect">
-            <a:avLst/>
-          </a:prstGeom>
-          <a:noFill/>
-        </p:spPr>
-        <p:txBody>
-          <a:bodyPr wrap="square" rtlCol="0">
-            <a:spAutoFit/>
-          </a:bodyPr>
-          <a:lstStyle/>
-          <a:p>
-            <a:pPr marL="285750" indent="-285750">
-              <a:buFont typeface="Arial" panose="020B0604020202020204" pitchFamily="34" charset="0"/>
-              <a:buChar char="•"/>
-            </a:pPr>
-            <a:r>
-              <a:rPr lang="en-US" sz="2800" dirty="0" err="1"/>
-              <a:t>vt_validate_report</a:t>
-            </a:r>
-            <a:r>
-              <a:rPr lang="en-US" sz="2800" dirty="0"/>
-              <a:t>() executes the Rmd and saves output</a:t>
-            </a:r>
-          </a:p>
-          <a:p>
-            <a:pPr marL="285750" indent="-285750">
-              <a:buFont typeface="Arial" panose="020B0604020202020204" pitchFamily="34" charset="0"/>
-              <a:buChar char="•"/>
-            </a:pPr>
-            <a:endParaRPr lang="en-US" sz="2800" dirty="0"/>
-          </a:p>
-          <a:p>
-            <a:pPr marL="285750" indent="-285750">
-              <a:buFont typeface="Arial" panose="020B0604020202020204" pitchFamily="34" charset="0"/>
-              <a:buChar char="•"/>
-            </a:pPr>
-            <a:r>
-              <a:rPr lang="en-US" sz="2800" dirty="0"/>
-              <a:t>Serves as “snapshot” in time</a:t>
-            </a:r>
-          </a:p>
-        </p:txBody>
-      </p:sp>
-    </p:spTree>
-    <p:extLst>
-      <p:ext uri="{BB962C8B-B14F-4D97-AF65-F5344CB8AC3E}">
-        <p14:creationId xmlns:p14="http://schemas.microsoft.com/office/powerpoint/2010/main" val="156219768"/>
-      </p:ext>
-    </p:extLst>
-  </p:cSld>
-  <p:clrMapOvr>
-    <a:masterClrMapping/>
-  </p:clrMapOvr>
-</p:sld>
-</file>
-
-<file path=ppt/slides/slide22.xml><?xml version="1.0" encoding="utf-8"?>
-<p:sld xmlns:a="http://schemas.openxmlformats.org/drawingml/2006/main" xmlns:r="http://schemas.openxmlformats.org/officeDocument/2006/relationships" xmlns:p="http://schemas.openxmlformats.org/presentationml/2006/main">
-  <p:cSld>
-    <p:spTree>
-      <p:nvGrpSpPr>
-        <p:cNvPr id="1" name=""/>
-        <p:cNvGrpSpPr/>
-        <p:nvPr/>
-      </p:nvGrpSpPr>
-      <p:grpSpPr>
-        <a:xfrm>
-          <a:off x="0" y="0"/>
-          <a:ext cx="0" cy="0"/>
-          <a:chOff x="0" y="0"/>
-          <a:chExt cx="0" cy="0"/>
-        </a:xfrm>
-      </p:grpSpPr>
-      <p:sp>
-        <p:nvSpPr>
-          <p:cNvPr id="2" name="Title 1">
-            <a:extLst>
-              <a:ext uri="{FF2B5EF4-FFF2-40B4-BE49-F238E27FC236}">
-                <a16:creationId xmlns="" xmlns:a16="http://schemas.microsoft.com/office/drawing/2014/main" id="{7614332B-4F24-42F4-A704-A6F1183E9470}"/>
-              </a:ext>
-            </a:extLst>
-          </p:cNvPr>
-          <p:cNvSpPr>
-            <a:spLocks noGrp="1"/>
-          </p:cNvSpPr>
-          <p:nvPr>
-            <p:ph type="ctrTitle"/>
-          </p:nvPr>
-        </p:nvSpPr>
-        <p:spPr/>
-        <p:txBody>
-          <a:bodyPr>
-            <a:normAutofit fontScale="90000"/>
-          </a:bodyPr>
-          <a:lstStyle/>
-          <a:p>
-            <a:r>
-              <a:rPr lang="en-US" dirty="0" smtClean="0"/>
-              <a:t>Complete</a:t>
-            </a:r>
-            <a:br>
-              <a:rPr lang="en-US" dirty="0" smtClean="0"/>
-            </a:br>
-            <a:r>
-              <a:rPr lang="en-US" dirty="0" smtClean="0"/>
-              <a:t/>
-            </a:r>
-            <a:br>
-              <a:rPr lang="en-US" dirty="0" smtClean="0"/>
-            </a:br>
-            <a:r>
-              <a:rPr lang="en-US" dirty="0" smtClean="0"/>
-              <a:t>Exercise 4 Task B</a:t>
-            </a:r>
-            <a:endParaRPr lang="en-US" dirty="0"/>
-          </a:p>
-        </p:txBody>
-      </p:sp>
-    </p:spTree>
-    <p:extLst>
-      <p:ext uri="{BB962C8B-B14F-4D97-AF65-F5344CB8AC3E}">
-        <p14:creationId xmlns:p14="http://schemas.microsoft.com/office/powerpoint/2010/main" val="698351775"/>
-      </p:ext>
-    </p:extLst>
-  </p:cSld>
-  <p:clrMapOvr>
-    <a:masterClrMapping/>
-  </p:clrMapOvr>
-</p:sld>
-</file>
-
-<file path=ppt/slides/slide23.xml><?xml version="1.0" encoding="utf-8"?>
-<p:sld xmlns:a="http://schemas.openxmlformats.org/drawingml/2006/main" xmlns:r="http://schemas.openxmlformats.org/officeDocument/2006/relationships" xmlns:p="http://schemas.openxmlformats.org/presentationml/2006/main">
-  <p:cSld>
-    <p:spTree>
-      <p:nvGrpSpPr>
-        <p:cNvPr id="1" name=""/>
-        <p:cNvGrpSpPr/>
-        <p:nvPr/>
-      </p:nvGrpSpPr>
-      <p:grpSpPr>
-        <a:xfrm>
-          <a:off x="0" y="0"/>
-          <a:ext cx="0" cy="0"/>
-          <a:chOff x="0" y="0"/>
-          <a:chExt cx="0" cy="0"/>
-        </a:xfrm>
-      </p:grpSpPr>
-      <p:sp>
-        <p:nvSpPr>
-          <p:cNvPr id="2" name="Title 1">
-            <a:extLst>
-              <a:ext uri="{FF2B5EF4-FFF2-40B4-BE49-F238E27FC236}">
-                <a16:creationId xmlns="" xmlns:a16="http://schemas.microsoft.com/office/drawing/2014/main" id="{7614332B-4F24-42F4-A704-A6F1183E9470}"/>
-              </a:ext>
-            </a:extLst>
-          </p:cNvPr>
-          <p:cNvSpPr>
-            <a:spLocks noGrp="1"/>
-          </p:cNvSpPr>
-          <p:nvPr>
-            <p:ph type="ctrTitle"/>
-          </p:nvPr>
-        </p:nvSpPr>
-        <p:spPr>
-          <a:xfrm>
-            <a:off x="1629102" y="2409722"/>
-            <a:ext cx="8933796" cy="2437232"/>
-          </a:xfrm>
-        </p:spPr>
-        <p:txBody>
-          <a:bodyPr>
-            <a:normAutofit/>
-          </a:bodyPr>
-          <a:lstStyle/>
-          <a:p>
-            <a:r>
-              <a:rPr lang="en-US" dirty="0" smtClean="0"/>
-              <a:t>Report Ordering</a:t>
-            </a:r>
-            <a:endParaRPr lang="en-US" dirty="0"/>
-          </a:p>
-        </p:txBody>
-      </p:sp>
-    </p:spTree>
-    <p:extLst>
-      <p:ext uri="{BB962C8B-B14F-4D97-AF65-F5344CB8AC3E}">
-        <p14:creationId xmlns:p14="http://schemas.microsoft.com/office/powerpoint/2010/main" val="2930426486"/>
-      </p:ext>
-    </p:extLst>
-  </p:cSld>
-  <p:clrMapOvr>
-    <a:masterClrMapping/>
-  </p:clrMapOvr>
-</p:sld>
-</file>
-
-<file path=ppt/slides/slide24.xml><?xml version="1.0" encoding="utf-8"?>
-<p:sld xmlns:a="http://schemas.openxmlformats.org/drawingml/2006/main" xmlns:r="http://schemas.openxmlformats.org/officeDocument/2006/relationships" xmlns:p="http://schemas.openxmlformats.org/presentationml/2006/main">
-  <p:cSld>
-    <p:spTree>
-      <p:nvGrpSpPr>
-        <p:cNvPr id="1" name=""/>
-        <p:cNvGrpSpPr/>
-        <p:nvPr/>
-      </p:nvGrpSpPr>
-      <p:grpSpPr>
-        <a:xfrm>
-          <a:off x="0" y="0"/>
-          <a:ext cx="0" cy="0"/>
-          <a:chOff x="0" y="0"/>
-          <a:chExt cx="0" cy="0"/>
-        </a:xfrm>
-      </p:grpSpPr>
-      <p:sp>
-        <p:nvSpPr>
-          <p:cNvPr id="2" name="Title 1">
-            <a:extLst>
-              <a:ext uri="{FF2B5EF4-FFF2-40B4-BE49-F238E27FC236}">
-                <a16:creationId xmlns="" xmlns:a16="http://schemas.microsoft.com/office/drawing/2014/main" id="{749E0D1B-C9EF-4CB6-9922-ED9D4AC52C59}"/>
-              </a:ext>
-            </a:extLst>
-          </p:cNvPr>
-          <p:cNvSpPr>
-            <a:spLocks noGrp="1"/>
-          </p:cNvSpPr>
-          <p:nvPr>
-            <p:ph type="title"/>
-          </p:nvPr>
-        </p:nvSpPr>
-        <p:spPr/>
-        <p:txBody>
-          <a:bodyPr>
-            <a:normAutofit fontScale="90000"/>
-          </a:bodyPr>
-          <a:lstStyle/>
-          <a:p>
-            <a:r>
-              <a:rPr lang="en-US" dirty="0"/>
-              <a:t>Validation Reporting </a:t>
-            </a:r>
-            <a:r>
-              <a:rPr lang="en-US" dirty="0" smtClean="0"/>
-              <a:t>Order– </a:t>
-            </a:r>
-            <a:r>
-              <a:rPr lang="en-US" dirty="0"/>
-              <a:t/>
-            </a:r>
-            <a:br>
-              <a:rPr lang="en-US" dirty="0"/>
-            </a:br>
-            <a:r>
-              <a:rPr lang="en-US" sz="3100" dirty="0" smtClean="0"/>
-              <a:t>How does </a:t>
-            </a:r>
-            <a:r>
-              <a:rPr lang="en-US" sz="3100" dirty="0" err="1" smtClean="0"/>
-              <a:t>valtools</a:t>
-            </a:r>
-            <a:r>
-              <a:rPr lang="en-US" sz="3100" dirty="0" smtClean="0"/>
-              <a:t> know the order to report everything</a:t>
-            </a:r>
-            <a:endParaRPr lang="en-US" dirty="0"/>
-          </a:p>
-        </p:txBody>
-      </p:sp>
-      <p:sp>
-        <p:nvSpPr>
-          <p:cNvPr id="5" name="Content Placeholder 4">
-            <a:extLst>
-              <a:ext uri="{FF2B5EF4-FFF2-40B4-BE49-F238E27FC236}">
-                <a16:creationId xmlns="" xmlns:a16="http://schemas.microsoft.com/office/drawing/2014/main" id="{7E558183-391D-4056-BC02-A181C5440B05}"/>
-              </a:ext>
-            </a:extLst>
-          </p:cNvPr>
-          <p:cNvSpPr>
-            <a:spLocks noGrp="1"/>
-          </p:cNvSpPr>
-          <p:nvPr>
-            <p:ph idx="1"/>
-          </p:nvPr>
-        </p:nvSpPr>
-        <p:spPr/>
-        <p:txBody>
-          <a:bodyPr>
-            <a:normAutofit/>
-          </a:bodyPr>
-          <a:lstStyle/>
-          <a:p>
-            <a:pPr lvl="1"/>
-            <a:r>
-              <a:rPr lang="en-US" sz="3000" dirty="0" err="1" smtClean="0"/>
-              <a:t>validation.yml</a:t>
-            </a:r>
-            <a:endParaRPr lang="en-US" sz="3000" dirty="0" smtClean="0"/>
-          </a:p>
-          <a:p>
-            <a:pPr lvl="1"/>
-            <a:r>
-              <a:rPr lang="en-US" sz="3000" dirty="0" smtClean="0"/>
-              <a:t>Updated as </a:t>
-            </a:r>
-            <a:r>
-              <a:rPr lang="en-US" sz="3000" dirty="0" err="1" smtClean="0"/>
-              <a:t>vt_use</a:t>
-            </a:r>
-            <a:r>
-              <a:rPr lang="en-US" sz="3000" dirty="0" smtClean="0"/>
-              <a:t>_* called</a:t>
-            </a:r>
-            <a:endParaRPr lang="en-US" sz="3000" dirty="0"/>
-          </a:p>
-          <a:p>
-            <a:pPr lvl="2"/>
-            <a:r>
-              <a:rPr lang="en-US" sz="2900" dirty="0" smtClean="0"/>
-              <a:t>On creation call, can set location</a:t>
-            </a:r>
-          </a:p>
-          <a:p>
-            <a:pPr lvl="2"/>
-            <a:r>
-              <a:rPr lang="en-US" sz="2900" dirty="0" smtClean="0"/>
-              <a:t>Edit </a:t>
-            </a:r>
-            <a:r>
-              <a:rPr lang="en-US" sz="2900" dirty="0" err="1" smtClean="0"/>
-              <a:t>yml</a:t>
-            </a:r>
-            <a:r>
-              <a:rPr lang="en-US" sz="2900" dirty="0" smtClean="0"/>
-              <a:t> directly or relocate through:</a:t>
-            </a:r>
-          </a:p>
-          <a:p>
-            <a:pPr lvl="3"/>
-            <a:r>
-              <a:rPr lang="en-US" sz="2900" dirty="0" err="1" smtClean="0"/>
-              <a:t>vt_drop_file_from_config</a:t>
-            </a:r>
-            <a:r>
-              <a:rPr lang="en-US" sz="2900" dirty="0" smtClean="0"/>
-              <a:t>()</a:t>
-            </a:r>
-          </a:p>
-          <a:p>
-            <a:pPr lvl="3"/>
-            <a:r>
-              <a:rPr lang="en-US" sz="2900" dirty="0" err="1" smtClean="0"/>
-              <a:t>Vt_add_file_to_config</a:t>
-            </a:r>
-            <a:r>
-              <a:rPr lang="en-US" sz="2900" dirty="0" smtClean="0"/>
-              <a:t>()</a:t>
-            </a:r>
-          </a:p>
-          <a:p>
-            <a:pPr lvl="2"/>
-            <a:endParaRPr lang="en-US" sz="2900" dirty="0"/>
-          </a:p>
-        </p:txBody>
-      </p:sp>
-    </p:spTree>
-    <p:extLst>
-      <p:ext uri="{BB962C8B-B14F-4D97-AF65-F5344CB8AC3E}">
-        <p14:creationId xmlns:p14="http://schemas.microsoft.com/office/powerpoint/2010/main" val="2748082673"/>
-      </p:ext>
-    </p:extLst>
-  </p:cSld>
-  <p:clrMapOvr>
-    <a:masterClrMapping/>
-  </p:clrMapOvr>
-</p:sld>
-</file>
-
-<file path=ppt/slides/slide25.xml><?xml version="1.0" encoding="utf-8"?>
-<p:sld xmlns:a="http://schemas.openxmlformats.org/drawingml/2006/main" xmlns:r="http://schemas.openxmlformats.org/officeDocument/2006/relationships" xmlns:p="http://schemas.openxmlformats.org/presentationml/2006/main">
-  <p:cSld>
-    <p:spTree>
-      <p:nvGrpSpPr>
-        <p:cNvPr id="1" name=""/>
-        <p:cNvGrpSpPr/>
-        <p:nvPr/>
-      </p:nvGrpSpPr>
-      <p:grpSpPr>
-        <a:xfrm>
-          <a:off x="0" y="0"/>
-          <a:ext cx="0" cy="0"/>
-          <a:chOff x="0" y="0"/>
-          <a:chExt cx="0" cy="0"/>
-        </a:xfrm>
-      </p:grpSpPr>
-      <p:sp>
-        <p:nvSpPr>
-          <p:cNvPr id="2" name="Title 1">
-            <a:extLst>
-              <a:ext uri="{FF2B5EF4-FFF2-40B4-BE49-F238E27FC236}">
-                <a16:creationId xmlns="" xmlns:a16="http://schemas.microsoft.com/office/drawing/2014/main" id="{7614332B-4F24-42F4-A704-A6F1183E9470}"/>
-              </a:ext>
-            </a:extLst>
-          </p:cNvPr>
-          <p:cNvSpPr>
-            <a:spLocks noGrp="1"/>
-          </p:cNvSpPr>
-          <p:nvPr>
-            <p:ph type="ctrTitle"/>
-          </p:nvPr>
-        </p:nvSpPr>
-        <p:spPr/>
-        <p:txBody>
-          <a:bodyPr>
-            <a:normAutofit fontScale="90000"/>
-          </a:bodyPr>
-          <a:lstStyle/>
-          <a:p>
-            <a:r>
-              <a:rPr lang="en-US" dirty="0" smtClean="0"/>
-              <a:t>Complete</a:t>
-            </a:r>
-            <a:br>
-              <a:rPr lang="en-US" dirty="0" smtClean="0"/>
-            </a:br>
-            <a:r>
-              <a:rPr lang="en-US" dirty="0" smtClean="0"/>
-              <a:t/>
-            </a:r>
-            <a:br>
-              <a:rPr lang="en-US" dirty="0" smtClean="0"/>
-            </a:br>
-            <a:r>
-              <a:rPr lang="en-US" dirty="0" smtClean="0"/>
-              <a:t>Exercise 4 Task </a:t>
-            </a:r>
-            <a:r>
-              <a:rPr lang="en-US" dirty="0"/>
-              <a:t>C</a:t>
-            </a:r>
-          </a:p>
-        </p:txBody>
-      </p:sp>
-    </p:spTree>
-    <p:extLst>
-      <p:ext uri="{BB962C8B-B14F-4D97-AF65-F5344CB8AC3E}">
-        <p14:creationId xmlns:p14="http://schemas.microsoft.com/office/powerpoint/2010/main" val="3354662575"/>
       </p:ext>
     </p:extLst>
   </p:cSld>
@@ -9909,7 +6737,7 @@
           <p:cNvPr id="2" name="Title 1">
             <a:extLst>
               <a:ext uri="{FF2B5EF4-FFF2-40B4-BE49-F238E27FC236}">
-                <a16:creationId xmlns="" xmlns:a16="http://schemas.microsoft.com/office/drawing/2014/main" id="{7614332B-4F24-42F4-A704-A6F1183E9470}"/>
+                <a16:creationId xmlns:a16="http://schemas.microsoft.com/office/drawing/2014/main" xmlns="" id="{7614332B-4F24-42F4-A704-A6F1183E9470}"/>
               </a:ext>
             </a:extLst>
           </p:cNvPr>
@@ -9967,7 +6795,7 @@
           <p:cNvPr id="2" name="Title 1">
             <a:extLst>
               <a:ext uri="{FF2B5EF4-FFF2-40B4-BE49-F238E27FC236}">
-                <a16:creationId xmlns="" xmlns:a16="http://schemas.microsoft.com/office/drawing/2014/main" id="{749E0D1B-C9EF-4CB6-9922-ED9D4AC52C59}"/>
+                <a16:creationId xmlns:a16="http://schemas.microsoft.com/office/drawing/2014/main" xmlns="" id="{749E0D1B-C9EF-4CB6-9922-ED9D4AC52C59}"/>
               </a:ext>
             </a:extLst>
           </p:cNvPr>
@@ -10003,7 +6831,7 @@
           <p:cNvPr id="5" name="Content Placeholder 4">
             <a:extLst>
               <a:ext uri="{FF2B5EF4-FFF2-40B4-BE49-F238E27FC236}">
-                <a16:creationId xmlns="" xmlns:a16="http://schemas.microsoft.com/office/drawing/2014/main" id="{7E558183-391D-4056-BC02-A181C5440B05}"/>
+                <a16:creationId xmlns:a16="http://schemas.microsoft.com/office/drawing/2014/main" xmlns="" id="{7E558183-391D-4056-BC02-A181C5440B05}"/>
               </a:ext>
             </a:extLst>
           </p:cNvPr>
@@ -10123,7 +6951,7 @@
           <p:cNvPr id="6" name="Picture 5" descr="Screenshot of folder structure expected by valtools for validation elements">
             <a:extLst>
               <a:ext uri="{FF2B5EF4-FFF2-40B4-BE49-F238E27FC236}">
-                <a16:creationId xmlns="" xmlns:a16="http://schemas.microsoft.com/office/drawing/2014/main" id="{E63E870D-0347-4322-B695-F267DBD63E13}"/>
+                <a16:creationId xmlns:a16="http://schemas.microsoft.com/office/drawing/2014/main" xmlns="" id="{E63E870D-0347-4322-B695-F267DBD63E13}"/>
               </a:ext>
             </a:extLst>
           </p:cNvPr>
@@ -10183,7 +7011,7 @@
           <p:cNvPr id="2" name="Title 1">
             <a:extLst>
               <a:ext uri="{FF2B5EF4-FFF2-40B4-BE49-F238E27FC236}">
-                <a16:creationId xmlns="" xmlns:a16="http://schemas.microsoft.com/office/drawing/2014/main" id="{7614332B-4F24-42F4-A704-A6F1183E9470}"/>
+                <a16:creationId xmlns:a16="http://schemas.microsoft.com/office/drawing/2014/main" xmlns="" id="{7614332B-4F24-42F4-A704-A6F1183E9470}"/>
               </a:ext>
             </a:extLst>
           </p:cNvPr>
@@ -10241,7 +7069,7 @@
           <p:cNvPr id="2" name="Title 1">
             <a:extLst>
               <a:ext uri="{FF2B5EF4-FFF2-40B4-BE49-F238E27FC236}">
-                <a16:creationId xmlns="" xmlns:a16="http://schemas.microsoft.com/office/drawing/2014/main" id="{749E0D1B-C9EF-4CB6-9922-ED9D4AC52C59}"/>
+                <a16:creationId xmlns:a16="http://schemas.microsoft.com/office/drawing/2014/main" xmlns="" id="{749E0D1B-C9EF-4CB6-9922-ED9D4AC52C59}"/>
               </a:ext>
             </a:extLst>
           </p:cNvPr>
@@ -10269,7 +7097,7 @@
           <p:cNvPr id="5" name="Content Placeholder 4">
             <a:extLst>
               <a:ext uri="{FF2B5EF4-FFF2-40B4-BE49-F238E27FC236}">
-                <a16:creationId xmlns="" xmlns:a16="http://schemas.microsoft.com/office/drawing/2014/main" id="{7E558183-391D-4056-BC02-A181C5440B05}"/>
+                <a16:creationId xmlns:a16="http://schemas.microsoft.com/office/drawing/2014/main" xmlns="" id="{7E558183-391D-4056-BC02-A181C5440B05}"/>
               </a:ext>
             </a:extLst>
           </p:cNvPr>
@@ -10333,7 +7161,7 @@
           <p:cNvPr id="2" name="Title 1">
             <a:extLst>
               <a:ext uri="{FF2B5EF4-FFF2-40B4-BE49-F238E27FC236}">
-                <a16:creationId xmlns="" xmlns:a16="http://schemas.microsoft.com/office/drawing/2014/main" id="{749E0D1B-C9EF-4CB6-9922-ED9D4AC52C59}"/>
+                <a16:creationId xmlns:a16="http://schemas.microsoft.com/office/drawing/2014/main" xmlns="" id="{749E0D1B-C9EF-4CB6-9922-ED9D4AC52C59}"/>
               </a:ext>
             </a:extLst>
           </p:cNvPr>
@@ -10370,7 +7198,7 @@
           <p:cNvPr id="5" name="Content Placeholder 4">
             <a:extLst>
               <a:ext uri="{FF2B5EF4-FFF2-40B4-BE49-F238E27FC236}">
-                <a16:creationId xmlns="" xmlns:a16="http://schemas.microsoft.com/office/drawing/2014/main" id="{7E558183-391D-4056-BC02-A181C5440B05}"/>
+                <a16:creationId xmlns:a16="http://schemas.microsoft.com/office/drawing/2014/main" xmlns="" id="{7E558183-391D-4056-BC02-A181C5440B05}"/>
               </a:ext>
             </a:extLst>
           </p:cNvPr>
@@ -10445,7 +7273,7 @@
           <p:cNvPr id="2" name="Title 1">
             <a:extLst>
               <a:ext uri="{FF2B5EF4-FFF2-40B4-BE49-F238E27FC236}">
-                <a16:creationId xmlns="" xmlns:a16="http://schemas.microsoft.com/office/drawing/2014/main" id="{749E0D1B-C9EF-4CB6-9922-ED9D4AC52C59}"/>
+                <a16:creationId xmlns:a16="http://schemas.microsoft.com/office/drawing/2014/main" xmlns="" id="{749E0D1B-C9EF-4CB6-9922-ED9D4AC52C59}"/>
               </a:ext>
             </a:extLst>
           </p:cNvPr>
@@ -10483,7 +7311,7 @@
           <p:cNvPr id="5" name="Content Placeholder 4">
             <a:extLst>
               <a:ext uri="{FF2B5EF4-FFF2-40B4-BE49-F238E27FC236}">
-                <a16:creationId xmlns="" xmlns:a16="http://schemas.microsoft.com/office/drawing/2014/main" id="{7E558183-391D-4056-BC02-A181C5440B05}"/>
+                <a16:creationId xmlns:a16="http://schemas.microsoft.com/office/drawing/2014/main" xmlns="" id="{7E558183-391D-4056-BC02-A181C5440B05}"/>
               </a:ext>
             </a:extLst>
           </p:cNvPr>
@@ -10565,7 +7393,7 @@
           <p:cNvPr id="2" name="Title 1">
             <a:extLst>
               <a:ext uri="{FF2B5EF4-FFF2-40B4-BE49-F238E27FC236}">
-                <a16:creationId xmlns="" xmlns:a16="http://schemas.microsoft.com/office/drawing/2014/main" id="{749E0D1B-C9EF-4CB6-9922-ED9D4AC52C59}"/>
+                <a16:creationId xmlns:a16="http://schemas.microsoft.com/office/drawing/2014/main" xmlns="" id="{749E0D1B-C9EF-4CB6-9922-ED9D4AC52C59}"/>
               </a:ext>
             </a:extLst>
           </p:cNvPr>
@@ -10601,7 +7429,7 @@
           <p:cNvPr id="5" name="Content Placeholder 4">
             <a:extLst>
               <a:ext uri="{FF2B5EF4-FFF2-40B4-BE49-F238E27FC236}">
-                <a16:creationId xmlns="" xmlns:a16="http://schemas.microsoft.com/office/drawing/2014/main" id="{7E558183-391D-4056-BC02-A181C5440B05}"/>
+                <a16:creationId xmlns:a16="http://schemas.microsoft.com/office/drawing/2014/main" xmlns="" id="{7E558183-391D-4056-BC02-A181C5440B05}"/>
               </a:ext>
             </a:extLst>
           </p:cNvPr>
@@ -10615,28 +7443,37 @@
         <p:spPr/>
         <p:txBody>
           <a:bodyPr>
-            <a:normAutofit fontScale="92500" lnSpcReduction="20000"/>
+            <a:normAutofit/>
           </a:bodyPr>
           <a:lstStyle/>
           <a:p>
             <a:pPr lvl="1"/>
             <a:r>
+              <a:rPr lang="en-US" sz="2400" b="1" dirty="0"/>
+              <a:t>Key </a:t>
+            </a:r>
+            <a:r>
+              <a:rPr lang="en-US" sz="2400" b="1" dirty="0" smtClean="0"/>
+              <a:t>Arguments</a:t>
+            </a:r>
+          </a:p>
+          <a:p>
+            <a:pPr lvl="1"/>
+            <a:endParaRPr lang="en-US" sz="2400" dirty="0"/>
+          </a:p>
+          <a:p>
+            <a:pPr lvl="2"/>
+            <a:r>
               <a:rPr lang="en-US" sz="2400" dirty="0"/>
-              <a:t>Key Arguments</a:t>
-            </a:r>
-          </a:p>
-          <a:p>
-            <a:pPr lvl="2"/>
-            <a:r>
-              <a:rPr lang="en-US" sz="2400" dirty="0"/>
-              <a:t> name,</a:t>
-            </a:r>
-          </a:p>
-          <a:p>
-            <a:pPr lvl="2"/>
-            <a:r>
-              <a:rPr lang="en-US" sz="2400" dirty="0"/>
-              <a:t> username</a:t>
+              <a:t> </a:t>
+            </a:r>
+            <a:r>
+              <a:rPr lang="en-US" sz="2400" b="1" dirty="0" smtClean="0"/>
+              <a:t>name</a:t>
+            </a:r>
+            <a:r>
+              <a:rPr lang="en-US" sz="2400" dirty="0" smtClean="0"/>
+              <a:t> – Name of the new requirement. Automatically adds an `md` extension</a:t>
             </a:r>
           </a:p>
           <a:p>
@@ -10644,58 +7481,20 @@
             <a:endParaRPr lang="en-US" sz="2400" dirty="0"/>
           </a:p>
           <a:p>
-            <a:pPr lvl="1"/>
-            <a:r>
-              <a:rPr lang="en-US" sz="2500" dirty="0"/>
-              <a:t>Name – requirement name</a:t>
-            </a:r>
-          </a:p>
-          <a:p>
-            <a:pPr lvl="1"/>
-            <a:r>
-              <a:rPr lang="en-US" sz="2500" dirty="0"/>
-              <a:t>Username – Person’s name writing requirement</a:t>
-            </a:r>
-          </a:p>
-          <a:p>
-            <a:pPr lvl="1"/>
-            <a:endParaRPr lang="en-US" sz="2500" dirty="0"/>
-          </a:p>
-          <a:p>
-            <a:pPr lvl="1"/>
-            <a:r>
-              <a:rPr lang="en-US" sz="2500" dirty="0"/>
-              <a:t>Markdown document with proper roxygen headers</a:t>
-            </a:r>
-          </a:p>
-          <a:p>
             <a:pPr lvl="2"/>
             <a:r>
               <a:rPr lang="en-US" sz="2400" dirty="0"/>
-              <a:t>Editor</a:t>
-            </a:r>
-          </a:p>
-          <a:p>
-            <a:pPr lvl="2"/>
-            <a:r>
-              <a:rPr lang="en-US" sz="2400" dirty="0" err="1"/>
-              <a:t>editDate</a:t>
+              <a:t> </a:t>
+            </a:r>
+            <a:r>
+              <a:rPr lang="en-US" sz="2400" b="1" dirty="0" smtClean="0"/>
+              <a:t>username</a:t>
+            </a:r>
+            <a:r>
+              <a:rPr lang="en-US" sz="2400" dirty="0" smtClean="0"/>
+              <a:t> – Name of the person creating the requirement</a:t>
             </a:r>
             <a:endParaRPr lang="en-US" sz="2400" dirty="0"/>
-          </a:p>
-          <a:p>
-            <a:pPr lvl="2"/>
-            <a:r>
-              <a:rPr lang="en-US" sz="2400" dirty="0" err="1"/>
-              <a:t>riskAssessment</a:t>
-            </a:r>
-            <a:endParaRPr lang="en-US" sz="2400" dirty="0"/>
-          </a:p>
-          <a:p>
-            <a:pPr marL="274320" lvl="1" indent="0">
-              <a:buNone/>
-            </a:pPr>
-            <a:endParaRPr lang="en-US" sz="2500" dirty="0"/>
           </a:p>
         </p:txBody>
       </p:sp>
@@ -10982,7 +7781,7 @@
   <a:extraClrSchemeLst/>
   <a:extLst>
     <a:ext uri="{05A4C25C-085E-4340-85A3-A5531E510DB2}">
-      <thm15:themeFamily xmlns="" xmlns:thm15="http://schemas.microsoft.com/office/thememl/2012/main" name="Original 5_01_Win32" id="{77344C68-A3F1-476B-8680-97D7F429B46B}" vid="{89780073-58E8-4DFF-BF29-BA99F8052841}"/>
+      <thm15:themeFamily xmlns:thm15="http://schemas.microsoft.com/office/thememl/2012/main" xmlns="" name="Original 5_01_Win32" id="{77344C68-A3F1-476B-8680-97D7F429B46B}" vid="{89780073-58E8-4DFF-BF29-BA99F8052841}"/>
     </a:ext>
   </a:extLst>
 </a:theme>
@@ -11277,13 +8076,31 @@
   <a:extraClrSchemeLst/>
   <a:extLst>
     <a:ext uri="{05A4C25C-085E-4340-85A3-A5531E510DB2}">
-      <thm15:themeFamily xmlns="" xmlns:thm15="http://schemas.microsoft.com/office/thememl/2012/main" name="Office Theme" id="{62F939B6-93AF-4DB8-9C6B-D6C7DFDC589F}" vid="{4A3C46E8-61CC-4603-A589-7422A47A8E4A}"/>
+      <thm15:themeFamily xmlns:thm15="http://schemas.microsoft.com/office/thememl/2012/main" xmlns="" name="Office Theme" id="{62F939B6-93AF-4DB8-9C6B-D6C7DFDC589F}" vid="{4A3C46E8-61CC-4603-A589-7422A47A8E4A}"/>
     </a:ext>
   </a:extLst>
 </a:theme>
 </file>
 
 <file path=customXml/item1.xml><?xml version="1.0" encoding="utf-8"?>
+<?mso-contentType ?>
+<FormTemplates xmlns="http://schemas.microsoft.com/sharepoint/v3/contenttype/forms">
+  <Display>DocumentLibraryForm</Display>
+  <Edit>DocumentLibraryForm</Edit>
+  <New>DocumentLibraryForm</New>
+</FormTemplates>
+</file>
+
+<file path=customXml/item2.xml><?xml version="1.0" encoding="utf-8"?>
+<p:properties xmlns:p="http://schemas.microsoft.com/office/2006/metadata/properties" xmlns:xsi="http://www.w3.org/2001/XMLSchema-instance" xmlns:pc="http://schemas.microsoft.com/office/infopath/2007/PartnerControls">
+  <documentManagement>
+    <Status xmlns="71af3243-3dd4-4a8d-8c0d-dd76da1f02a5">Not started</Status>
+    <MediaServiceKeyPoints xmlns="71af3243-3dd4-4a8d-8c0d-dd76da1f02a5" xsi:nil="true"/>
+  </documentManagement>
+</p:properties>
+</file>
+
+<file path=customXml/item3.xml><?xml version="1.0" encoding="utf-8"?>
 <ct:contentTypeSchema xmlns:ct="http://schemas.microsoft.com/office/2006/metadata/contentType" xmlns:ma="http://schemas.microsoft.com/office/2006/metadata/properties/metaAttributes" ct:_="" ma:_="" ma:contentTypeName="Document" ma:contentTypeID="0x01010079F111ED35F8CC479449609E8A0923A6" ma:contentTypeVersion="12" ma:contentTypeDescription="Create a new document." ma:contentTypeScope="" ma:versionID="a410dd7f93c95333ffa1b60ed6adedd1">
   <xsd:schema xmlns:xsd="http://www.w3.org/2001/XMLSchema" xmlns:xs="http://www.w3.org/2001/XMLSchema" xmlns:p="http://schemas.microsoft.com/office/2006/metadata/properties" xmlns:ns2="71af3243-3dd4-4a8d-8c0d-dd76da1f02a5" xmlns:ns3="16c05727-aa75-4e4a-9b5f-8a80a1165891" targetNamespace="http://schemas.microsoft.com/office/2006/metadata/properties" ma:root="true" ma:fieldsID="a936d9baba76aa3866493feff160faab" ns2:_="" ns3:_="">
     <xsd:import namespace="71af3243-3dd4-4a8d-8c0d-dd76da1f02a5"/>
@@ -11504,39 +8321,10 @@
 </ct:contentTypeSchema>
 </file>
 
-<file path=customXml/item2.xml><?xml version="1.0" encoding="utf-8"?>
-<p:properties xmlns:p="http://schemas.microsoft.com/office/2006/metadata/properties" xmlns:xsi="http://www.w3.org/2001/XMLSchema-instance" xmlns:pc="http://schemas.microsoft.com/office/infopath/2007/PartnerControls">
-  <documentManagement>
-    <Status xmlns="71af3243-3dd4-4a8d-8c0d-dd76da1f02a5">Not started</Status>
-    <MediaServiceKeyPoints xmlns="71af3243-3dd4-4a8d-8c0d-dd76da1f02a5" xsi:nil="true"/>
-  </documentManagement>
-</p:properties>
-</file>
-
-<file path=customXml/item3.xml><?xml version="1.0" encoding="utf-8"?>
-<?mso-contentType ?>
-<FormTemplates xmlns="http://schemas.microsoft.com/sharepoint/v3/contenttype/forms">
-  <Display>DocumentLibraryForm</Display>
-  <Edit>DocumentLibraryForm</Edit>
-  <New>DocumentLibraryForm</New>
-</FormTemplates>
-</file>
-
 <file path=customXml/itemProps1.xml><?xml version="1.0" encoding="utf-8"?>
-<ds:datastoreItem xmlns:ds="http://schemas.openxmlformats.org/officeDocument/2006/customXml" ds:itemID="{2D276E62-80A3-44DD-9BCC-97ED2B99B57F}">
+<ds:datastoreItem xmlns:ds="http://schemas.openxmlformats.org/officeDocument/2006/customXml" ds:itemID="{CDB58277-F8DF-46FF-84EC-EF41B835E69F}">
   <ds:schemaRefs>
-    <ds:schemaRef ds:uri="http://schemas.microsoft.com/office/2006/metadata/contentType"/>
-    <ds:schemaRef ds:uri="http://schemas.microsoft.com/office/2006/metadata/properties/metaAttributes"/>
-    <ds:schemaRef ds:uri="http://www.w3.org/2001/XMLSchema"/>
-    <ds:schemaRef ds:uri="http://schemas.microsoft.com/office/2006/metadata/properties"/>
-    <ds:schemaRef ds:uri="71af3243-3dd4-4a8d-8c0d-dd76da1f02a5"/>
-    <ds:schemaRef ds:uri="16c05727-aa75-4e4a-9b5f-8a80a1165891"/>
-    <ds:schemaRef ds:uri="http://schemas.microsoft.com/office/2006/documentManagement/types"/>
-    <ds:schemaRef ds:uri="http://schemas.microsoft.com/office/infopath/2007/PartnerControls"/>
-    <ds:schemaRef ds:uri="http://schemas.openxmlformats.org/package/2006/metadata/core-properties"/>
-    <ds:schemaRef ds:uri="http://purl.org/dc/elements/1.1/"/>
-    <ds:schemaRef ds:uri="http://purl.org/dc/terms/"/>
-    <ds:schemaRef ds:uri="http://schemas.microsoft.com/internal/obd"/>
+    <ds:schemaRef ds:uri="http://schemas.microsoft.com/sharepoint/v3/contenttype/forms"/>
   </ds:schemaRefs>
 </ds:datastoreItem>
 </file>
@@ -11559,9 +8347,20 @@
 </file>
 
 <file path=customXml/itemProps3.xml><?xml version="1.0" encoding="utf-8"?>
-<ds:datastoreItem xmlns:ds="http://schemas.openxmlformats.org/officeDocument/2006/customXml" ds:itemID="{CDB58277-F8DF-46FF-84EC-EF41B835E69F}">
+<ds:datastoreItem xmlns:ds="http://schemas.openxmlformats.org/officeDocument/2006/customXml" ds:itemID="{2D276E62-80A3-44DD-9BCC-97ED2B99B57F}">
   <ds:schemaRefs>
-    <ds:schemaRef ds:uri="http://schemas.microsoft.com/sharepoint/v3/contenttype/forms"/>
+    <ds:schemaRef ds:uri="http://schemas.microsoft.com/office/2006/metadata/contentType"/>
+    <ds:schemaRef ds:uri="http://schemas.microsoft.com/office/2006/metadata/properties/metaAttributes"/>
+    <ds:schemaRef ds:uri="http://www.w3.org/2001/XMLSchema"/>
+    <ds:schemaRef ds:uri="http://schemas.microsoft.com/office/2006/metadata/properties"/>
+    <ds:schemaRef ds:uri="71af3243-3dd4-4a8d-8c0d-dd76da1f02a5"/>
+    <ds:schemaRef ds:uri="16c05727-aa75-4e4a-9b5f-8a80a1165891"/>
+    <ds:schemaRef ds:uri="http://schemas.microsoft.com/office/2006/documentManagement/types"/>
+    <ds:schemaRef ds:uri="http://schemas.microsoft.com/office/infopath/2007/PartnerControls"/>
+    <ds:schemaRef ds:uri="http://schemas.openxmlformats.org/package/2006/metadata/core-properties"/>
+    <ds:schemaRef ds:uri="http://purl.org/dc/elements/1.1/"/>
+    <ds:schemaRef ds:uri="http://purl.org/dc/terms/"/>
+    <ds:schemaRef ds:uri="http://schemas.microsoft.com/internal/obd"/>
   </ds:schemaRefs>
 </ds:datastoreItem>
 </file>
</xml_diff>

<commit_message>
updates and streamlining. Cleaned up slide deck 7
</commit_message>
<xml_diff>
--- a/Slides/Slides-04-Elements_of_Validation/Slides-04-Elements_of_Validation.pptx
+++ b/Slides/Slides-04-Elements_of_Validation/Slides-04-Elements_of_Validation.pptx
@@ -12,18 +12,18 @@
     <p:sldId id="262" r:id="rId6"/>
     <p:sldId id="333" r:id="rId7"/>
     <p:sldId id="394" r:id="rId8"/>
-    <p:sldId id="406" r:id="rId9"/>
-    <p:sldId id="393" r:id="rId10"/>
-    <p:sldId id="365" r:id="rId11"/>
-    <p:sldId id="398" r:id="rId12"/>
-    <p:sldId id="267" r:id="rId13"/>
-    <p:sldId id="386" r:id="rId14"/>
-    <p:sldId id="392" r:id="rId15"/>
-    <p:sldId id="405" r:id="rId16"/>
-    <p:sldId id="408" r:id="rId17"/>
-    <p:sldId id="409" r:id="rId18"/>
-    <p:sldId id="410" r:id="rId19"/>
-    <p:sldId id="411" r:id="rId20"/>
+    <p:sldId id="414" r:id="rId9"/>
+    <p:sldId id="406" r:id="rId10"/>
+    <p:sldId id="393" r:id="rId11"/>
+    <p:sldId id="365" r:id="rId12"/>
+    <p:sldId id="398" r:id="rId13"/>
+    <p:sldId id="267" r:id="rId14"/>
+    <p:sldId id="386" r:id="rId15"/>
+    <p:sldId id="392" r:id="rId16"/>
+    <p:sldId id="405" r:id="rId17"/>
+    <p:sldId id="408" r:id="rId18"/>
+    <p:sldId id="409" r:id="rId19"/>
+    <p:sldId id="410" r:id="rId20"/>
     <p:sldId id="413" r:id="rId21"/>
   </p:sldIdLst>
   <p:sldSz cx="12192000" cy="6858000"/>
@@ -151,7 +151,7 @@
 <file path=ppt/revisionInfo.xml><?xml version="1.0" encoding="utf-8"?>
 <p1510:revInfo xmlns:a="http://schemas.openxmlformats.org/drawingml/2006/main" xmlns:r="http://schemas.openxmlformats.org/officeDocument/2006/relationships" xmlns:p1510="http://schemas.microsoft.com/office/powerpoint/2015/10/main">
   <p1510:revLst>
-    <p1510:client id="{47200596-1467-43A0-B5C3-C5ABB72A0911}" v="21" dt="2021-10-26T17:55:52.830"/>
+    <p1510:client id="{47200596-1467-43A0-B5C3-C5ABB72A0911}" v="25" dt="2021-10-28T18:43:30.558"/>
   </p1510:revLst>
 </p1510:revInfo>
 </file>
@@ -161,16 +161,39 @@
   <pc:docChgLst>
     <pc:chgData name="Ellis Hughes" userId="70958ad1-f5a5-48f5-9815-bf834be6566e" providerId="ADAL" clId="{47200596-1467-43A0-B5C3-C5ABB72A0911}"/>
     <pc:docChg chg="undo custSel addSld delSld modSld">
-      <pc:chgData name="Ellis Hughes" userId="70958ad1-f5a5-48f5-9815-bf834be6566e" providerId="ADAL" clId="{47200596-1467-43A0-B5C3-C5ABB72A0911}" dt="2021-10-26T17:55:52.830" v="1225"/>
+      <pc:chgData name="Ellis Hughes" userId="70958ad1-f5a5-48f5-9815-bf834be6566e" providerId="ADAL" clId="{47200596-1467-43A0-B5C3-C5ABB72A0911}" dt="2021-10-28T18:43:44.116" v="1545" actId="1076"/>
       <pc:docMkLst>
         <pc:docMk/>
       </pc:docMkLst>
-      <pc:sldChg chg="add">
-        <pc:chgData name="Ellis Hughes" userId="70958ad1-f5a5-48f5-9815-bf834be6566e" providerId="ADAL" clId="{47200596-1467-43A0-B5C3-C5ABB72A0911}" dt="2021-10-26T17:55:52.830" v="1225"/>
+      <pc:sldChg chg="modSp mod">
+        <pc:chgData name="Ellis Hughes" userId="70958ad1-f5a5-48f5-9815-bf834be6566e" providerId="ADAL" clId="{47200596-1467-43A0-B5C3-C5ABB72A0911}" dt="2021-10-28T18:02:21.241" v="1358" actId="20577"/>
+        <pc:sldMkLst>
+          <pc:docMk/>
+          <pc:sldMk cId="1601236187" sldId="262"/>
+        </pc:sldMkLst>
+        <pc:spChg chg="mod">
+          <ac:chgData name="Ellis Hughes" userId="70958ad1-f5a5-48f5-9815-bf834be6566e" providerId="ADAL" clId="{47200596-1467-43A0-B5C3-C5ABB72A0911}" dt="2021-10-28T18:02:21.241" v="1358" actId="20577"/>
+          <ac:spMkLst>
+            <pc:docMk/>
+            <pc:sldMk cId="1601236187" sldId="262"/>
+            <ac:spMk id="5" creationId="{7E558183-391D-4056-BC02-A181C5440B05}"/>
+          </ac:spMkLst>
+        </pc:spChg>
+      </pc:sldChg>
+      <pc:sldChg chg="modSp add">
+        <pc:chgData name="Ellis Hughes" userId="70958ad1-f5a5-48f5-9815-bf834be6566e" providerId="ADAL" clId="{47200596-1467-43A0-B5C3-C5ABB72A0911}" dt="2021-10-28T17:42:54.438" v="1226" actId="478"/>
         <pc:sldMkLst>
           <pc:docMk/>
           <pc:sldMk cId="816482551" sldId="267"/>
         </pc:sldMkLst>
+        <pc:graphicFrameChg chg="mod">
+          <ac:chgData name="Ellis Hughes" userId="70958ad1-f5a5-48f5-9815-bf834be6566e" providerId="ADAL" clId="{47200596-1467-43A0-B5C3-C5ABB72A0911}" dt="2021-10-28T17:42:54.438" v="1226" actId="478"/>
+          <ac:graphicFrameMkLst>
+            <pc:docMk/>
+            <pc:sldMk cId="816482551" sldId="267"/>
+            <ac:graphicFrameMk id="4" creationId="{B053C177-3BA4-4E3A-B3A3-ED48137FC413}"/>
+          </ac:graphicFrameMkLst>
+        </pc:graphicFrameChg>
       </pc:sldChg>
       <pc:sldChg chg="del">
         <pc:chgData name="Ellis Hughes" userId="70958ad1-f5a5-48f5-9815-bf834be6566e" providerId="ADAL" clId="{47200596-1467-43A0-B5C3-C5ABB72A0911}" dt="2021-10-26T17:15:13.877" v="449" actId="47"/>
@@ -209,20 +232,52 @@
           </ac:spMkLst>
         </pc:spChg>
       </pc:sldChg>
-      <pc:sldChg chg="modSp mod">
-        <pc:chgData name="Ellis Hughes" userId="70958ad1-f5a5-48f5-9815-bf834be6566e" providerId="ADAL" clId="{47200596-1467-43A0-B5C3-C5ABB72A0911}" dt="2021-10-26T17:14:19.326" v="447" actId="20577"/>
+      <pc:sldChg chg="addSp delSp modSp mod">
+        <pc:chgData name="Ellis Hughes" userId="70958ad1-f5a5-48f5-9815-bf834be6566e" providerId="ADAL" clId="{47200596-1467-43A0-B5C3-C5ABB72A0911}" dt="2021-10-28T18:43:35.454" v="1541" actId="478"/>
         <pc:sldMkLst>
           <pc:docMk/>
           <pc:sldMk cId="230036610" sldId="394"/>
         </pc:sldMkLst>
         <pc:spChg chg="mod">
-          <ac:chgData name="Ellis Hughes" userId="70958ad1-f5a5-48f5-9815-bf834be6566e" providerId="ADAL" clId="{47200596-1467-43A0-B5C3-C5ABB72A0911}" dt="2021-10-26T17:14:19.326" v="447" actId="20577"/>
+          <ac:chgData name="Ellis Hughes" userId="70958ad1-f5a5-48f5-9815-bf834be6566e" providerId="ADAL" clId="{47200596-1467-43A0-B5C3-C5ABB72A0911}" dt="2021-10-28T18:02:12.326" v="1351" actId="20577"/>
+          <ac:spMkLst>
+            <pc:docMk/>
+            <pc:sldMk cId="230036610" sldId="394"/>
+            <ac:spMk id="2" creationId="{749E0D1B-C9EF-4CB6-9922-ED9D4AC52C59}"/>
+          </ac:spMkLst>
+        </pc:spChg>
+        <pc:spChg chg="mod">
+          <ac:chgData name="Ellis Hughes" userId="70958ad1-f5a5-48f5-9815-bf834be6566e" providerId="ADAL" clId="{47200596-1467-43A0-B5C3-C5ABB72A0911}" dt="2021-10-28T18:19:15.362" v="1538" actId="1076"/>
           <ac:spMkLst>
             <pc:docMk/>
             <pc:sldMk cId="230036610" sldId="394"/>
             <ac:spMk id="5" creationId="{7E558183-391D-4056-BC02-A181C5440B05}"/>
           </ac:spMkLst>
         </pc:spChg>
+        <pc:spChg chg="add del mod">
+          <ac:chgData name="Ellis Hughes" userId="70958ad1-f5a5-48f5-9815-bf834be6566e" providerId="ADAL" clId="{47200596-1467-43A0-B5C3-C5ABB72A0911}" dt="2021-10-28T18:19:07.637" v="1536" actId="478"/>
+          <ac:spMkLst>
+            <pc:docMk/>
+            <pc:sldMk cId="230036610" sldId="394"/>
+            <ac:spMk id="7" creationId="{8803EB11-C821-403E-9A5E-0C29055F9E08}"/>
+          </ac:spMkLst>
+        </pc:spChg>
+        <pc:picChg chg="add del mod">
+          <ac:chgData name="Ellis Hughes" userId="70958ad1-f5a5-48f5-9815-bf834be6566e" providerId="ADAL" clId="{47200596-1467-43A0-B5C3-C5ABB72A0911}" dt="2021-10-28T18:43:35.454" v="1541" actId="478"/>
+          <ac:picMkLst>
+            <pc:docMk/>
+            <pc:sldMk cId="230036610" sldId="394"/>
+            <ac:picMk id="4" creationId="{B749766E-B760-4F5E-97FC-343B675C4051}"/>
+          </ac:picMkLst>
+        </pc:picChg>
+        <pc:picChg chg="del">
+          <ac:chgData name="Ellis Hughes" userId="70958ad1-f5a5-48f5-9815-bf834be6566e" providerId="ADAL" clId="{47200596-1467-43A0-B5C3-C5ABB72A0911}" dt="2021-10-28T18:01:21.489" v="1268" actId="478"/>
+          <ac:picMkLst>
+            <pc:docMk/>
+            <pc:sldMk cId="230036610" sldId="394"/>
+            <ac:picMk id="6" creationId="{E63E870D-0347-4322-B695-F267DBD63E13}"/>
+          </ac:picMkLst>
+        </pc:picChg>
       </pc:sldChg>
       <pc:sldChg chg="del">
         <pc:chgData name="Ellis Hughes" userId="70958ad1-f5a5-48f5-9815-bf834be6566e" providerId="ADAL" clId="{47200596-1467-43A0-B5C3-C5ABB72A0911}" dt="2021-10-26T17:37:30.560" v="1224" actId="47"/>
@@ -231,12 +286,20 @@
           <pc:sldMk cId="2364925625" sldId="399"/>
         </pc:sldMkLst>
       </pc:sldChg>
-      <pc:sldChg chg="add">
-        <pc:chgData name="Ellis Hughes" userId="70958ad1-f5a5-48f5-9815-bf834be6566e" providerId="ADAL" clId="{47200596-1467-43A0-B5C3-C5ABB72A0911}" dt="2021-10-26T17:14:51.753" v="448"/>
+      <pc:sldChg chg="modSp add mod">
+        <pc:chgData name="Ellis Hughes" userId="70958ad1-f5a5-48f5-9815-bf834be6566e" providerId="ADAL" clId="{47200596-1467-43A0-B5C3-C5ABB72A0911}" dt="2021-10-28T18:03:39.377" v="1528" actId="6549"/>
         <pc:sldMkLst>
           <pc:docMk/>
           <pc:sldMk cId="2691376257" sldId="406"/>
         </pc:sldMkLst>
+        <pc:spChg chg="mod">
+          <ac:chgData name="Ellis Hughes" userId="70958ad1-f5a5-48f5-9815-bf834be6566e" providerId="ADAL" clId="{47200596-1467-43A0-B5C3-C5ABB72A0911}" dt="2021-10-28T18:03:39.377" v="1528" actId="6549"/>
+          <ac:spMkLst>
+            <pc:docMk/>
+            <pc:sldMk cId="2691376257" sldId="406"/>
+            <ac:spMk id="5" creationId="{7E558183-391D-4056-BC02-A181C5440B05}"/>
+          </ac:spMkLst>
+        </pc:spChg>
       </pc:sldChg>
       <pc:sldChg chg="delSp add del">
         <pc:chgData name="Ellis Hughes" userId="70958ad1-f5a5-48f5-9815-bf834be6566e" providerId="ADAL" clId="{47200596-1467-43A0-B5C3-C5ABB72A0911}" dt="2021-10-26T17:16:50.613" v="567" actId="47"/>
@@ -346,8 +409,8 @@
           </ac:picMkLst>
         </pc:picChg>
       </pc:sldChg>
-      <pc:sldChg chg="addSp delSp modSp add mod">
-        <pc:chgData name="Ellis Hughes" userId="70958ad1-f5a5-48f5-9815-bf834be6566e" providerId="ADAL" clId="{47200596-1467-43A0-B5C3-C5ABB72A0911}" dt="2021-10-26T17:31:50.844" v="1091" actId="20577"/>
+      <pc:sldChg chg="addSp delSp modSp add del mod">
+        <pc:chgData name="Ellis Hughes" userId="70958ad1-f5a5-48f5-9815-bf834be6566e" providerId="ADAL" clId="{47200596-1467-43A0-B5C3-C5ABB72A0911}" dt="2021-10-28T17:50:07.225" v="1227" actId="2696"/>
         <pc:sldMkLst>
           <pc:docMk/>
           <pc:sldMk cId="145938641" sldId="411"/>
@@ -422,6 +485,37 @@
             <ac:spMk id="3" creationId="{3BD18B3B-91C5-40E5-8BF2-43C62C5A2AAD}"/>
           </ac:spMkLst>
         </pc:spChg>
+      </pc:sldChg>
+      <pc:sldChg chg="addSp delSp modSp add mod">
+        <pc:chgData name="Ellis Hughes" userId="70958ad1-f5a5-48f5-9815-bf834be6566e" providerId="ADAL" clId="{47200596-1467-43A0-B5C3-C5ABB72A0911}" dt="2021-10-28T18:43:44.116" v="1545" actId="1076"/>
+        <pc:sldMkLst>
+          <pc:docMk/>
+          <pc:sldMk cId="2809763239" sldId="414"/>
+        </pc:sldMkLst>
+        <pc:spChg chg="del">
+          <ac:chgData name="Ellis Hughes" userId="70958ad1-f5a5-48f5-9815-bf834be6566e" providerId="ADAL" clId="{47200596-1467-43A0-B5C3-C5ABB72A0911}" dt="2021-10-28T18:43:33.851" v="1540" actId="478"/>
+          <ac:spMkLst>
+            <pc:docMk/>
+            <pc:sldMk cId="2809763239" sldId="414"/>
+            <ac:spMk id="5" creationId="{7E558183-391D-4056-BC02-A181C5440B05}"/>
+          </ac:spMkLst>
+        </pc:spChg>
+        <pc:spChg chg="add del mod">
+          <ac:chgData name="Ellis Hughes" userId="70958ad1-f5a5-48f5-9815-bf834be6566e" providerId="ADAL" clId="{47200596-1467-43A0-B5C3-C5ABB72A0911}" dt="2021-10-28T18:43:38.439" v="1542" actId="478"/>
+          <ac:spMkLst>
+            <pc:docMk/>
+            <pc:sldMk cId="2809763239" sldId="414"/>
+            <ac:spMk id="6" creationId="{52767965-F36D-4407-8273-F909850860BD}"/>
+          </ac:spMkLst>
+        </pc:spChg>
+        <pc:picChg chg="mod">
+          <ac:chgData name="Ellis Hughes" userId="70958ad1-f5a5-48f5-9815-bf834be6566e" providerId="ADAL" clId="{47200596-1467-43A0-B5C3-C5ABB72A0911}" dt="2021-10-28T18:43:44.116" v="1545" actId="1076"/>
+          <ac:picMkLst>
+            <pc:docMk/>
+            <pc:sldMk cId="2809763239" sldId="414"/>
+            <ac:picMk id="4" creationId="{B749766E-B760-4F5E-97FC-343B675C4051}"/>
+          </ac:picMkLst>
+        </pc:picChg>
       </pc:sldChg>
     </pc:docChg>
   </pc:docChgLst>
@@ -1269,78 +1363,6 @@
         </a:p>
       </dgm:t>
     </dgm:pt>
-    <dgm:pt modelId="{4F54ED54-5EEE-4FDF-B9B9-1D4446D42583}">
-      <dgm:prSet phldrT="[Text]" custT="1"/>
-      <dgm:spPr/>
-      <dgm:t>
-        <a:bodyPr/>
-        <a:lstStyle/>
-        <a:p>
-          <a:r>
-            <a:rPr lang="en-US" sz="2000"/>
-            <a:t>R Package Development</a:t>
-          </a:r>
-        </a:p>
-      </dgm:t>
-    </dgm:pt>
-    <dgm:pt modelId="{65E77277-BBBB-4D52-911C-D69D97ED82DD}" type="parTrans" cxnId="{6D4CC754-DDCF-4A4E-80E2-1765D6B1A4AB}">
-      <dgm:prSet/>
-      <dgm:spPr/>
-      <dgm:t>
-        <a:bodyPr/>
-        <a:lstStyle/>
-        <a:p>
-          <a:endParaRPr lang="en-US" sz="1800"/>
-        </a:p>
-      </dgm:t>
-    </dgm:pt>
-    <dgm:pt modelId="{585F0640-8F5E-4E8D-9FA0-65DBF104A0C8}" type="sibTrans" cxnId="{6D4CC754-DDCF-4A4E-80E2-1765D6B1A4AB}">
-      <dgm:prSet/>
-      <dgm:spPr/>
-      <dgm:t>
-        <a:bodyPr/>
-        <a:lstStyle/>
-        <a:p>
-          <a:endParaRPr lang="en-US" sz="1800"/>
-        </a:p>
-      </dgm:t>
-    </dgm:pt>
-    <dgm:pt modelId="{46893FA1-F33A-4E1F-A502-913D8149B0DA}">
-      <dgm:prSet phldrT="[Text]" custT="1"/>
-      <dgm:spPr/>
-      <dgm:t>
-        <a:bodyPr/>
-        <a:lstStyle/>
-        <a:p>
-          <a:r>
-            <a:rPr lang="en-US" sz="1400"/>
-            <a:t>Implementation of requirements into R package</a:t>
-          </a:r>
-        </a:p>
-      </dgm:t>
-    </dgm:pt>
-    <dgm:pt modelId="{C5393BE0-74ED-4961-BE55-4E6B221A2E9B}" type="parTrans" cxnId="{78D639F7-6C40-4780-A941-5CA36D0C068E}">
-      <dgm:prSet/>
-      <dgm:spPr/>
-      <dgm:t>
-        <a:bodyPr/>
-        <a:lstStyle/>
-        <a:p>
-          <a:endParaRPr lang="en-US" sz="1800"/>
-        </a:p>
-      </dgm:t>
-    </dgm:pt>
-    <dgm:pt modelId="{338E2E62-D31D-414C-96BA-F1F5A563AF6A}" type="sibTrans" cxnId="{78D639F7-6C40-4780-A941-5CA36D0C068E}">
-      <dgm:prSet/>
-      <dgm:spPr/>
-      <dgm:t>
-        <a:bodyPr/>
-        <a:lstStyle/>
-        <a:p>
-          <a:endParaRPr lang="en-US" sz="1800"/>
-        </a:p>
-      </dgm:t>
-    </dgm:pt>
     <dgm:pt modelId="{E607C6FE-D44C-49A0-B87C-2CB5DC4B6950}">
       <dgm:prSet phldrT="[Text]" custT="1"/>
       <dgm:spPr/>
@@ -1576,11 +1598,11 @@
       <dgm:spPr/>
     </dgm:pt>
     <dgm:pt modelId="{8BE42475-82F1-4436-91C4-1FFBAC450253}" type="pres">
-      <dgm:prSet presAssocID="{280556A9-E35B-420B-AC1F-76D57FCB94C9}" presName="parTx1" presStyleLbl="revTx" presStyleIdx="0" presStyleCnt="9" custScaleX="117050" custLinFactNeighborY="-4768"/>
+      <dgm:prSet presAssocID="{280556A9-E35B-420B-AC1F-76D57FCB94C9}" presName="parTx1" presStyleLbl="revTx" presStyleIdx="0" presStyleCnt="7" custScaleX="117050" custLinFactNeighborY="-4768"/>
       <dgm:spPr/>
     </dgm:pt>
     <dgm:pt modelId="{77670E74-E9B9-4773-BFA4-21ACCA51FB2D}" type="pres">
-      <dgm:prSet presAssocID="{280556A9-E35B-420B-AC1F-76D57FCB94C9}" presName="desTx1" presStyleLbl="revTx" presStyleIdx="1" presStyleCnt="9" custLinFactNeighborY="15267">
+      <dgm:prSet presAssocID="{280556A9-E35B-420B-AC1F-76D57FCB94C9}" presName="desTx1" presStyleLbl="revTx" presStyleIdx="1" presStyleCnt="7" custLinFactNeighborY="15267">
         <dgm:presLayoutVars>
           <dgm:bulletEnabled val="1"/>
         </dgm:presLayoutVars>
@@ -1736,43 +1758,11 @@
       <dgm:spPr/>
     </dgm:pt>
     <dgm:pt modelId="{E16727B3-2B6F-48FB-990C-88AC2A0F51AC}" type="pres">
-      <dgm:prSet presAssocID="{2332CF1E-2BAC-4DBD-A67D-6B416E2672D8}" presName="chevron1" presStyleLbl="sibTrans2D1" presStyleIdx="0" presStyleCnt="4"/>
+      <dgm:prSet presAssocID="{2332CF1E-2BAC-4DBD-A67D-6B416E2672D8}" presName="chevron1" presStyleLbl="sibTrans2D1" presStyleIdx="0" presStyleCnt="3"/>
       <dgm:spPr/>
     </dgm:pt>
     <dgm:pt modelId="{4C64C68F-37B0-4480-ACB0-3ED49CBA9ACF}" type="pres">
       <dgm:prSet presAssocID="{2332CF1E-2BAC-4DBD-A67D-6B416E2672D8}" presName="spChevron1" presStyleCnt="0"/>
-      <dgm:spPr/>
-    </dgm:pt>
-    <dgm:pt modelId="{490F73A0-8863-4CCB-B1C6-01238BF632AA}" type="pres">
-      <dgm:prSet presAssocID="{4F54ED54-5EEE-4FDF-B9B9-1D4446D42583}" presName="middle" presStyleCnt="0"/>
-      <dgm:spPr/>
-    </dgm:pt>
-    <dgm:pt modelId="{CA5387F0-4F04-4CD1-A076-C28B0075DB9A}" type="pres">
-      <dgm:prSet presAssocID="{4F54ED54-5EEE-4FDF-B9B9-1D4446D42583}" presName="parTxMid" presStyleLbl="revTx" presStyleIdx="2" presStyleCnt="9" custScaleX="118524"/>
-      <dgm:spPr/>
-    </dgm:pt>
-    <dgm:pt modelId="{F223D90E-F4E1-42E0-BAA0-AFC585ACABDF}" type="pres">
-      <dgm:prSet presAssocID="{4F54ED54-5EEE-4FDF-B9B9-1D4446D42583}" presName="desTxMid" presStyleLbl="revTx" presStyleIdx="3" presStyleCnt="9" custLinFactNeighborY="11152">
-        <dgm:presLayoutVars>
-          <dgm:bulletEnabled val="1"/>
-        </dgm:presLayoutVars>
-      </dgm:prSet>
-      <dgm:spPr/>
-    </dgm:pt>
-    <dgm:pt modelId="{7FA62D9A-888D-4B0E-9EBB-A99803A2DDF0}" type="pres">
-      <dgm:prSet presAssocID="{4F54ED54-5EEE-4FDF-B9B9-1D4446D42583}" presName="spMid" presStyleCnt="0"/>
-      <dgm:spPr/>
-    </dgm:pt>
-    <dgm:pt modelId="{85DB8512-4CE2-4353-B967-23F5EA785383}" type="pres">
-      <dgm:prSet presAssocID="{585F0640-8F5E-4E8D-9FA0-65DBF104A0C8}" presName="chevronComposite1" presStyleCnt="0"/>
-      <dgm:spPr/>
-    </dgm:pt>
-    <dgm:pt modelId="{B2B1B37E-C452-43F8-A26A-68091104380E}" type="pres">
-      <dgm:prSet presAssocID="{585F0640-8F5E-4E8D-9FA0-65DBF104A0C8}" presName="chevron1" presStyleLbl="sibTrans2D1" presStyleIdx="1" presStyleCnt="4"/>
-      <dgm:spPr/>
-    </dgm:pt>
-    <dgm:pt modelId="{1B424020-C93B-42E6-B2D9-BA4CFE1D976E}" type="pres">
-      <dgm:prSet presAssocID="{585F0640-8F5E-4E8D-9FA0-65DBF104A0C8}" presName="spChevron1" presStyleCnt="0"/>
       <dgm:spPr/>
     </dgm:pt>
     <dgm:pt modelId="{B23ECD07-2256-4B09-A815-E49BC026E737}" type="pres">
@@ -1780,11 +1770,11 @@
       <dgm:spPr/>
     </dgm:pt>
     <dgm:pt modelId="{65B6BDF1-5975-407A-AB3C-1949194C9C32}" type="pres">
-      <dgm:prSet presAssocID="{E607C6FE-D44C-49A0-B87C-2CB5DC4B6950}" presName="parTxMid" presStyleLbl="revTx" presStyleIdx="4" presStyleCnt="9"/>
+      <dgm:prSet presAssocID="{E607C6FE-D44C-49A0-B87C-2CB5DC4B6950}" presName="parTxMid" presStyleLbl="revTx" presStyleIdx="2" presStyleCnt="7"/>
       <dgm:spPr/>
     </dgm:pt>
     <dgm:pt modelId="{FCDDD5D1-3753-4860-B4E5-C1954FA750D9}" type="pres">
-      <dgm:prSet presAssocID="{E607C6FE-D44C-49A0-B87C-2CB5DC4B6950}" presName="desTxMid" presStyleLbl="revTx" presStyleIdx="5" presStyleCnt="9" custLinFactNeighborY="12530">
+      <dgm:prSet presAssocID="{E607C6FE-D44C-49A0-B87C-2CB5DC4B6950}" presName="desTxMid" presStyleLbl="revTx" presStyleIdx="3" presStyleCnt="7" custLinFactNeighborY="12530">
         <dgm:presLayoutVars>
           <dgm:bulletEnabled val="1"/>
         </dgm:presLayoutVars>
@@ -1800,7 +1790,7 @@
       <dgm:spPr/>
     </dgm:pt>
     <dgm:pt modelId="{AB4650C5-06CB-4CBF-B2FD-2962C49E5B4A}" type="pres">
-      <dgm:prSet presAssocID="{A286A98C-DBCA-4E57-9FE1-B560A1FF3586}" presName="chevron1" presStyleLbl="sibTrans2D1" presStyleIdx="2" presStyleCnt="4"/>
+      <dgm:prSet presAssocID="{A286A98C-DBCA-4E57-9FE1-B560A1FF3586}" presName="chevron1" presStyleLbl="sibTrans2D1" presStyleIdx="1" presStyleCnt="3"/>
       <dgm:spPr/>
     </dgm:pt>
     <dgm:pt modelId="{3805CF38-2C35-446B-AC57-1475C0B52D71}" type="pres">
@@ -1812,11 +1802,11 @@
       <dgm:spPr/>
     </dgm:pt>
     <dgm:pt modelId="{1E2C9B3A-4FB1-4FBC-BB2A-DE4E3B4105B3}" type="pres">
-      <dgm:prSet presAssocID="{FB62FFD8-0A64-4BFB-8338-7EAAE8FC2A00}" presName="parTxMid" presStyleLbl="revTx" presStyleIdx="6" presStyleCnt="9"/>
+      <dgm:prSet presAssocID="{FB62FFD8-0A64-4BFB-8338-7EAAE8FC2A00}" presName="parTxMid" presStyleLbl="revTx" presStyleIdx="4" presStyleCnt="7"/>
       <dgm:spPr/>
     </dgm:pt>
     <dgm:pt modelId="{5933EE06-7F57-401A-AFBE-9F82FE470F56}" type="pres">
-      <dgm:prSet presAssocID="{FB62FFD8-0A64-4BFB-8338-7EAAE8FC2A00}" presName="desTxMid" presStyleLbl="revTx" presStyleIdx="7" presStyleCnt="9" custLinFactNeighborY="6265">
+      <dgm:prSet presAssocID="{FB62FFD8-0A64-4BFB-8338-7EAAE8FC2A00}" presName="desTxMid" presStyleLbl="revTx" presStyleIdx="5" presStyleCnt="7" custLinFactNeighborY="6265">
         <dgm:presLayoutVars>
           <dgm:bulletEnabled val="1"/>
         </dgm:presLayoutVars>
@@ -1832,7 +1822,7 @@
       <dgm:spPr/>
     </dgm:pt>
     <dgm:pt modelId="{B9841C9C-1390-48C7-B2C0-86D1A98926FF}" type="pres">
-      <dgm:prSet presAssocID="{A828CE84-A733-4B3A-8895-291DC00B8906}" presName="chevron1" presStyleLbl="sibTrans2D1" presStyleIdx="3" presStyleCnt="4" custLinFactNeighborX="-8428"/>
+      <dgm:prSet presAssocID="{A828CE84-A733-4B3A-8895-291DC00B8906}" presName="chevron1" presStyleLbl="sibTrans2D1" presStyleIdx="2" presStyleCnt="3" custLinFactNeighborX="-8428"/>
       <dgm:spPr/>
     </dgm:pt>
     <dgm:pt modelId="{34597F91-DAD1-442C-AE4C-ABE94C13DE83}" type="pres">
@@ -1848,7 +1838,7 @@
       <dgm:spPr/>
     </dgm:pt>
     <dgm:pt modelId="{DEAEA480-C32D-4863-B7E5-340F9B23B567}" type="pres">
-      <dgm:prSet presAssocID="{B8BBAD03-81F4-4AD2-A635-5008DDC60BC8}" presName="desTxN" presStyleLbl="revTx" presStyleIdx="8" presStyleCnt="9" custLinFactNeighborX="784" custLinFactNeighborY="22902">
+      <dgm:prSet presAssocID="{B8BBAD03-81F4-4AD2-A635-5008DDC60BC8}" presName="desTxN" presStyleLbl="revTx" presStyleIdx="6" presStyleCnt="7" custLinFactNeighborX="784" custLinFactNeighborY="22902">
         <dgm:presLayoutVars>
           <dgm:bulletEnabled val="1"/>
         </dgm:presLayoutVars>
@@ -1861,27 +1851,23 @@
     </dgm:pt>
   </dgm:ptLst>
   <dgm:cxnLst>
-    <dgm:cxn modelId="{C72E2503-9AC7-41EB-BD80-63025A16060F}" srcId="{7D799DDC-0716-44A5-8573-5882AFAA1EFA}" destId="{B8BBAD03-81F4-4AD2-A635-5008DDC60BC8}" srcOrd="4" destOrd="0" parTransId="{A2041C95-0AB4-449E-8B31-D606596984B1}" sibTransId="{74FB4B9B-5077-4DF5-8FFD-2D999799D1E9}"/>
-    <dgm:cxn modelId="{EFF1FB05-2EC9-43BC-8FDA-538074EA3721}" srcId="{7D799DDC-0716-44A5-8573-5882AFAA1EFA}" destId="{E607C6FE-D44C-49A0-B87C-2CB5DC4B6950}" srcOrd="2" destOrd="0" parTransId="{3143C0DD-1AD6-4C40-8E4D-032C8CC5CC55}" sibTransId="{A286A98C-DBCA-4E57-9FE1-B560A1FF3586}"/>
+    <dgm:cxn modelId="{C72E2503-9AC7-41EB-BD80-63025A16060F}" srcId="{7D799DDC-0716-44A5-8573-5882AFAA1EFA}" destId="{B8BBAD03-81F4-4AD2-A635-5008DDC60BC8}" srcOrd="3" destOrd="0" parTransId="{A2041C95-0AB4-449E-8B31-D606596984B1}" sibTransId="{74FB4B9B-5077-4DF5-8FFD-2D999799D1E9}"/>
+    <dgm:cxn modelId="{EFF1FB05-2EC9-43BC-8FDA-538074EA3721}" srcId="{7D799DDC-0716-44A5-8573-5882AFAA1EFA}" destId="{E607C6FE-D44C-49A0-B87C-2CB5DC4B6950}" srcOrd="1" destOrd="0" parTransId="{3143C0DD-1AD6-4C40-8E4D-032C8CC5CC55}" sibTransId="{A286A98C-DBCA-4E57-9FE1-B560A1FF3586}"/>
     <dgm:cxn modelId="{2660E814-0E0F-46A2-A64C-B3E015D28E29}" type="presOf" srcId="{7D799DDC-0716-44A5-8573-5882AFAA1EFA}" destId="{C6C75D6D-E628-47FD-8BF2-EE44FEB97228}" srcOrd="0" destOrd="0" presId="urn:microsoft.com/office/officeart/2009/3/layout/RandomtoResultProcess"/>
     <dgm:cxn modelId="{9DA3132C-BCF6-4615-A0AB-DACFDBB25DC9}" type="presOf" srcId="{280556A9-E35B-420B-AC1F-76D57FCB94C9}" destId="{8BE42475-82F1-4436-91C4-1FFBAC450253}" srcOrd="0" destOrd="0" presId="urn:microsoft.com/office/officeart/2009/3/layout/RandomtoResultProcess"/>
     <dgm:cxn modelId="{B26F9163-D3B6-43F5-803F-6A9071D1210D}" srcId="{B8BBAD03-81F4-4AD2-A635-5008DDC60BC8}" destId="{E6884F7F-137B-4A18-B4BE-6D8659D149BA}" srcOrd="0" destOrd="0" parTransId="{C9932194-0A68-42A0-B3AB-2A887F2F4A19}" sibTransId="{C66C5C85-81AE-41E8-ACEF-98030769A381}"/>
     <dgm:cxn modelId="{8259C944-B4B4-42A5-BE1F-AD72D9775B65}" type="presOf" srcId="{E607C6FE-D44C-49A0-B87C-2CB5DC4B6950}" destId="{65B6BDF1-5975-407A-AB3C-1949194C9C32}" srcOrd="0" destOrd="0" presId="urn:microsoft.com/office/officeart/2009/3/layout/RandomtoResultProcess"/>
-    <dgm:cxn modelId="{6D4CC754-DDCF-4A4E-80E2-1765D6B1A4AB}" srcId="{7D799DDC-0716-44A5-8573-5882AFAA1EFA}" destId="{4F54ED54-5EEE-4FDF-B9B9-1D4446D42583}" srcOrd="1" destOrd="0" parTransId="{65E77277-BBBB-4D52-911C-D69D97ED82DD}" sibTransId="{585F0640-8F5E-4E8D-9FA0-65DBF104A0C8}"/>
-    <dgm:cxn modelId="{C6AED77E-E0F4-4841-A412-D256FC004242}" srcId="{7D799DDC-0716-44A5-8573-5882AFAA1EFA}" destId="{FB62FFD8-0A64-4BFB-8338-7EAAE8FC2A00}" srcOrd="3" destOrd="0" parTransId="{1D7AACD0-2BB5-43D1-A0EE-9D69F629F677}" sibTransId="{A828CE84-A733-4B3A-8895-291DC00B8906}"/>
+    <dgm:cxn modelId="{C6AED77E-E0F4-4841-A412-D256FC004242}" srcId="{7D799DDC-0716-44A5-8573-5882AFAA1EFA}" destId="{FB62FFD8-0A64-4BFB-8338-7EAAE8FC2A00}" srcOrd="2" destOrd="0" parTransId="{1D7AACD0-2BB5-43D1-A0EE-9D69F629F677}" sibTransId="{A828CE84-A733-4B3A-8895-291DC00B8906}"/>
     <dgm:cxn modelId="{4E6EB59E-EA84-467A-90BF-54093797339B}" srcId="{280556A9-E35B-420B-AC1F-76D57FCB94C9}" destId="{310DF361-463F-4F48-AECB-C527B5782463}" srcOrd="0" destOrd="0" parTransId="{61F65DFD-8B88-4FCB-BB68-E8E8E3C5D240}" sibTransId="{C694607A-D87B-47B4-9BC3-0CF25D242590}"/>
     <dgm:cxn modelId="{AF2AA6A5-60AC-4397-87C7-77682BA0C1C2}" srcId="{FB62FFD8-0A64-4BFB-8338-7EAAE8FC2A00}" destId="{D00F9B71-E80E-48A1-9AB8-4E3E9A605172}" srcOrd="0" destOrd="0" parTransId="{5BFBEC1A-D227-4FB6-811A-DD064468C4E7}" sibTransId="{19E9B599-72A4-417C-A18C-363D81FA8865}"/>
     <dgm:cxn modelId="{E598BEAC-9C21-4C1F-B860-4B4304C2F28F}" type="presOf" srcId="{D00F9B71-E80E-48A1-9AB8-4E3E9A605172}" destId="{5933EE06-7F57-401A-AFBE-9F82FE470F56}" srcOrd="0" destOrd="0" presId="urn:microsoft.com/office/officeart/2009/3/layout/RandomtoResultProcess"/>
     <dgm:cxn modelId="{1400E4B1-C53E-4137-8F5C-7A1BDA6FD8E0}" type="presOf" srcId="{412C200B-6007-4845-9E1B-C6CE9D31D56E}" destId="{FCDDD5D1-3753-4860-B4E5-C1954FA750D9}" srcOrd="0" destOrd="0" presId="urn:microsoft.com/office/officeart/2009/3/layout/RandomtoResultProcess"/>
-    <dgm:cxn modelId="{A06690C4-5C4B-41BA-8936-9CEA6B6E9547}" type="presOf" srcId="{46893FA1-F33A-4E1F-A502-913D8149B0DA}" destId="{F223D90E-F4E1-42E0-BAA0-AFC585ACABDF}" srcOrd="0" destOrd="0" presId="urn:microsoft.com/office/officeart/2009/3/layout/RandomtoResultProcess"/>
     <dgm:cxn modelId="{F938DFC9-5EF3-4335-AA5B-FE27239761A8}" srcId="{7D799DDC-0716-44A5-8573-5882AFAA1EFA}" destId="{280556A9-E35B-420B-AC1F-76D57FCB94C9}" srcOrd="0" destOrd="0" parTransId="{43CBF414-706D-474D-82A0-27E04983031D}" sibTransId="{2332CF1E-2BAC-4DBD-A67D-6B416E2672D8}"/>
     <dgm:cxn modelId="{2F2233CA-A016-4CB8-89E1-9F1F234736AF}" type="presOf" srcId="{FB62FFD8-0A64-4BFB-8338-7EAAE8FC2A00}" destId="{1E2C9B3A-4FB1-4FBC-BB2A-DE4E3B4105B3}" srcOrd="0" destOrd="0" presId="urn:microsoft.com/office/officeart/2009/3/layout/RandomtoResultProcess"/>
-    <dgm:cxn modelId="{490750D0-AE4F-455B-91EC-636F141B5F00}" type="presOf" srcId="{4F54ED54-5EEE-4FDF-B9B9-1D4446D42583}" destId="{CA5387F0-4F04-4CD1-A076-C28B0075DB9A}" srcOrd="0" destOrd="0" presId="urn:microsoft.com/office/officeart/2009/3/layout/RandomtoResultProcess"/>
     <dgm:cxn modelId="{3435AED8-371D-4478-B6C1-19AE41F026E7}" srcId="{E607C6FE-D44C-49A0-B87C-2CB5DC4B6950}" destId="{412C200B-6007-4845-9E1B-C6CE9D31D56E}" srcOrd="0" destOrd="0" parTransId="{B3B0E19A-4C6A-4179-9045-376F8A0FCE57}" sibTransId="{3DC25017-CBA6-4EBA-88EE-75FA4BDD9FBA}"/>
     <dgm:cxn modelId="{DE852EE6-4C61-4C31-ABE1-A97893909A89}" type="presOf" srcId="{310DF361-463F-4F48-AECB-C527B5782463}" destId="{77670E74-E9B9-4773-BFA4-21ACCA51FB2D}" srcOrd="0" destOrd="0" presId="urn:microsoft.com/office/officeart/2009/3/layout/RandomtoResultProcess"/>
     <dgm:cxn modelId="{7F86CDEC-56E6-4CCF-A5FC-74F5700C17C7}" type="presOf" srcId="{E6884F7F-137B-4A18-B4BE-6D8659D149BA}" destId="{DEAEA480-C32D-4863-B7E5-340F9B23B567}" srcOrd="0" destOrd="0" presId="urn:microsoft.com/office/officeart/2009/3/layout/RandomtoResultProcess"/>
     <dgm:cxn modelId="{DED29DF2-AAE7-4F06-8D79-AE1DBE743E69}" type="presOf" srcId="{B8BBAD03-81F4-4AD2-A635-5008DDC60BC8}" destId="{02623B03-3CCA-4A60-8A06-2BF15D8A7914}" srcOrd="0" destOrd="0" presId="urn:microsoft.com/office/officeart/2009/3/layout/RandomtoResultProcess"/>
-    <dgm:cxn modelId="{78D639F7-6C40-4780-A941-5CA36D0C068E}" srcId="{4F54ED54-5EEE-4FDF-B9B9-1D4446D42583}" destId="{46893FA1-F33A-4E1F-A502-913D8149B0DA}" srcOrd="0" destOrd="0" parTransId="{C5393BE0-74ED-4961-BE55-4E6B221A2E9B}" sibTransId="{338E2E62-D31D-414C-96BA-F1F5A563AF6A}"/>
     <dgm:cxn modelId="{9C82874E-4B40-4D69-9EC1-862C53037EF0}" type="presParOf" srcId="{C6C75D6D-E628-47FD-8BF2-EE44FEB97228}" destId="{DE885254-BF16-4279-91DF-AD3D1988B6E8}" srcOrd="0" destOrd="0" presId="urn:microsoft.com/office/officeart/2009/3/layout/RandomtoResultProcess"/>
     <dgm:cxn modelId="{AB79699F-3D67-411E-8832-C064ED6F087D}" type="presParOf" srcId="{DE885254-BF16-4279-91DF-AD3D1988B6E8}" destId="{8BE42475-82F1-4436-91C4-1FFBAC450253}" srcOrd="0" destOrd="0" presId="urn:microsoft.com/office/officeart/2009/3/layout/RandomtoResultProcess"/>
     <dgm:cxn modelId="{B67A8571-5AE9-4BCD-A6CA-6870096D52BD}" type="presParOf" srcId="{DE885254-BF16-4279-91DF-AD3D1988B6E8}" destId="{77670E74-E9B9-4773-BFA4-21ACCA51FB2D}" srcOrd="1" destOrd="0" presId="urn:microsoft.com/office/officeart/2009/3/layout/RandomtoResultProcess"/>
@@ -1906,28 +1892,21 @@
     <dgm:cxn modelId="{777D4E22-8185-4403-9DC0-C48B603B41B4}" type="presParOf" srcId="{C6C75D6D-E628-47FD-8BF2-EE44FEB97228}" destId="{E41D1610-7187-4F2D-9A04-3F8E41B9BECD}" srcOrd="1" destOrd="0" presId="urn:microsoft.com/office/officeart/2009/3/layout/RandomtoResultProcess"/>
     <dgm:cxn modelId="{D9B8620C-F8A1-49AE-B5A9-63E145CB772F}" type="presParOf" srcId="{E41D1610-7187-4F2D-9A04-3F8E41B9BECD}" destId="{E16727B3-2B6F-48FB-990C-88AC2A0F51AC}" srcOrd="0" destOrd="0" presId="urn:microsoft.com/office/officeart/2009/3/layout/RandomtoResultProcess"/>
     <dgm:cxn modelId="{5FC47D45-14C2-4AC9-995D-8292DD7D39BB}" type="presParOf" srcId="{E41D1610-7187-4F2D-9A04-3F8E41B9BECD}" destId="{4C64C68F-37B0-4480-ACB0-3ED49CBA9ACF}" srcOrd="1" destOrd="0" presId="urn:microsoft.com/office/officeart/2009/3/layout/RandomtoResultProcess"/>
-    <dgm:cxn modelId="{6F78B762-67BE-490A-BE35-6C267AF52592}" type="presParOf" srcId="{C6C75D6D-E628-47FD-8BF2-EE44FEB97228}" destId="{490F73A0-8863-4CCB-B1C6-01238BF632AA}" srcOrd="2" destOrd="0" presId="urn:microsoft.com/office/officeart/2009/3/layout/RandomtoResultProcess"/>
-    <dgm:cxn modelId="{27AD8913-260A-488C-BBB6-149E2E1013AD}" type="presParOf" srcId="{490F73A0-8863-4CCB-B1C6-01238BF632AA}" destId="{CA5387F0-4F04-4CD1-A076-C28B0075DB9A}" srcOrd="0" destOrd="0" presId="urn:microsoft.com/office/officeart/2009/3/layout/RandomtoResultProcess"/>
-    <dgm:cxn modelId="{A75589E3-9C0F-4E6D-9F88-144E8DCBAA7A}" type="presParOf" srcId="{490F73A0-8863-4CCB-B1C6-01238BF632AA}" destId="{F223D90E-F4E1-42E0-BAA0-AFC585ACABDF}" srcOrd="1" destOrd="0" presId="urn:microsoft.com/office/officeart/2009/3/layout/RandomtoResultProcess"/>
-    <dgm:cxn modelId="{3DCBA5DE-0C8F-46FF-B3AF-2DBA6A8A234B}" type="presParOf" srcId="{490F73A0-8863-4CCB-B1C6-01238BF632AA}" destId="{7FA62D9A-888D-4B0E-9EBB-A99803A2DDF0}" srcOrd="2" destOrd="0" presId="urn:microsoft.com/office/officeart/2009/3/layout/RandomtoResultProcess"/>
-    <dgm:cxn modelId="{359F167F-A4FF-4B7E-BA95-564C96EACD2B}" type="presParOf" srcId="{C6C75D6D-E628-47FD-8BF2-EE44FEB97228}" destId="{85DB8512-4CE2-4353-B967-23F5EA785383}" srcOrd="3" destOrd="0" presId="urn:microsoft.com/office/officeart/2009/3/layout/RandomtoResultProcess"/>
-    <dgm:cxn modelId="{1C551824-41B2-4251-B957-49A73E607940}" type="presParOf" srcId="{85DB8512-4CE2-4353-B967-23F5EA785383}" destId="{B2B1B37E-C452-43F8-A26A-68091104380E}" srcOrd="0" destOrd="0" presId="urn:microsoft.com/office/officeart/2009/3/layout/RandomtoResultProcess"/>
-    <dgm:cxn modelId="{DB79F17B-837C-4FF0-B6C3-CC59BC7B4942}" type="presParOf" srcId="{85DB8512-4CE2-4353-B967-23F5EA785383}" destId="{1B424020-C93B-42E6-B2D9-BA4CFE1D976E}" srcOrd="1" destOrd="0" presId="urn:microsoft.com/office/officeart/2009/3/layout/RandomtoResultProcess"/>
-    <dgm:cxn modelId="{C67B4D24-A67C-4BF7-B580-9D3AFE68689A}" type="presParOf" srcId="{C6C75D6D-E628-47FD-8BF2-EE44FEB97228}" destId="{B23ECD07-2256-4B09-A815-E49BC026E737}" srcOrd="4" destOrd="0" presId="urn:microsoft.com/office/officeart/2009/3/layout/RandomtoResultProcess"/>
+    <dgm:cxn modelId="{C67B4D24-A67C-4BF7-B580-9D3AFE68689A}" type="presParOf" srcId="{C6C75D6D-E628-47FD-8BF2-EE44FEB97228}" destId="{B23ECD07-2256-4B09-A815-E49BC026E737}" srcOrd="2" destOrd="0" presId="urn:microsoft.com/office/officeart/2009/3/layout/RandomtoResultProcess"/>
     <dgm:cxn modelId="{BE7A77D9-8B03-4119-94DE-EB4C6B1B265A}" type="presParOf" srcId="{B23ECD07-2256-4B09-A815-E49BC026E737}" destId="{65B6BDF1-5975-407A-AB3C-1949194C9C32}" srcOrd="0" destOrd="0" presId="urn:microsoft.com/office/officeart/2009/3/layout/RandomtoResultProcess"/>
     <dgm:cxn modelId="{62B55712-19C7-4EF9-8052-943ECC497FCC}" type="presParOf" srcId="{B23ECD07-2256-4B09-A815-E49BC026E737}" destId="{FCDDD5D1-3753-4860-B4E5-C1954FA750D9}" srcOrd="1" destOrd="0" presId="urn:microsoft.com/office/officeart/2009/3/layout/RandomtoResultProcess"/>
     <dgm:cxn modelId="{D090E2D4-EA28-4EB5-AF24-2D9C040B0E7D}" type="presParOf" srcId="{B23ECD07-2256-4B09-A815-E49BC026E737}" destId="{7ECB2C88-4AAD-4A52-B150-BB4B68EA0002}" srcOrd="2" destOrd="0" presId="urn:microsoft.com/office/officeart/2009/3/layout/RandomtoResultProcess"/>
-    <dgm:cxn modelId="{D04DDF06-4CC3-4952-A0CC-4D1E59F71D2F}" type="presParOf" srcId="{C6C75D6D-E628-47FD-8BF2-EE44FEB97228}" destId="{3510237F-38B4-4EC5-8EFA-B2432FE90EE5}" srcOrd="5" destOrd="0" presId="urn:microsoft.com/office/officeart/2009/3/layout/RandomtoResultProcess"/>
+    <dgm:cxn modelId="{D04DDF06-4CC3-4952-A0CC-4D1E59F71D2F}" type="presParOf" srcId="{C6C75D6D-E628-47FD-8BF2-EE44FEB97228}" destId="{3510237F-38B4-4EC5-8EFA-B2432FE90EE5}" srcOrd="3" destOrd="0" presId="urn:microsoft.com/office/officeart/2009/3/layout/RandomtoResultProcess"/>
     <dgm:cxn modelId="{266D2572-0DA9-4C03-9287-34676C6FD476}" type="presParOf" srcId="{3510237F-38B4-4EC5-8EFA-B2432FE90EE5}" destId="{AB4650C5-06CB-4CBF-B2FD-2962C49E5B4A}" srcOrd="0" destOrd="0" presId="urn:microsoft.com/office/officeart/2009/3/layout/RandomtoResultProcess"/>
     <dgm:cxn modelId="{A7365814-25DD-4918-9E4E-03EBB877886B}" type="presParOf" srcId="{3510237F-38B4-4EC5-8EFA-B2432FE90EE5}" destId="{3805CF38-2C35-446B-AC57-1475C0B52D71}" srcOrd="1" destOrd="0" presId="urn:microsoft.com/office/officeart/2009/3/layout/RandomtoResultProcess"/>
-    <dgm:cxn modelId="{B82FA32A-7EC7-4EA4-BC15-92F149418B0B}" type="presParOf" srcId="{C6C75D6D-E628-47FD-8BF2-EE44FEB97228}" destId="{5963CE5E-593E-4F96-9C99-CBD6629C4A0C}" srcOrd="6" destOrd="0" presId="urn:microsoft.com/office/officeart/2009/3/layout/RandomtoResultProcess"/>
+    <dgm:cxn modelId="{B82FA32A-7EC7-4EA4-BC15-92F149418B0B}" type="presParOf" srcId="{C6C75D6D-E628-47FD-8BF2-EE44FEB97228}" destId="{5963CE5E-593E-4F96-9C99-CBD6629C4A0C}" srcOrd="4" destOrd="0" presId="urn:microsoft.com/office/officeart/2009/3/layout/RandomtoResultProcess"/>
     <dgm:cxn modelId="{16EF048E-C363-4BDF-BB8B-17CE0DCA1CF6}" type="presParOf" srcId="{5963CE5E-593E-4F96-9C99-CBD6629C4A0C}" destId="{1E2C9B3A-4FB1-4FBC-BB2A-DE4E3B4105B3}" srcOrd="0" destOrd="0" presId="urn:microsoft.com/office/officeart/2009/3/layout/RandomtoResultProcess"/>
     <dgm:cxn modelId="{FF0C31AB-8D25-473D-A8E2-CD3548C78BE3}" type="presParOf" srcId="{5963CE5E-593E-4F96-9C99-CBD6629C4A0C}" destId="{5933EE06-7F57-401A-AFBE-9F82FE470F56}" srcOrd="1" destOrd="0" presId="urn:microsoft.com/office/officeart/2009/3/layout/RandomtoResultProcess"/>
     <dgm:cxn modelId="{410AC838-1E73-440E-9090-C8C114C8A485}" type="presParOf" srcId="{5963CE5E-593E-4F96-9C99-CBD6629C4A0C}" destId="{04D1E316-D596-47F7-BC7C-B951734F0F17}" srcOrd="2" destOrd="0" presId="urn:microsoft.com/office/officeart/2009/3/layout/RandomtoResultProcess"/>
-    <dgm:cxn modelId="{4C4B524D-5E2A-439F-89C1-498DEACC807A}" type="presParOf" srcId="{C6C75D6D-E628-47FD-8BF2-EE44FEB97228}" destId="{1135270E-042C-437F-9767-78BEBEA807A1}" srcOrd="7" destOrd="0" presId="urn:microsoft.com/office/officeart/2009/3/layout/RandomtoResultProcess"/>
+    <dgm:cxn modelId="{4C4B524D-5E2A-439F-89C1-498DEACC807A}" type="presParOf" srcId="{C6C75D6D-E628-47FD-8BF2-EE44FEB97228}" destId="{1135270E-042C-437F-9767-78BEBEA807A1}" srcOrd="5" destOrd="0" presId="urn:microsoft.com/office/officeart/2009/3/layout/RandomtoResultProcess"/>
     <dgm:cxn modelId="{9203A29B-3523-414B-BC2C-66039786E70A}" type="presParOf" srcId="{1135270E-042C-437F-9767-78BEBEA807A1}" destId="{B9841C9C-1390-48C7-B2C0-86D1A98926FF}" srcOrd="0" destOrd="0" presId="urn:microsoft.com/office/officeart/2009/3/layout/RandomtoResultProcess"/>
     <dgm:cxn modelId="{25B142B2-5A8B-4D71-B545-FCF51E109050}" type="presParOf" srcId="{1135270E-042C-437F-9767-78BEBEA807A1}" destId="{34597F91-DAD1-442C-AE4C-ABE94C13DE83}" srcOrd="1" destOrd="0" presId="urn:microsoft.com/office/officeart/2009/3/layout/RandomtoResultProcess"/>
-    <dgm:cxn modelId="{A82CFE59-D436-457A-9864-3B80C57A8CC1}" type="presParOf" srcId="{C6C75D6D-E628-47FD-8BF2-EE44FEB97228}" destId="{7193E157-5816-47FF-94DC-9C09BEFC3149}" srcOrd="8" destOrd="0" presId="urn:microsoft.com/office/officeart/2009/3/layout/RandomtoResultProcess"/>
+    <dgm:cxn modelId="{A82CFE59-D436-457A-9864-3B80C57A8CC1}" type="presParOf" srcId="{C6C75D6D-E628-47FD-8BF2-EE44FEB97228}" destId="{7193E157-5816-47FF-94DC-9C09BEFC3149}" srcOrd="6" destOrd="0" presId="urn:microsoft.com/office/officeart/2009/3/layout/RandomtoResultProcess"/>
     <dgm:cxn modelId="{F79C56C7-3843-4AED-A02E-04CAA55F38C8}" type="presParOf" srcId="{7193E157-5816-47FF-94DC-9C09BEFC3149}" destId="{02623B03-3CCA-4A60-8A06-2BF15D8A7914}" srcOrd="0" destOrd="0" presId="urn:microsoft.com/office/officeart/2009/3/layout/RandomtoResultProcess"/>
     <dgm:cxn modelId="{C09033A0-7383-4C27-9707-84ABC81F19FD}" type="presParOf" srcId="{7193E157-5816-47FF-94DC-9C09BEFC3149}" destId="{DEAEA480-C32D-4863-B7E5-340F9B23B567}" srcOrd="1" destOrd="0" presId="urn:microsoft.com/office/officeart/2009/3/layout/RandomtoResultProcess"/>
     <dgm:cxn modelId="{6A374415-9384-4638-B568-56598532B1F9}" type="presParOf" srcId="{7193E157-5816-47FF-94DC-9C09BEFC3149}" destId="{26C501F2-E76C-4833-AB5E-D4696302AC6A}" srcOrd="2" destOrd="0" presId="urn:microsoft.com/office/officeart/2009/3/layout/RandomtoResultProcess"/>
@@ -1957,8 +1936,8 @@
       </dsp:nvSpPr>
       <dsp:spPr>
         <a:xfrm>
-          <a:off x="1131" y="1145372"/>
-          <a:ext cx="1948626" cy="548621"/>
+          <a:off x="5142" y="907790"/>
+          <a:ext cx="2511922" cy="707212"/>
         </a:xfrm>
         <a:prstGeom prst="rect">
           <a:avLst/>
@@ -2010,8 +1989,8 @@
         </a:p>
       </dsp:txBody>
       <dsp:txXfrm>
-        <a:off x="1131" y="1145372"/>
-        <a:ext cx="1948626" cy="548621"/>
+        <a:off x="5142" y="907790"/>
+        <a:ext cx="2511922" cy="707212"/>
       </dsp:txXfrm>
     </dsp:sp>
     <dsp:sp modelId="{77670E74-E9B9-4773-BFA4-21ACCA51FB2D}">
@@ -2021,8 +2000,8 @@
       </dsp:nvSpPr>
       <dsp:spPr>
         <a:xfrm>
-          <a:off x="143054" y="2485305"/>
-          <a:ext cx="1664781" cy="1027848"/>
+          <a:off x="188090" y="2609523"/>
+          <a:ext cx="2146025" cy="1324972"/>
         </a:xfrm>
         <a:prstGeom prst="rect">
           <a:avLst/>
@@ -2074,8 +2053,8 @@
         </a:p>
       </dsp:txBody>
       <dsp:txXfrm>
-        <a:off x="143054" y="2485305"/>
-        <a:ext cx="1664781" cy="1027848"/>
+        <a:off x="188090" y="2609523"/>
+        <a:ext cx="2146025" cy="1324972"/>
       </dsp:txXfrm>
     </dsp:sp>
     <dsp:sp modelId="{FAF3159A-E729-4941-B249-F605A5A3CBEC}">
@@ -2085,8 +2064,8 @@
       </dsp:nvSpPr>
       <dsp:spPr>
         <a:xfrm>
-          <a:off x="141162" y="1004674"/>
-          <a:ext cx="132425" cy="132425"/>
+          <a:off x="185652" y="726420"/>
+          <a:ext cx="170706" cy="170706"/>
         </a:xfrm>
         <a:prstGeom prst="ellipse">
           <a:avLst/>
@@ -2129,8 +2108,8 @@
       </dsp:nvSpPr>
       <dsp:spPr>
         <a:xfrm>
-          <a:off x="233860" y="819278"/>
-          <a:ext cx="132425" cy="132425"/>
+          <a:off x="305146" y="487430"/>
+          <a:ext cx="170706" cy="170706"/>
         </a:xfrm>
         <a:prstGeom prst="ellipse">
           <a:avLst/>
@@ -2173,8 +2152,8 @@
       </dsp:nvSpPr>
       <dsp:spPr>
         <a:xfrm>
-          <a:off x="456336" y="856357"/>
-          <a:ext cx="208097" cy="208097"/>
+          <a:off x="591933" y="535228"/>
+          <a:ext cx="268253" cy="268253"/>
         </a:xfrm>
         <a:prstGeom prst="ellipse">
           <a:avLst/>
@@ -2217,8 +2196,8 @@
       </dsp:nvSpPr>
       <dsp:spPr>
         <a:xfrm>
-          <a:off x="641732" y="652421"/>
-          <a:ext cx="132425" cy="132425"/>
+          <a:off x="830923" y="272340"/>
+          <a:ext cx="170706" cy="170706"/>
         </a:xfrm>
         <a:prstGeom prst="ellipse">
           <a:avLst/>
@@ -2261,8 +2240,8 @@
       </dsp:nvSpPr>
       <dsp:spPr>
         <a:xfrm>
-          <a:off x="882747" y="578263"/>
-          <a:ext cx="132425" cy="132425"/>
+          <a:off x="1141609" y="176744"/>
+          <a:ext cx="170706" cy="170706"/>
         </a:xfrm>
         <a:prstGeom prst="ellipse">
           <a:avLst/>
@@ -2305,8 +2284,8 @@
       </dsp:nvSpPr>
       <dsp:spPr>
         <a:xfrm>
-          <a:off x="1179380" y="708040"/>
-          <a:ext cx="132425" cy="132425"/>
+          <a:off x="1523991" y="344037"/>
+          <a:ext cx="170706" cy="170706"/>
         </a:xfrm>
         <a:prstGeom prst="ellipse">
           <a:avLst/>
@@ -2349,8 +2328,8 @@
       </dsp:nvSpPr>
       <dsp:spPr>
         <a:xfrm>
-          <a:off x="1364777" y="800738"/>
-          <a:ext cx="208097" cy="208097"/>
+          <a:off x="1762980" y="463531"/>
+          <a:ext cx="268253" cy="268253"/>
         </a:xfrm>
         <a:prstGeom prst="ellipse">
           <a:avLst/>
@@ -2393,8 +2372,8 @@
       </dsp:nvSpPr>
       <dsp:spPr>
         <a:xfrm>
-          <a:off x="1624331" y="1004674"/>
-          <a:ext cx="132425" cy="132425"/>
+          <a:off x="2097565" y="726420"/>
+          <a:ext cx="170706" cy="170706"/>
         </a:xfrm>
         <a:prstGeom prst="ellipse">
           <a:avLst/>
@@ -2437,8 +2416,8 @@
       </dsp:nvSpPr>
       <dsp:spPr>
         <a:xfrm>
-          <a:off x="1242845" y="1025514"/>
-          <a:ext cx="132425" cy="132425"/>
+          <a:off x="1605802" y="753284"/>
+          <a:ext cx="170706" cy="170706"/>
         </a:xfrm>
         <a:prstGeom prst="ellipse">
           <a:avLst/>
@@ -2481,8 +2460,8 @@
       </dsp:nvSpPr>
       <dsp:spPr>
         <a:xfrm>
-          <a:off x="771509" y="819278"/>
-          <a:ext cx="340523" cy="340523"/>
+          <a:off x="998215" y="487430"/>
+          <a:ext cx="438959" cy="438959"/>
         </a:xfrm>
         <a:prstGeom prst="ellipse">
           <a:avLst/>
@@ -2525,8 +2504,8 @@
       </dsp:nvSpPr>
       <dsp:spPr>
         <a:xfrm>
-          <a:off x="767735" y="1628410"/>
-          <a:ext cx="132425" cy="132425"/>
+          <a:off x="993350" y="1530461"/>
+          <a:ext cx="170706" cy="170706"/>
         </a:xfrm>
         <a:prstGeom prst="ellipse">
           <a:avLst/>
@@ -2569,8 +2548,8 @@
       </dsp:nvSpPr>
       <dsp:spPr>
         <a:xfrm>
-          <a:off x="159702" y="1690640"/>
-          <a:ext cx="208097" cy="208097"/>
+          <a:off x="209551" y="1610680"/>
+          <a:ext cx="268253" cy="268253"/>
         </a:xfrm>
         <a:prstGeom prst="ellipse">
           <a:avLst/>
@@ -2613,8 +2592,8 @@
       </dsp:nvSpPr>
       <dsp:spPr>
         <a:xfrm>
-          <a:off x="437796" y="1838956"/>
-          <a:ext cx="302687" cy="302687"/>
+          <a:off x="568035" y="1801871"/>
+          <a:ext cx="390186" cy="390186"/>
         </a:xfrm>
         <a:prstGeom prst="ellipse">
           <a:avLst/>
@@ -2657,8 +2636,8 @@
       </dsp:nvSpPr>
       <dsp:spPr>
         <a:xfrm>
-          <a:off x="827128" y="2079971"/>
-          <a:ext cx="132425" cy="132425"/>
+          <a:off x="1069912" y="2112557"/>
+          <a:ext cx="170706" cy="170706"/>
         </a:xfrm>
         <a:prstGeom prst="ellipse">
           <a:avLst/>
@@ -2701,8 +2680,8 @@
       </dsp:nvSpPr>
       <dsp:spPr>
         <a:xfrm>
-          <a:off x="901286" y="1838956"/>
-          <a:ext cx="208097" cy="208097"/>
+          <a:off x="1165507" y="1801871"/>
+          <a:ext cx="268253" cy="268253"/>
         </a:xfrm>
         <a:prstGeom prst="ellipse">
           <a:avLst/>
@@ -2745,8 +2724,8 @@
       </dsp:nvSpPr>
       <dsp:spPr>
         <a:xfrm>
-          <a:off x="1086682" y="2098511"/>
-          <a:ext cx="132425" cy="132425"/>
+          <a:off x="1404497" y="2136456"/>
+          <a:ext cx="170706" cy="170706"/>
         </a:xfrm>
         <a:prstGeom prst="ellipse">
           <a:avLst/>
@@ -2789,8 +2768,8 @@
       </dsp:nvSpPr>
       <dsp:spPr>
         <a:xfrm>
-          <a:off x="1253539" y="1801877"/>
-          <a:ext cx="302687" cy="302687"/>
+          <a:off x="1619587" y="1754073"/>
+          <a:ext cx="390186" cy="390186"/>
         </a:xfrm>
         <a:prstGeom prst="ellipse">
           <a:avLst/>
@@ -2833,8 +2812,8 @@
       </dsp:nvSpPr>
       <dsp:spPr>
         <a:xfrm>
-          <a:off x="1661410" y="1727719"/>
-          <a:ext cx="208097" cy="208097"/>
+          <a:off x="2145363" y="1658477"/>
+          <a:ext cx="268253" cy="268253"/>
         </a:xfrm>
         <a:prstGeom prst="ellipse">
           <a:avLst/>
@@ -2877,172 +2856,8 @@
       </dsp:nvSpPr>
       <dsp:spPr>
         <a:xfrm>
-          <a:off x="1949758" y="856049"/>
-          <a:ext cx="611153" cy="1166758"/>
-        </a:xfrm>
-        <a:prstGeom prst="chevron">
-          <a:avLst>
-            <a:gd name="adj" fmla="val 62310"/>
-          </a:avLst>
-        </a:prstGeom>
-        <a:solidFill>
-          <a:schemeClr val="accent1">
-            <a:tint val="60000"/>
-            <a:hueOff val="0"/>
-            <a:satOff val="0"/>
-            <a:lumOff val="0"/>
-            <a:alphaOff val="0"/>
-          </a:schemeClr>
-        </a:solidFill>
-        <a:ln>
-          <a:noFill/>
-        </a:ln>
-        <a:effectLst/>
-      </dsp:spPr>
-      <dsp:style>
-        <a:lnRef idx="0">
-          <a:scrgbClr r="0" g="0" b="0"/>
-        </a:lnRef>
-        <a:fillRef idx="1">
-          <a:scrgbClr r="0" g="0" b="0"/>
-        </a:fillRef>
-        <a:effectRef idx="0">
-          <a:scrgbClr r="0" g="0" b="0"/>
-        </a:effectRef>
-        <a:fontRef idx="minor">
-          <a:schemeClr val="lt1"/>
-        </a:fontRef>
-      </dsp:style>
-    </dsp:sp>
-    <dsp:sp modelId="{CA5387F0-4F04-4CD1-A076-C28B0075DB9A}">
-      <dsp:nvSpPr>
-        <dsp:cNvPr id="0" name=""/>
-        <dsp:cNvSpPr/>
-      </dsp:nvSpPr>
-      <dsp:spPr>
-        <a:xfrm>
-          <a:off x="2560911" y="856615"/>
-          <a:ext cx="1975536" cy="1166747"/>
-        </a:xfrm>
-        <a:prstGeom prst="rect">
-          <a:avLst/>
-        </a:prstGeom>
-        <a:noFill/>
-        <a:ln>
-          <a:noFill/>
-        </a:ln>
-        <a:effectLst/>
-      </dsp:spPr>
-      <dsp:style>
-        <a:lnRef idx="0">
-          <a:scrgbClr r="0" g="0" b="0"/>
-        </a:lnRef>
-        <a:fillRef idx="0">
-          <a:scrgbClr r="0" g="0" b="0"/>
-        </a:fillRef>
-        <a:effectRef idx="0">
-          <a:scrgbClr r="0" g="0" b="0"/>
-        </a:effectRef>
-        <a:fontRef idx="minor"/>
-      </dsp:style>
-      <dsp:txBody>
-        <a:bodyPr spcFirstLastPara="0" vert="horz" wrap="square" lIns="25400" tIns="25400" rIns="25400" bIns="25400" numCol="1" spcCol="1270" anchor="ctr" anchorCtr="0">
-          <a:noAutofit/>
-        </a:bodyPr>
-        <a:lstStyle/>
-        <a:p>
-          <a:pPr marL="0" lvl="0" indent="0" algn="ctr" defTabSz="889000">
-            <a:lnSpc>
-              <a:spcPct val="90000"/>
-            </a:lnSpc>
-            <a:spcBef>
-              <a:spcPct val="0"/>
-            </a:spcBef>
-            <a:spcAft>
-              <a:spcPct val="35000"/>
-            </a:spcAft>
-            <a:buNone/>
-          </a:pPr>
-          <a:r>
-            <a:rPr lang="en-US" sz="2000" kern="1200"/>
-            <a:t>R Package Development</a:t>
-          </a:r>
-        </a:p>
-      </dsp:txBody>
-      <dsp:txXfrm>
-        <a:off x="2560911" y="856615"/>
-        <a:ext cx="1975536" cy="1166747"/>
-      </dsp:txXfrm>
-    </dsp:sp>
-    <dsp:sp modelId="{F223D90E-F4E1-42E0-BAA0-AFC585ACABDF}">
-      <dsp:nvSpPr>
-        <dsp:cNvPr id="0" name=""/>
-        <dsp:cNvSpPr/>
-      </dsp:nvSpPr>
-      <dsp:spPr>
-        <a:xfrm>
-          <a:off x="2715289" y="2443009"/>
-          <a:ext cx="1666781" cy="1027848"/>
-        </a:xfrm>
-        <a:prstGeom prst="rect">
-          <a:avLst/>
-        </a:prstGeom>
-        <a:noFill/>
-        <a:ln>
-          <a:noFill/>
-        </a:ln>
-        <a:effectLst/>
-      </dsp:spPr>
-      <dsp:style>
-        <a:lnRef idx="0">
-          <a:scrgbClr r="0" g="0" b="0"/>
-        </a:lnRef>
-        <a:fillRef idx="0">
-          <a:scrgbClr r="0" g="0" b="0"/>
-        </a:fillRef>
-        <a:effectRef idx="0">
-          <a:scrgbClr r="0" g="0" b="0"/>
-        </a:effectRef>
-        <a:fontRef idx="minor"/>
-      </dsp:style>
-      <dsp:txBody>
-        <a:bodyPr spcFirstLastPara="0" vert="horz" wrap="square" lIns="17780" tIns="17780" rIns="17780" bIns="17780" numCol="1" spcCol="1270" anchor="ctr" anchorCtr="0">
-          <a:noAutofit/>
-        </a:bodyPr>
-        <a:lstStyle/>
-        <a:p>
-          <a:pPr marL="0" lvl="0" indent="0" algn="ctr" defTabSz="622300">
-            <a:lnSpc>
-              <a:spcPct val="90000"/>
-            </a:lnSpc>
-            <a:spcBef>
-              <a:spcPct val="0"/>
-            </a:spcBef>
-            <a:spcAft>
-              <a:spcPct val="35000"/>
-            </a:spcAft>
-            <a:buNone/>
-          </a:pPr>
-          <a:r>
-            <a:rPr lang="en-US" sz="1400" kern="1200"/>
-            <a:t>Implementation of requirements into R package</a:t>
-          </a:r>
-        </a:p>
-      </dsp:txBody>
-      <dsp:txXfrm>
-        <a:off x="2715289" y="2443009"/>
-        <a:ext cx="1666781" cy="1027848"/>
-      </dsp:txXfrm>
-    </dsp:sp>
-    <dsp:sp modelId="{B2B1B37E-C452-43F8-A26A-68091104380E}">
-      <dsp:nvSpPr>
-        <dsp:cNvPr id="0" name=""/>
-        <dsp:cNvSpPr/>
-      </dsp:nvSpPr>
-      <dsp:spPr>
-        <a:xfrm>
-          <a:off x="4536448" y="856049"/>
-          <a:ext cx="611153" cy="1166758"/>
+          <a:off x="2517064" y="534831"/>
+          <a:ext cx="787821" cy="1504036"/>
         </a:xfrm>
         <a:prstGeom prst="chevron">
           <a:avLst>
@@ -3085,8 +2900,8 @@
       </dsp:nvSpPr>
       <dsp:spPr>
         <a:xfrm>
-          <a:off x="5147601" y="856615"/>
-          <a:ext cx="1666781" cy="1166747"/>
+          <a:off x="3304886" y="535561"/>
+          <a:ext cx="2148603" cy="1504022"/>
         </a:xfrm>
         <a:prstGeom prst="rect">
           <a:avLst/>
@@ -3134,8 +2949,8 @@
         </a:p>
       </dsp:txBody>
       <dsp:txXfrm>
-        <a:off x="5147601" y="856615"/>
-        <a:ext cx="1666781" cy="1166747"/>
+        <a:off x="3304886" y="535561"/>
+        <a:ext cx="2148603" cy="1504022"/>
       </dsp:txXfrm>
     </dsp:sp>
     <dsp:sp modelId="{FCDDD5D1-3753-4860-B4E5-C1954FA750D9}">
@@ -3145,8 +2960,8 @@
       </dsp:nvSpPr>
       <dsp:spPr>
         <a:xfrm>
-          <a:off x="5147601" y="2457173"/>
-          <a:ext cx="1666781" cy="1027848"/>
+          <a:off x="3304886" y="2598797"/>
+          <a:ext cx="2148603" cy="1324972"/>
         </a:xfrm>
         <a:prstGeom prst="rect">
           <a:avLst/>
@@ -3194,8 +3009,8 @@
         </a:p>
       </dsp:txBody>
       <dsp:txXfrm>
-        <a:off x="5147601" y="2457173"/>
-        <a:ext cx="1666781" cy="1027848"/>
+        <a:off x="3304886" y="2598797"/>
+        <a:ext cx="2148603" cy="1324972"/>
       </dsp:txXfrm>
     </dsp:sp>
     <dsp:sp modelId="{AB4650C5-06CB-4CBF-B2FD-2962C49E5B4A}">
@@ -3205,8 +3020,8 @@
       </dsp:nvSpPr>
       <dsp:spPr>
         <a:xfrm>
-          <a:off x="6814382" y="856049"/>
-          <a:ext cx="611153" cy="1166758"/>
+          <a:off x="5453490" y="534831"/>
+          <a:ext cx="787821" cy="1504036"/>
         </a:xfrm>
         <a:prstGeom prst="chevron">
           <a:avLst>
@@ -3249,8 +3064,8 @@
       </dsp:nvSpPr>
       <dsp:spPr>
         <a:xfrm>
-          <a:off x="7425536" y="856615"/>
-          <a:ext cx="1666781" cy="1166747"/>
+          <a:off x="6241311" y="535561"/>
+          <a:ext cx="2148603" cy="1504022"/>
         </a:xfrm>
         <a:prstGeom prst="rect">
           <a:avLst/>
@@ -3298,8 +3113,8 @@
         </a:p>
       </dsp:txBody>
       <dsp:txXfrm>
-        <a:off x="7425536" y="856615"/>
-        <a:ext cx="1666781" cy="1166747"/>
+        <a:off x="6241311" y="535561"/>
+        <a:ext cx="2148603" cy="1504022"/>
       </dsp:txXfrm>
     </dsp:sp>
     <dsp:sp modelId="{5933EE06-7F57-401A-AFBE-9F82FE470F56}">
@@ -3309,8 +3124,8 @@
       </dsp:nvSpPr>
       <dsp:spPr>
         <a:xfrm>
-          <a:off x="7425536" y="2392778"/>
-          <a:ext cx="1666781" cy="1027848"/>
+          <a:off x="6241311" y="2515788"/>
+          <a:ext cx="2148603" cy="1324972"/>
         </a:xfrm>
         <a:prstGeom prst="rect">
           <a:avLst/>
@@ -3358,8 +3173,8 @@
         </a:p>
       </dsp:txBody>
       <dsp:txXfrm>
-        <a:off x="7425536" y="2392778"/>
-        <a:ext cx="1666781" cy="1027848"/>
+        <a:off x="6241311" y="2515788"/>
+        <a:ext cx="2148603" cy="1324972"/>
       </dsp:txXfrm>
     </dsp:sp>
     <dsp:sp modelId="{B9841C9C-1390-48C7-B2C0-86D1A98926FF}">
@@ -3369,8 +3184,8 @@
       </dsp:nvSpPr>
       <dsp:spPr>
         <a:xfrm>
-          <a:off x="9040809" y="856049"/>
-          <a:ext cx="611153" cy="1166758"/>
+          <a:off x="8323517" y="534831"/>
+          <a:ext cx="787821" cy="1504036"/>
         </a:xfrm>
         <a:prstGeom prst="chevron">
           <a:avLst>
@@ -3413,8 +3228,8 @@
       </dsp:nvSpPr>
       <dsp:spPr>
         <a:xfrm>
-          <a:off x="9704602" y="630155"/>
-          <a:ext cx="1804816" cy="1703007"/>
+          <a:off x="9182878" y="243637"/>
+          <a:ext cx="2326540" cy="2195301"/>
         </a:xfrm>
         <a:prstGeom prst="ellipse">
           <a:avLst/>
@@ -3483,8 +3298,8 @@
         </a:p>
       </dsp:txBody>
       <dsp:txXfrm>
-        <a:off x="9968911" y="879555"/>
-        <a:ext cx="1276198" cy="1204207"/>
+        <a:off x="9523592" y="565131"/>
+        <a:ext cx="1645112" cy="1552313"/>
       </dsp:txXfrm>
     </dsp:sp>
     <dsp:sp modelId="{DEAEA480-C32D-4863-B7E5-340F9B23B567}">
@@ -3494,8 +3309,8 @@
       </dsp:nvSpPr>
       <dsp:spPr>
         <a:xfrm>
-          <a:off x="9785555" y="2563781"/>
-          <a:ext cx="1666781" cy="1027848"/>
+          <a:off x="9283549" y="2609523"/>
+          <a:ext cx="2148603" cy="1324972"/>
         </a:xfrm>
         <a:prstGeom prst="rect">
           <a:avLst/>
@@ -3543,8 +3358,8 @@
         </a:p>
       </dsp:txBody>
       <dsp:txXfrm>
-        <a:off x="9785555" y="2563781"/>
-        <a:ext cx="1666781" cy="1027848"/>
+        <a:off x="9283549" y="2609523"/>
+        <a:ext cx="2148603" cy="1324972"/>
       </dsp:txXfrm>
     </dsp:sp>
   </dsp:spTree>
@@ -5327,7 +5142,7 @@
           <a:p>
             <a:fld id="{AE1375EF-7AC2-40F0-8984-3657FAAC21B8}" type="datetimeFigureOut">
               <a:rPr lang="en-US" smtClean="0"/>
-              <a:t>10/26/2021</a:t>
+              <a:t>10/28/2021</a:t>
             </a:fld>
             <a:endParaRPr lang="en-US"/>
           </a:p>
@@ -5722,82 +5537,7 @@
           <a:bodyPr/>
           <a:lstStyle/>
           <a:p>
-            <a:pPr marL="0" marR="0" lvl="0" indent="0" algn="l" defTabSz="914400" rtl="0" eaLnBrk="1" fontAlgn="auto" latinLnBrk="0" hangingPunct="1">
-              <a:lnSpc>
-                <a:spcPct val="100000"/>
-              </a:lnSpc>
-              <a:spcBef>
-                <a:spcPts val="0"/>
-              </a:spcBef>
-              <a:spcAft>
-                <a:spcPts val="0"/>
-              </a:spcAft>
-              <a:buClrTx/>
-              <a:buSzTx/>
-              <a:buFontTx/>
-              <a:buNone/>
-              <a:tabLst/>
-              <a:defRPr/>
-            </a:pPr>
-            <a:r>
-              <a:rPr lang="en-US" dirty="0"/>
-              <a:t>What is needed to author requirements?</a:t>
-            </a:r>
-          </a:p>
-          <a:p>
-            <a:pPr marL="0" marR="0" lvl="0" indent="0" algn="l" defTabSz="914400" rtl="0" eaLnBrk="1" fontAlgn="auto" latinLnBrk="0" hangingPunct="1">
-              <a:lnSpc>
-                <a:spcPct val="100000"/>
-              </a:lnSpc>
-              <a:spcBef>
-                <a:spcPts val="0"/>
-              </a:spcBef>
-              <a:spcAft>
-                <a:spcPts val="0"/>
-              </a:spcAft>
-              <a:buClrTx/>
-              <a:buSzTx/>
-              <a:buFontTx/>
-              <a:buNone/>
-              <a:tabLst/>
-              <a:defRPr/>
-            </a:pPr>
             <a:endParaRPr lang="en-US" dirty="0"/>
-          </a:p>
-          <a:p>
-            <a:pPr marL="0" marR="0" lvl="0" indent="0" algn="l" defTabSz="914400" rtl="0" eaLnBrk="1" fontAlgn="auto" latinLnBrk="0" hangingPunct="1">
-              <a:lnSpc>
-                <a:spcPct val="100000"/>
-              </a:lnSpc>
-              <a:spcBef>
-                <a:spcPts val="0"/>
-              </a:spcBef>
-              <a:spcAft>
-                <a:spcPts val="0"/>
-              </a:spcAft>
-              <a:buClrTx/>
-              <a:buSzTx/>
-              <a:buFontTx/>
-              <a:buNone/>
-              <a:tabLst/>
-              <a:defRPr/>
-            </a:pPr>
-            <a:r>
-              <a:rPr lang="en-US" dirty="0" err="1"/>
-              <a:t>valtools</a:t>
-            </a:r>
-            <a:r>
-              <a:rPr lang="en-US" dirty="0"/>
-              <a:t>::</a:t>
-            </a:r>
-            <a:r>
-              <a:rPr lang="en-US" dirty="0" err="1"/>
-              <a:t>vt_use_req</a:t>
-            </a:r>
-            <a:r>
-              <a:rPr lang="en-US" dirty="0"/>
-              <a:t> creates a new requirement file with prompts for essential elements. The content is written using markdown syntax, with roxygen2 tags for simple meta info.</a:t>
-            </a:r>
           </a:p>
         </p:txBody>
       </p:sp>
@@ -5816,7 +5556,7 @@
           <a:bodyPr/>
           <a:lstStyle/>
           <a:p>
-            <a:fld id="{B9F26414-4BE6-427A-9F34-1430B41B92D6}" type="slidenum">
+            <a:fld id="{14F1F280-B026-4EF9-886C-BAB3F96C60E8}" type="slidenum">
               <a:rPr lang="en-US" smtClean="0"/>
               <a:t>10</a:t>
             </a:fld>
@@ -5827,7 +5567,7 @@
     </p:spTree>
     <p:extLst>
       <p:ext uri="{BB962C8B-B14F-4D97-AF65-F5344CB8AC3E}">
-        <p14:creationId xmlns:p14="http://schemas.microsoft.com/office/powerpoint/2010/main" val="430953514"/>
+        <p14:creationId xmlns:p14="http://schemas.microsoft.com/office/powerpoint/2010/main" val="4013433314"/>
       </p:ext>
     </p:extLst>
   </p:cSld>
@@ -5898,7 +5638,65 @@
               <a:tabLst/>
               <a:defRPr/>
             </a:pPr>
+            <a:r>
+              <a:rPr lang="en-US" dirty="0"/>
+              <a:t>What is needed to author requirements?</a:t>
+            </a:r>
+          </a:p>
+          <a:p>
+            <a:pPr marL="0" marR="0" lvl="0" indent="0" algn="l" defTabSz="914400" rtl="0" eaLnBrk="1" fontAlgn="auto" latinLnBrk="0" hangingPunct="1">
+              <a:lnSpc>
+                <a:spcPct val="100000"/>
+              </a:lnSpc>
+              <a:spcBef>
+                <a:spcPts val="0"/>
+              </a:spcBef>
+              <a:spcAft>
+                <a:spcPts val="0"/>
+              </a:spcAft>
+              <a:buClrTx/>
+              <a:buSzTx/>
+              <a:buFontTx/>
+              <a:buNone/>
+              <a:tabLst/>
+              <a:defRPr/>
+            </a:pPr>
             <a:endParaRPr lang="en-US" dirty="0"/>
+          </a:p>
+          <a:p>
+            <a:pPr marL="0" marR="0" lvl="0" indent="0" algn="l" defTabSz="914400" rtl="0" eaLnBrk="1" fontAlgn="auto" latinLnBrk="0" hangingPunct="1">
+              <a:lnSpc>
+                <a:spcPct val="100000"/>
+              </a:lnSpc>
+              <a:spcBef>
+                <a:spcPts val="0"/>
+              </a:spcBef>
+              <a:spcAft>
+                <a:spcPts val="0"/>
+              </a:spcAft>
+              <a:buClrTx/>
+              <a:buSzTx/>
+              <a:buFontTx/>
+              <a:buNone/>
+              <a:tabLst/>
+              <a:defRPr/>
+            </a:pPr>
+            <a:r>
+              <a:rPr lang="en-US" dirty="0" err="1"/>
+              <a:t>valtools</a:t>
+            </a:r>
+            <a:r>
+              <a:rPr lang="en-US" dirty="0"/>
+              <a:t>::</a:t>
+            </a:r>
+            <a:r>
+              <a:rPr lang="en-US" dirty="0" err="1"/>
+              <a:t>vt_use_req</a:t>
+            </a:r>
+            <a:r>
+              <a:rPr lang="en-US" dirty="0"/>
+              <a:t> creates a new requirement file with prompts for essential elements. The content is written using markdown syntax, with roxygen2 tags for simple meta info.</a:t>
+            </a:r>
           </a:p>
         </p:txBody>
       </p:sp>
@@ -5928,7 +5726,7 @@
     </p:spTree>
     <p:extLst>
       <p:ext uri="{BB962C8B-B14F-4D97-AF65-F5344CB8AC3E}">
-        <p14:creationId xmlns:p14="http://schemas.microsoft.com/office/powerpoint/2010/main" val="3280339938"/>
+        <p14:creationId xmlns:p14="http://schemas.microsoft.com/office/powerpoint/2010/main" val="430953514"/>
       </p:ext>
     </p:extLst>
   </p:cSld>
@@ -5982,22 +5780,23 @@
           <a:bodyPr/>
           <a:lstStyle/>
           <a:p>
-            <a:r>
-              <a:rPr lang="en-US" dirty="0"/>
-              <a:t>This is a workshop on R package validation, what do R packages and validation have in common?</a:t>
-            </a:r>
-          </a:p>
-          <a:p>
-            <a:pPr marL="171450" indent="-171450">
+            <a:pPr marL="0" marR="0" lvl="0" indent="0" algn="l" defTabSz="914400" rtl="0" eaLnBrk="1" fontAlgn="auto" latinLnBrk="0" hangingPunct="1">
+              <a:lnSpc>
+                <a:spcPct val="100000"/>
+              </a:lnSpc>
+              <a:spcBef>
+                <a:spcPts val="0"/>
+              </a:spcBef>
+              <a:spcAft>
+                <a:spcPts val="0"/>
+              </a:spcAft>
+              <a:buClrTx/>
+              <a:buSzTx/>
               <a:buFontTx/>
-              <a:buChar char="-"/>
+              <a:buNone/>
+              <a:tabLst/>
+              <a:defRPr/>
             </a:pPr>
-            <a:r>
-              <a:rPr lang="en-US" dirty="0"/>
-              <a:t>R packages are software</a:t>
-            </a:r>
-          </a:p>
-          <a:p>
             <a:endParaRPr lang="en-US" dirty="0"/>
           </a:p>
         </p:txBody>
@@ -6019,7 +5818,7 @@
           <a:p>
             <a:fld id="{B9F26414-4BE6-427A-9F34-1430B41B92D6}" type="slidenum">
               <a:rPr lang="en-US" smtClean="0"/>
-              <a:t>13</a:t>
+              <a:t>12</a:t>
             </a:fld>
             <a:endParaRPr lang="en-US"/>
           </a:p>
@@ -6028,7 +5827,7 @@
     </p:spTree>
     <p:extLst>
       <p:ext uri="{BB962C8B-B14F-4D97-AF65-F5344CB8AC3E}">
-        <p14:creationId xmlns:p14="http://schemas.microsoft.com/office/powerpoint/2010/main" val="690635403"/>
+        <p14:creationId xmlns:p14="http://schemas.microsoft.com/office/powerpoint/2010/main" val="3280339938"/>
       </p:ext>
     </p:extLst>
   </p:cSld>
@@ -6082,23 +5881,22 @@
           <a:bodyPr/>
           <a:lstStyle/>
           <a:p>
-            <a:pPr marL="0" marR="0" lvl="0" indent="0" algn="l" defTabSz="914400" rtl="0" eaLnBrk="1" fontAlgn="auto" latinLnBrk="0" hangingPunct="1">
-              <a:lnSpc>
-                <a:spcPct val="100000"/>
-              </a:lnSpc>
-              <a:spcBef>
-                <a:spcPts val="0"/>
-              </a:spcBef>
-              <a:spcAft>
-                <a:spcPts val="0"/>
-              </a:spcAft>
-              <a:buClrTx/>
-              <a:buSzTx/>
+            <a:r>
+              <a:rPr lang="en-US" dirty="0"/>
+              <a:t>This is a workshop on R package validation, what do R packages and validation have in common?</a:t>
+            </a:r>
+          </a:p>
+          <a:p>
+            <a:pPr marL="171450" indent="-171450">
               <a:buFontTx/>
-              <a:buNone/>
-              <a:tabLst/>
-              <a:defRPr/>
+              <a:buChar char="-"/>
             </a:pPr>
+            <a:r>
+              <a:rPr lang="en-US" dirty="0"/>
+              <a:t>R packages are software</a:t>
+            </a:r>
+          </a:p>
+          <a:p>
             <a:endParaRPr lang="en-US" dirty="0"/>
           </a:p>
         </p:txBody>
@@ -6129,7 +5927,7 @@
     </p:spTree>
     <p:extLst>
       <p:ext uri="{BB962C8B-B14F-4D97-AF65-F5344CB8AC3E}">
-        <p14:creationId xmlns:p14="http://schemas.microsoft.com/office/powerpoint/2010/main" val="2602210171"/>
+        <p14:creationId xmlns:p14="http://schemas.microsoft.com/office/powerpoint/2010/main" val="690635403"/>
       </p:ext>
     </p:extLst>
   </p:cSld>
@@ -6230,7 +6028,7 @@
     </p:spTree>
     <p:extLst>
       <p:ext uri="{BB962C8B-B14F-4D97-AF65-F5344CB8AC3E}">
-        <p14:creationId xmlns:p14="http://schemas.microsoft.com/office/powerpoint/2010/main" val="591497123"/>
+        <p14:creationId xmlns:p14="http://schemas.microsoft.com/office/powerpoint/2010/main" val="2602210171"/>
       </p:ext>
     </p:extLst>
   </p:cSld>
@@ -6331,7 +6129,7 @@
     </p:spTree>
     <p:extLst>
       <p:ext uri="{BB962C8B-B14F-4D97-AF65-F5344CB8AC3E}">
-        <p14:creationId xmlns:p14="http://schemas.microsoft.com/office/powerpoint/2010/main" val="3541708672"/>
+        <p14:creationId xmlns:p14="http://schemas.microsoft.com/office/powerpoint/2010/main" val="591497123"/>
       </p:ext>
     </p:extLst>
   </p:cSld>
@@ -7678,7 +7476,7 @@
     </p:spTree>
     <p:extLst>
       <p:ext uri="{BB962C8B-B14F-4D97-AF65-F5344CB8AC3E}">
-        <p14:creationId xmlns:p14="http://schemas.microsoft.com/office/powerpoint/2010/main" val="1631309549"/>
+        <p14:creationId xmlns:p14="http://schemas.microsoft.com/office/powerpoint/2010/main" val="2549072456"/>
       </p:ext>
     </p:extLst>
   </p:cSld>
@@ -7732,23 +7530,454 @@
           <a:bodyPr/>
           <a:lstStyle/>
           <a:p>
+            <a:pPr marL="0" marR="0" lvl="0" indent="0" algn="l" defTabSz="914400" rtl="0" eaLnBrk="1" fontAlgn="auto" latinLnBrk="0" hangingPunct="1">
+              <a:lnSpc>
+                <a:spcPct val="100000"/>
+              </a:lnSpc>
+              <a:spcBef>
+                <a:spcPts val="0"/>
+              </a:spcBef>
+              <a:spcAft>
+                <a:spcPts val="0"/>
+              </a:spcAft>
+              <a:buClrTx/>
+              <a:buSzTx/>
+              <a:buFontTx/>
+              <a:buNone/>
+              <a:tabLst/>
+              <a:defRPr/>
+            </a:pPr>
+            <a:r>
+              <a:rPr lang="en-US" dirty="0" err="1"/>
+              <a:t>Valtools</a:t>
+            </a:r>
             <a:r>
               <a:rPr lang="en-US" dirty="0"/>
-              <a:t>This is a workshop on R package validation, what do R packages and validation have in common?</a:t>
-            </a:r>
-          </a:p>
-          <a:p>
-            <a:pPr marL="171450" indent="-171450">
+              <a:t> anticipates that validation information is stored with the following folder structure:</a:t>
+            </a:r>
+          </a:p>
+          <a:p>
+            <a:pPr marL="0" marR="0" lvl="0" indent="0" algn="l" defTabSz="914400" rtl="0" eaLnBrk="1" fontAlgn="auto" latinLnBrk="0" hangingPunct="1">
+              <a:lnSpc>
+                <a:spcPct val="100000"/>
+              </a:lnSpc>
+              <a:spcBef>
+                <a:spcPts val="0"/>
+              </a:spcBef>
+              <a:spcAft>
+                <a:spcPts val="0"/>
+              </a:spcAft>
+              <a:buClrTx/>
+              <a:buSzTx/>
+              <a:buFontTx/>
+              <a:buNone/>
+              <a:tabLst/>
+              <a:defRPr/>
+            </a:pPr>
+            <a:endParaRPr lang="en-US" dirty="0"/>
+          </a:p>
+          <a:p>
+            <a:pPr marL="228600" marR="0" lvl="0" indent="-228600" algn="l" defTabSz="914400" rtl="0" eaLnBrk="1" fontAlgn="auto" latinLnBrk="0" hangingPunct="1">
+              <a:lnSpc>
+                <a:spcPct val="100000"/>
+              </a:lnSpc>
+              <a:spcBef>
+                <a:spcPts val="0"/>
+              </a:spcBef>
+              <a:spcAft>
+                <a:spcPts val="0"/>
+              </a:spcAft>
+              <a:buClrTx/>
+              <a:buSzTx/>
+              <a:buFontTx/>
+              <a:buAutoNum type="arabicPeriod"/>
+              <a:tabLst/>
+              <a:defRPr/>
+            </a:pPr>
+            <a:r>
+              <a:rPr lang="en-US" dirty="0"/>
+              <a:t>A report RMD file which holds unevaluated code, and depends on contents of validation folder</a:t>
+            </a:r>
+          </a:p>
+          <a:p>
+            <a:pPr marL="228600" marR="0" lvl="0" indent="-228600" algn="l" defTabSz="914400" rtl="0" eaLnBrk="1" fontAlgn="auto" latinLnBrk="0" hangingPunct="1">
+              <a:lnSpc>
+                <a:spcPct val="100000"/>
+              </a:lnSpc>
+              <a:spcBef>
+                <a:spcPts val="0"/>
+              </a:spcBef>
+              <a:spcAft>
+                <a:spcPts val="0"/>
+              </a:spcAft>
+              <a:buClrTx/>
+              <a:buSzTx/>
+              <a:buFontTx/>
+              <a:buAutoNum type="arabicPeriod"/>
+              <a:tabLst/>
+              <a:defRPr/>
+            </a:pPr>
+            <a:r>
+              <a:rPr lang="en-US" dirty="0"/>
+              <a:t>A validation folder which includes:</a:t>
+            </a:r>
+          </a:p>
+          <a:p>
+            <a:pPr marL="685800" marR="0" lvl="1" indent="-228600" algn="l" defTabSz="914400" rtl="0" eaLnBrk="1" fontAlgn="auto" latinLnBrk="0" hangingPunct="1">
+              <a:lnSpc>
+                <a:spcPct val="100000"/>
+              </a:lnSpc>
+              <a:spcBef>
+                <a:spcPts val="0"/>
+              </a:spcBef>
+              <a:spcAft>
+                <a:spcPts val="0"/>
+              </a:spcAft>
+              <a:buClrTx/>
+              <a:buSzTx/>
+              <a:buFontTx/>
+              <a:buAutoNum type="arabicPeriod"/>
+              <a:tabLst/>
+              <a:defRPr/>
+            </a:pPr>
+            <a:r>
+              <a:rPr lang="en-US" dirty="0"/>
+              <a:t>Validation components: requirements, test cases and test code, each in their own sub-folder</a:t>
+            </a:r>
+          </a:p>
+          <a:p>
+            <a:pPr marL="685800" marR="0" lvl="1" indent="-228600" algn="l" defTabSz="914400" rtl="0" eaLnBrk="1" fontAlgn="auto" latinLnBrk="0" hangingPunct="1">
+              <a:lnSpc>
+                <a:spcPct val="100000"/>
+              </a:lnSpc>
+              <a:spcBef>
+                <a:spcPts val="0"/>
+              </a:spcBef>
+              <a:spcAft>
+                <a:spcPts val="0"/>
+              </a:spcAft>
+              <a:buClrTx/>
+              <a:buSzTx/>
+              <a:buFontTx/>
+              <a:buAutoNum type="arabicPeriod"/>
+              <a:tabLst/>
+              <a:defRPr/>
+            </a:pPr>
+            <a:r>
+              <a:rPr lang="en-US" dirty="0" err="1"/>
+              <a:t>validation.yml</a:t>
+            </a:r>
+            <a:r>
+              <a:rPr lang="en-US" dirty="0"/>
+              <a:t>: file containing configuration details. These are accessed and managed via {</a:t>
+            </a:r>
+            <a:r>
+              <a:rPr lang="en-US" dirty="0" err="1"/>
+              <a:t>valtools</a:t>
+            </a:r>
+            <a:r>
+              <a:rPr lang="en-US" dirty="0"/>
+              <a:t>} helper functions and include information such as:</a:t>
+            </a:r>
+          </a:p>
+          <a:p>
+            <a:pPr marL="1143000" marR="0" lvl="2" indent="-228600" algn="l" defTabSz="914400" rtl="0" eaLnBrk="1" fontAlgn="auto" latinLnBrk="0" hangingPunct="1">
+              <a:lnSpc>
+                <a:spcPct val="100000"/>
+              </a:lnSpc>
+              <a:spcBef>
+                <a:spcPts val="0"/>
+              </a:spcBef>
+              <a:spcAft>
+                <a:spcPts val="0"/>
+              </a:spcAft>
+              <a:buClrTx/>
+              <a:buSzTx/>
+              <a:buFontTx/>
+              <a:buAutoNum type="arabicPeriod"/>
+              <a:tabLst/>
+              <a:defRPr/>
+            </a:pPr>
+            <a:r>
+              <a:rPr lang="en-US" dirty="0"/>
+              <a:t>Working directory</a:t>
+            </a:r>
+          </a:p>
+          <a:p>
+            <a:pPr marL="1143000" marR="0" lvl="2" indent="-228600" algn="l" defTabSz="914400" rtl="0" eaLnBrk="1" fontAlgn="auto" latinLnBrk="0" hangingPunct="1">
+              <a:lnSpc>
+                <a:spcPct val="100000"/>
+              </a:lnSpc>
+              <a:spcBef>
+                <a:spcPts val="0"/>
+              </a:spcBef>
+              <a:spcAft>
+                <a:spcPts val="0"/>
+              </a:spcAft>
+              <a:buClrTx/>
+              <a:buSzTx/>
+              <a:buFontTx/>
+              <a:buAutoNum type="arabicPeriod"/>
+              <a:tabLst/>
+              <a:defRPr/>
+            </a:pPr>
+            <a:r>
+              <a:rPr lang="en-US" dirty="0"/>
+              <a:t>Output directory</a:t>
+            </a:r>
+          </a:p>
+          <a:p>
+            <a:pPr marL="1143000" marR="0" lvl="2" indent="-228600" algn="l" defTabSz="914400" rtl="0" eaLnBrk="1" fontAlgn="auto" latinLnBrk="0" hangingPunct="1">
+              <a:lnSpc>
+                <a:spcPct val="100000"/>
+              </a:lnSpc>
+              <a:spcBef>
+                <a:spcPts val="0"/>
+              </a:spcBef>
+              <a:spcAft>
+                <a:spcPts val="0"/>
+              </a:spcAft>
+              <a:buClrTx/>
+              <a:buSzTx/>
+              <a:buFontTx/>
+              <a:buAutoNum type="arabicPeriod"/>
+              <a:tabLst/>
+              <a:defRPr/>
+            </a:pPr>
+            <a:r>
+              <a:rPr lang="en-US" dirty="0"/>
+              <a:t>User details</a:t>
+            </a:r>
+          </a:p>
+          <a:p>
+            <a:pPr marL="1143000" marR="0" lvl="2" indent="-228600" algn="l" defTabSz="914400" rtl="0" eaLnBrk="1" fontAlgn="auto" latinLnBrk="0" hangingPunct="1">
+              <a:lnSpc>
+                <a:spcPct val="100000"/>
+              </a:lnSpc>
+              <a:spcBef>
+                <a:spcPts val="0"/>
+              </a:spcBef>
+              <a:spcAft>
+                <a:spcPts val="0"/>
+              </a:spcAft>
+              <a:buClrTx/>
+              <a:buSzTx/>
+              <a:buFontTx/>
+              <a:buAutoNum type="arabicPeriod"/>
+              <a:tabLst/>
+              <a:defRPr/>
+            </a:pPr>
+            <a:r>
+              <a:rPr lang="en-US" dirty="0"/>
+              <a:t>Ordering of validation child files</a:t>
+            </a:r>
+          </a:p>
+          <a:p>
+            <a:pPr marL="228600" marR="0" lvl="0" indent="-228600" algn="l" defTabSz="914400" rtl="0" eaLnBrk="1" fontAlgn="auto" latinLnBrk="0" hangingPunct="1">
+              <a:lnSpc>
+                <a:spcPct val="100000"/>
+              </a:lnSpc>
+              <a:spcBef>
+                <a:spcPts val="0"/>
+              </a:spcBef>
+              <a:spcAft>
+                <a:spcPts val="0"/>
+              </a:spcAft>
+              <a:buClrTx/>
+              <a:buSzTx/>
+              <a:buFontTx/>
+              <a:buAutoNum type="arabicPeriod"/>
+              <a:tabLst/>
+              <a:defRPr/>
+            </a:pPr>
+            <a:r>
+              <a:rPr lang="en-US" dirty="0"/>
+              <a:t>[Optional] change log </a:t>
+            </a:r>
+          </a:p>
+          <a:p>
+            <a:pPr marL="228600" marR="0" lvl="0" indent="-228600" algn="l" defTabSz="914400" rtl="0" eaLnBrk="1" fontAlgn="auto" latinLnBrk="0" hangingPunct="1">
+              <a:lnSpc>
+                <a:spcPct val="100000"/>
+              </a:lnSpc>
+              <a:spcBef>
+                <a:spcPts val="0"/>
+              </a:spcBef>
+              <a:spcAft>
+                <a:spcPts val="0"/>
+              </a:spcAft>
+              <a:buClrTx/>
+              <a:buSzTx/>
+              <a:buFontTx/>
+              <a:buAutoNum type="arabicPeriod"/>
+              <a:tabLst/>
+              <a:defRPr/>
+            </a:pPr>
+            <a:r>
+              <a:rPr lang="en-US" dirty="0"/>
+              <a:t>Various files for compatibility with git and </a:t>
+            </a:r>
+            <a:r>
+              <a:rPr lang="en-US" dirty="0" err="1"/>
+              <a:t>usethis</a:t>
+            </a:r>
+            <a:r>
+              <a:rPr lang="en-US" dirty="0"/>
+              <a:t> (via here)</a:t>
+            </a:r>
+          </a:p>
+          <a:p>
+            <a:pPr marL="0" marR="0" lvl="0" indent="0" algn="l" defTabSz="914400" rtl="0" eaLnBrk="1" fontAlgn="auto" latinLnBrk="0" hangingPunct="1">
+              <a:lnSpc>
+                <a:spcPct val="100000"/>
+              </a:lnSpc>
+              <a:spcBef>
+                <a:spcPts val="0"/>
+              </a:spcBef>
+              <a:spcAft>
+                <a:spcPts val="0"/>
+              </a:spcAft>
+              <a:buClrTx/>
+              <a:buSzTx/>
+              <a:buFontTx/>
+              <a:buNone/>
+              <a:tabLst/>
+              <a:defRPr/>
+            </a:pPr>
+            <a:endParaRPr lang="en-US" dirty="0"/>
+          </a:p>
+          <a:p>
+            <a:pPr marL="0" marR="0" lvl="0" indent="0" algn="l" defTabSz="914400" rtl="0" eaLnBrk="1" fontAlgn="auto" latinLnBrk="0" hangingPunct="1">
+              <a:lnSpc>
+                <a:spcPct val="100000"/>
+              </a:lnSpc>
+              <a:spcBef>
+                <a:spcPts val="0"/>
+              </a:spcBef>
+              <a:spcAft>
+                <a:spcPts val="0"/>
+              </a:spcAft>
+              <a:buClrTx/>
+              <a:buSzTx/>
+              <a:buFontTx/>
+              <a:buNone/>
+              <a:tabLst/>
+              <a:defRPr/>
+            </a:pPr>
+            <a:endParaRPr lang="en-US" dirty="0"/>
+          </a:p>
+          <a:p>
+            <a:pPr marL="0" marR="0" lvl="0" indent="0" algn="l" defTabSz="914400" rtl="0" eaLnBrk="1" fontAlgn="auto" latinLnBrk="0" hangingPunct="1">
+              <a:lnSpc>
+                <a:spcPct val="100000"/>
+              </a:lnSpc>
+              <a:spcBef>
+                <a:spcPts val="0"/>
+              </a:spcBef>
+              <a:spcAft>
+                <a:spcPts val="0"/>
+              </a:spcAft>
+              <a:buClrTx/>
+              <a:buSzTx/>
+              <a:buFontTx/>
+              <a:buNone/>
+              <a:tabLst/>
+              <a:defRPr/>
+            </a:pPr>
+            <a:r>
+              <a:rPr lang="en-US" dirty="0"/>
+              <a:t>There are a few ways to add this skeleton to your project:</a:t>
+            </a:r>
+          </a:p>
+          <a:p>
+            <a:pPr marL="0" marR="0" lvl="0" indent="0" algn="l" defTabSz="914400" rtl="0" eaLnBrk="1" fontAlgn="auto" latinLnBrk="0" hangingPunct="1">
+              <a:lnSpc>
+                <a:spcPct val="100000"/>
+              </a:lnSpc>
+              <a:spcBef>
+                <a:spcPts val="0"/>
+              </a:spcBef>
+              <a:spcAft>
+                <a:spcPts val="0"/>
+              </a:spcAft>
+              <a:buClrTx/>
+              <a:buSzTx/>
+              <a:buFontTx/>
+              <a:buNone/>
+              <a:tabLst/>
+              <a:defRPr/>
+            </a:pPr>
+            <a:endParaRPr lang="en-US" dirty="0"/>
+          </a:p>
+          <a:p>
+            <a:pPr marL="171450" marR="0" lvl="0" indent="-171450" algn="l" defTabSz="914400" rtl="0" eaLnBrk="1" fontAlgn="auto" latinLnBrk="0" hangingPunct="1">
+              <a:lnSpc>
+                <a:spcPct val="100000"/>
+              </a:lnSpc>
+              <a:spcBef>
+                <a:spcPts val="0"/>
+              </a:spcBef>
+              <a:spcAft>
+                <a:spcPts val="0"/>
+              </a:spcAft>
+              <a:buClrTx/>
+              <a:buSzTx/>
               <a:buFontTx/>
               <a:buChar char="-"/>
+              <a:tabLst/>
+              <a:defRPr/>
             </a:pPr>
             <a:r>
               <a:rPr lang="en-US" dirty="0"/>
-              <a:t>R packages are software</a:t>
-            </a:r>
-          </a:p>
-          <a:p>
-            <a:endParaRPr lang="en-US" dirty="0"/>
+              <a:t>`</a:t>
+            </a:r>
+            <a:r>
+              <a:rPr lang="en-US" dirty="0" err="1"/>
+              <a:t>vt_use_validation</a:t>
+            </a:r>
+            <a:r>
+              <a:rPr lang="en-US" dirty="0"/>
+              <a:t>`: add just the validation folder to an existing directory</a:t>
+            </a:r>
+          </a:p>
+          <a:p>
+            <a:pPr marL="171450" marR="0" lvl="0" indent="-171450" algn="l" defTabSz="914400" rtl="0" eaLnBrk="1" fontAlgn="auto" latinLnBrk="0" hangingPunct="1">
+              <a:lnSpc>
+                <a:spcPct val="100000"/>
+              </a:lnSpc>
+              <a:spcBef>
+                <a:spcPts val="0"/>
+              </a:spcBef>
+              <a:spcAft>
+                <a:spcPts val="0"/>
+              </a:spcAft>
+              <a:buClrTx/>
+              <a:buSzTx/>
+              <a:buFontTx/>
+              <a:buChar char="-"/>
+              <a:tabLst/>
+              <a:defRPr/>
+            </a:pPr>
+            <a:r>
+              <a:rPr lang="en-US" dirty="0"/>
+              <a:t>`</a:t>
+            </a:r>
+            <a:r>
+              <a:rPr lang="en-US" dirty="0" err="1"/>
+              <a:t>vt_create_package</a:t>
+            </a:r>
+            <a:r>
+              <a:rPr lang="en-US" dirty="0"/>
+              <a:t>`: initiate a new R package via {</a:t>
+            </a:r>
+            <a:r>
+              <a:rPr lang="en-US" dirty="0" err="1"/>
+              <a:t>usethis</a:t>
+            </a:r>
+            <a:r>
+              <a:rPr lang="en-US" dirty="0"/>
+              <a:t>} and include validation infrastructure.</a:t>
+            </a:r>
           </a:p>
         </p:txBody>
       </p:sp>
@@ -7778,7 +8007,7 @@
     </p:spTree>
     <p:extLst>
       <p:ext uri="{BB962C8B-B14F-4D97-AF65-F5344CB8AC3E}">
-        <p14:creationId xmlns:p14="http://schemas.microsoft.com/office/powerpoint/2010/main" val="990998011"/>
+        <p14:creationId xmlns:p14="http://schemas.microsoft.com/office/powerpoint/2010/main" val="1631309549"/>
       </p:ext>
     </p:extLst>
   </p:cSld>
@@ -7832,35 +8061,23 @@
           <a:bodyPr/>
           <a:lstStyle/>
           <a:p>
-            <a:pPr marL="0" marR="0" lvl="0" indent="0" algn="l" defTabSz="914400" rtl="0" eaLnBrk="1" fontAlgn="auto" latinLnBrk="0" hangingPunct="1">
-              <a:lnSpc>
-                <a:spcPct val="100000"/>
-              </a:lnSpc>
-              <a:spcBef>
-                <a:spcPts val="0"/>
-              </a:spcBef>
-              <a:spcAft>
-                <a:spcPts val="0"/>
-              </a:spcAft>
-              <a:buClrTx/>
-              <a:buSzTx/>
+            <a:r>
+              <a:rPr lang="en-US" dirty="0"/>
+              <a:t>This is a workshop on R package validation, what do R packages and validation have in common?</a:t>
+            </a:r>
+          </a:p>
+          <a:p>
+            <a:pPr marL="171450" indent="-171450">
               <a:buFontTx/>
-              <a:buNone/>
-              <a:tabLst/>
-              <a:defRPr/>
+              <a:buChar char="-"/>
             </a:pPr>
             <a:r>
               <a:rPr lang="en-US" dirty="0"/>
-              <a:t>Taking a step back to FDA guidance, there is no mention of the infrastructure to manage components of validation. {</a:t>
-            </a:r>
-            <a:r>
-              <a:rPr lang="en-US" dirty="0" err="1"/>
-              <a:t>valtools</a:t>
-            </a:r>
-            <a:r>
-              <a:rPr lang="en-US" dirty="0"/>
-              <a:t>} implements a framework for handling the organization of validation of R packages, so authors can focus on content creation.</a:t>
-            </a:r>
+              <a:t>R packages are software</a:t>
+            </a:r>
+          </a:p>
+          <a:p>
+            <a:endParaRPr lang="en-US" dirty="0"/>
           </a:p>
         </p:txBody>
       </p:sp>
@@ -7890,7 +8107,7 @@
     </p:spTree>
     <p:extLst>
       <p:ext uri="{BB962C8B-B14F-4D97-AF65-F5344CB8AC3E}">
-        <p14:creationId xmlns:p14="http://schemas.microsoft.com/office/powerpoint/2010/main" val="402913333"/>
+        <p14:creationId xmlns:p14="http://schemas.microsoft.com/office/powerpoint/2010/main" val="990998011"/>
       </p:ext>
     </p:extLst>
   </p:cSld>
@@ -7963,7 +8180,7 @@
             </a:pPr>
             <a:r>
               <a:rPr lang="en-US" dirty="0"/>
-              <a:t>{</a:t>
+              <a:t>Taking a step back to FDA guidance, there is no mention of the infrastructure to manage components of validation. {</a:t>
             </a:r>
             <a:r>
               <a:rPr lang="en-US" dirty="0" err="1"/>
@@ -7971,7 +8188,7 @@
             </a:r>
             <a:r>
               <a:rPr lang="en-US" dirty="0"/>
-              <a:t>} cannot help you decide what goes into components of validation. Requirements, Test cases, test code still need to be authored and subject to human review.</a:t>
+              <a:t>} implements a framework for handling the organization of validation of R packages, so authors can focus on content creation.</a:t>
             </a:r>
           </a:p>
         </p:txBody>
@@ -8002,7 +8219,7 @@
     </p:spTree>
     <p:extLst>
       <p:ext uri="{BB962C8B-B14F-4D97-AF65-F5344CB8AC3E}">
-        <p14:creationId xmlns:p14="http://schemas.microsoft.com/office/powerpoint/2010/main" val="3611361550"/>
+        <p14:creationId xmlns:p14="http://schemas.microsoft.com/office/powerpoint/2010/main" val="402913333"/>
       </p:ext>
     </p:extLst>
   </p:cSld>
@@ -8056,7 +8273,35 @@
           <a:bodyPr/>
           <a:lstStyle/>
           <a:p>
-            <a:endParaRPr lang="en-US" dirty="0"/>
+            <a:pPr marL="0" marR="0" lvl="0" indent="0" algn="l" defTabSz="914400" rtl="0" eaLnBrk="1" fontAlgn="auto" latinLnBrk="0" hangingPunct="1">
+              <a:lnSpc>
+                <a:spcPct val="100000"/>
+              </a:lnSpc>
+              <a:spcBef>
+                <a:spcPts val="0"/>
+              </a:spcBef>
+              <a:spcAft>
+                <a:spcPts val="0"/>
+              </a:spcAft>
+              <a:buClrTx/>
+              <a:buSzTx/>
+              <a:buFontTx/>
+              <a:buNone/>
+              <a:tabLst/>
+              <a:defRPr/>
+            </a:pPr>
+            <a:r>
+              <a:rPr lang="en-US" dirty="0"/>
+              <a:t>{</a:t>
+            </a:r>
+            <a:r>
+              <a:rPr lang="en-US" dirty="0" err="1"/>
+              <a:t>valtools</a:t>
+            </a:r>
+            <a:r>
+              <a:rPr lang="en-US" dirty="0"/>
+              <a:t>} cannot help you decide what goes into components of validation. Requirements, Test cases, test code still need to be authored and subject to human review.</a:t>
+            </a:r>
           </a:p>
         </p:txBody>
       </p:sp>
@@ -8075,7 +8320,7 @@
           <a:bodyPr/>
           <a:lstStyle/>
           <a:p>
-            <a:fld id="{14F1F280-B026-4EF9-886C-BAB3F96C60E8}" type="slidenum">
+            <a:fld id="{B9F26414-4BE6-427A-9F34-1430B41B92D6}" type="slidenum">
               <a:rPr lang="en-US" smtClean="0"/>
               <a:t>9</a:t>
             </a:fld>
@@ -8086,7 +8331,7 @@
     </p:spTree>
     <p:extLst>
       <p:ext uri="{BB962C8B-B14F-4D97-AF65-F5344CB8AC3E}">
-        <p14:creationId xmlns:p14="http://schemas.microsoft.com/office/powerpoint/2010/main" val="4013433314"/>
+        <p14:creationId xmlns:p14="http://schemas.microsoft.com/office/powerpoint/2010/main" val="3611361550"/>
       </p:ext>
     </p:extLst>
   </p:cSld>
@@ -8565,7 +8810,7 @@
           <a:p>
             <a:fld id="{EA0C0817-A112-4847-8014-A94B7D2A4EA3}" type="datetime1">
               <a:rPr lang="en-US" smtClean="0"/>
-              <a:t>10/26/2021</a:t>
+              <a:t>10/28/2021</a:t>
             </a:fld>
             <a:endParaRPr lang="en-US" dirty="0"/>
           </a:p>
@@ -8767,7 +9012,7 @@
           <a:p>
             <a:fld id="{7332B432-ACDA-4023-A761-2BAB76577B62}" type="datetime1">
               <a:rPr lang="en-US" smtClean="0"/>
-              <a:t>10/26/2021</a:t>
+              <a:t>10/28/2021</a:t>
             </a:fld>
             <a:endParaRPr lang="en-US" dirty="0"/>
           </a:p>
@@ -9366,7 +9611,7 @@
           <a:p>
             <a:fld id="{D9C646AA-F36E-4540-911D-FFFC0A0EF24A}" type="datetime1">
               <a:rPr lang="en-US" smtClean="0"/>
-              <a:t>10/26/2021</a:t>
+              <a:t>10/28/2021</a:t>
             </a:fld>
             <a:endParaRPr lang="en-US" dirty="0"/>
           </a:p>
@@ -9686,7 +9931,7 @@
           <a:p>
             <a:fld id="{69186D26-FA5F-4637-B602-B7C2DC34CFD4}" type="datetime1">
               <a:rPr lang="en-US" smtClean="0"/>
-              <a:t>10/26/2021</a:t>
+              <a:t>10/28/2021</a:t>
             </a:fld>
             <a:endParaRPr lang="en-US" dirty="0"/>
           </a:p>
@@ -10123,7 +10368,7 @@
           <a:p>
             <a:fld id="{8A7F15D8-96D1-4781-BC50-CA8A088B2FE4}" type="datetime1">
               <a:rPr lang="en-US" smtClean="0"/>
-              <a:t>10/26/2021</a:t>
+              <a:t>10/28/2021</a:t>
             </a:fld>
             <a:endParaRPr lang="en-US" dirty="0"/>
           </a:p>
@@ -10241,7 +10486,7 @@
           <a:p>
             <a:fld id="{F9A96C99-B8F8-4528-BD05-0E16E943DC09}" type="datetime1">
               <a:rPr lang="en-US" smtClean="0"/>
-              <a:t>10/26/2021</a:t>
+              <a:t>10/28/2021</a:t>
             </a:fld>
             <a:endParaRPr lang="en-US" dirty="0"/>
           </a:p>
@@ -10336,7 +10581,7 @@
           <a:p>
             <a:fld id="{03636942-C211-4B28-8DBD-C953E00AF71B}" type="datetime1">
               <a:rPr lang="en-US" smtClean="0"/>
-              <a:t>10/26/2021</a:t>
+              <a:t>10/28/2021</a:t>
             </a:fld>
             <a:endParaRPr lang="en-US" dirty="0"/>
           </a:p>
@@ -10753,7 +10998,7 @@
           <a:p>
             <a:fld id="{7E8D12A6-918A-48BD-8CB9-CA713993B0EA}" type="datetime1">
               <a:rPr lang="en-US" smtClean="0"/>
-              <a:t>10/26/2021</a:t>
+              <a:t>10/28/2021</a:t>
             </a:fld>
             <a:endParaRPr lang="en-US" dirty="0"/>
           </a:p>
@@ -11015,7 +11260,7 @@
             <a:fld id="{E778CE86-875F-4587-BCF6-FA054AFC0D53}" type="datetime1">
               <a:rPr lang="en-US" smtClean="0"/>
               <a:pPr/>
-              <a:t>10/26/2021</a:t>
+              <a:t>10/28/2021</a:t>
             </a:fld>
             <a:endParaRPr lang="en-US" dirty="0"/>
           </a:p>
@@ -11531,7 +11776,7 @@
           <a:p>
             <a:fld id="{F6FA2B21-3FCD-4721-B95C-427943F61125}" type="datetime1">
               <a:rPr lang="en-US" smtClean="0"/>
-              <a:t>10/26/2021</a:t>
+              <a:t>10/28/2021</a:t>
             </a:fld>
             <a:endParaRPr lang="en-US" dirty="0"/>
           </a:p>
@@ -12307,6 +12552,64 @@
           <a:chExt cx="0" cy="0"/>
         </a:xfrm>
       </p:grpSpPr>
+      <p:graphicFrame>
+        <p:nvGraphicFramePr>
+          <p:cNvPr id="4" name="Diagram 3">
+            <a:extLst>
+              <a:ext uri="{FF2B5EF4-FFF2-40B4-BE49-F238E27FC236}">
+                <a16:creationId xmlns:a16="http://schemas.microsoft.com/office/drawing/2014/main" id="{B053C177-3BA4-4E3A-B3A3-ED48137FC413}"/>
+              </a:ext>
+            </a:extLst>
+          </p:cNvPr>
+          <p:cNvGraphicFramePr/>
+          <p:nvPr>
+            <p:extLst>
+              <p:ext uri="{D42A27DB-BD31-4B8C-83A1-F6EECF244321}">
+                <p14:modId xmlns:p14="http://schemas.microsoft.com/office/powerpoint/2010/main" val="30875677"/>
+              </p:ext>
+            </p:extLst>
+          </p:nvPr>
+        </p:nvGraphicFramePr>
+        <p:xfrm>
+          <a:off x="341290" y="1461752"/>
+          <a:ext cx="11509419" cy="3934496"/>
+        </p:xfrm>
+        <a:graphic>
+          <a:graphicData uri="http://schemas.openxmlformats.org/drawingml/2006/diagram">
+            <dgm:relIds xmlns:dgm="http://schemas.openxmlformats.org/drawingml/2006/diagram" xmlns:r="http://schemas.openxmlformats.org/officeDocument/2006/relationships" r:dm="rId3" r:lo="rId4" r:qs="rId5" r:cs="rId6"/>
+          </a:graphicData>
+        </a:graphic>
+      </p:graphicFrame>
+    </p:spTree>
+    <p:extLst>
+      <p:ext uri="{BB962C8B-B14F-4D97-AF65-F5344CB8AC3E}">
+        <p14:creationId xmlns:p14="http://schemas.microsoft.com/office/powerpoint/2010/main" val="816482551"/>
+      </p:ext>
+    </p:extLst>
+  </p:cSld>
+  <p:clrMapOvr>
+    <a:masterClrMapping/>
+  </p:clrMapOvr>
+</p:sld>
+</file>
+
+<file path=ppt/slides/slide11.xml><?xml version="1.0" encoding="utf-8"?>
+<p:sld xmlns:a="http://schemas.openxmlformats.org/drawingml/2006/main" xmlns:r="http://schemas.openxmlformats.org/officeDocument/2006/relationships" xmlns:p="http://schemas.openxmlformats.org/presentationml/2006/main">
+  <p:cSld>
+    <p:spTree>
+      <p:nvGrpSpPr>
+        <p:cNvPr id="1" name=""/>
+        <p:cNvGrpSpPr/>
+        <p:nvPr/>
+      </p:nvGrpSpPr>
+      <p:grpSpPr>
+        <a:xfrm>
+          <a:off x="0" y="0"/>
+          <a:ext cx="0" cy="0"/>
+          <a:chOff x="0" y="0"/>
+          <a:chExt cx="0" cy="0"/>
+        </a:xfrm>
+      </p:grpSpPr>
       <p:sp>
         <p:nvSpPr>
           <p:cNvPr id="2" name="Title 1">
@@ -12433,7 +12736,7 @@
 </p:sld>
 </file>
 
-<file path=ppt/slides/slide11.xml><?xml version="1.0" encoding="utf-8"?>
+<file path=ppt/slides/slide12.xml><?xml version="1.0" encoding="utf-8"?>
 <p:sld xmlns:a="http://schemas.openxmlformats.org/drawingml/2006/main" xmlns:r="http://schemas.openxmlformats.org/officeDocument/2006/relationships" xmlns:p="http://schemas.openxmlformats.org/presentationml/2006/main">
   <p:cSld>
     <p:spTree>
@@ -12551,7 +12854,7 @@
 </p:sld>
 </file>
 
-<file path=ppt/slides/slide12.xml><?xml version="1.0" encoding="utf-8"?>
+<file path=ppt/slides/slide13.xml><?xml version="1.0" encoding="utf-8"?>
 <p:sld xmlns:a="http://schemas.openxmlformats.org/drawingml/2006/main" xmlns:r="http://schemas.openxmlformats.org/officeDocument/2006/relationships" xmlns:p="http://schemas.openxmlformats.org/presentationml/2006/main">
   <p:cSld>
     <p:spTree>
@@ -12684,7 +12987,7 @@
 </p:sld>
 </file>
 
-<file path=ppt/slides/slide13.xml><?xml version="1.0" encoding="utf-8"?>
+<file path=ppt/slides/slide14.xml><?xml version="1.0" encoding="utf-8"?>
 <p:sld xmlns:a="http://schemas.openxmlformats.org/drawingml/2006/main" xmlns:r="http://schemas.openxmlformats.org/officeDocument/2006/relationships" xmlns:p="http://schemas.openxmlformats.org/presentationml/2006/main">
   <p:cSld>
     <p:spTree>
@@ -12733,102 +13036,6 @@
     <p:extLst>
       <p:ext uri="{BB962C8B-B14F-4D97-AF65-F5344CB8AC3E}">
         <p14:creationId xmlns:p14="http://schemas.microsoft.com/office/powerpoint/2010/main" val="1789731559"/>
-      </p:ext>
-    </p:extLst>
-  </p:cSld>
-  <p:clrMapOvr>
-    <a:masterClrMapping/>
-  </p:clrMapOvr>
-</p:sld>
-</file>
-
-<file path=ppt/slides/slide14.xml><?xml version="1.0" encoding="utf-8"?>
-<p:sld xmlns:a="http://schemas.openxmlformats.org/drawingml/2006/main" xmlns:r="http://schemas.openxmlformats.org/officeDocument/2006/relationships" xmlns:p="http://schemas.openxmlformats.org/presentationml/2006/main">
-  <p:cSld>
-    <p:spTree>
-      <p:nvGrpSpPr>
-        <p:cNvPr id="1" name=""/>
-        <p:cNvGrpSpPr/>
-        <p:nvPr/>
-      </p:nvGrpSpPr>
-      <p:grpSpPr>
-        <a:xfrm>
-          <a:off x="0" y="0"/>
-          <a:ext cx="0" cy="0"/>
-          <a:chOff x="0" y="0"/>
-          <a:chExt cx="0" cy="0"/>
-        </a:xfrm>
-      </p:grpSpPr>
-      <p:sp>
-        <p:nvSpPr>
-          <p:cNvPr id="2" name="Title 1">
-            <a:extLst>
-              <a:ext uri="{FF2B5EF4-FFF2-40B4-BE49-F238E27FC236}">
-                <a16:creationId xmlns:a16="http://schemas.microsoft.com/office/drawing/2014/main" id="{749E0D1B-C9EF-4CB6-9922-ED9D4AC52C59}"/>
-              </a:ext>
-            </a:extLst>
-          </p:cNvPr>
-          <p:cNvSpPr>
-            <a:spLocks noGrp="1"/>
-          </p:cNvSpPr>
-          <p:nvPr>
-            <p:ph type="title"/>
-          </p:nvPr>
-        </p:nvSpPr>
-        <p:spPr/>
-        <p:txBody>
-          <a:bodyPr/>
-          <a:lstStyle/>
-          <a:p>
-            <a:r>
-              <a:rPr lang="en-US" dirty="0"/>
-              <a:t>{</a:t>
-            </a:r>
-            <a:r>
-              <a:rPr lang="en-US" dirty="0" err="1"/>
-              <a:t>valtools</a:t>
-            </a:r>
-            <a:r>
-              <a:rPr lang="en-US" dirty="0"/>
-              <a:t>} infrastructure</a:t>
-            </a:r>
-          </a:p>
-        </p:txBody>
-      </p:sp>
-      <p:pic>
-        <p:nvPicPr>
-          <p:cNvPr id="6" name="Picture 5" descr="Screenshot of folder structure expected by valtools for validation elements">
-            <a:extLst>
-              <a:ext uri="{FF2B5EF4-FFF2-40B4-BE49-F238E27FC236}">
-                <a16:creationId xmlns:a16="http://schemas.microsoft.com/office/drawing/2014/main" id="{E63E870D-0347-4322-B695-F267DBD63E13}"/>
-              </a:ext>
-            </a:extLst>
-          </p:cNvPr>
-          <p:cNvPicPr>
-            <a:picLocks noChangeAspect="1"/>
-          </p:cNvPicPr>
-          <p:nvPr/>
-        </p:nvPicPr>
-        <p:blipFill>
-          <a:blip r:embed="rId3"/>
-          <a:stretch>
-            <a:fillRect/>
-          </a:stretch>
-        </p:blipFill>
-        <p:spPr>
-          <a:xfrm>
-            <a:off x="3908502" y="2014194"/>
-            <a:ext cx="4374995" cy="3602500"/>
-          </a:xfrm>
-          <a:prstGeom prst="rect">
-            <a:avLst/>
-          </a:prstGeom>
-        </p:spPr>
-      </p:pic>
-    </p:spTree>
-    <p:extLst>
-      <p:ext uri="{BB962C8B-B14F-4D97-AF65-F5344CB8AC3E}">
-        <p14:creationId xmlns:p14="http://schemas.microsoft.com/office/powerpoint/2010/main" val="39420264"/>
       </p:ext>
     </p:extLst>
   </p:cSld>
@@ -12878,136 +13085,25 @@
           <a:p>
             <a:r>
               <a:rPr lang="en-US" dirty="0"/>
-              <a:t>Report Helper – </a:t>
+              <a:t>{</a:t>
             </a:r>
             <a:r>
               <a:rPr lang="en-US" dirty="0" err="1"/>
-              <a:t>vt_file</a:t>
-            </a:r>
-            <a:endParaRPr lang="en-US" dirty="0"/>
-          </a:p>
-        </p:txBody>
-      </p:sp>
-      <p:sp>
-        <p:nvSpPr>
-          <p:cNvPr id="3" name="Rectangle 2">
-            <a:extLst>
-              <a:ext uri="{FF2B5EF4-FFF2-40B4-BE49-F238E27FC236}">
-                <a16:creationId xmlns:a16="http://schemas.microsoft.com/office/drawing/2014/main" id="{E80DF86C-F347-45D2-92E0-C4E5AFB63439}"/>
-              </a:ext>
-            </a:extLst>
-          </p:cNvPr>
-          <p:cNvSpPr/>
-          <p:nvPr/>
-        </p:nvSpPr>
-        <p:spPr>
-          <a:xfrm>
-            <a:off x="1175133" y="2099960"/>
-            <a:ext cx="10058400" cy="3847207"/>
-          </a:xfrm>
-          <a:prstGeom prst="rect">
-            <a:avLst/>
-          </a:prstGeom>
-        </p:spPr>
-        <p:txBody>
-          <a:bodyPr wrap="square">
-            <a:spAutoFit/>
-          </a:bodyPr>
-          <a:lstStyle/>
-          <a:p>
-            <a:pPr lvl="1"/>
-            <a:r>
-              <a:rPr lang="en-US" sz="2400" b="1" dirty="0"/>
-              <a:t>Key Arguments</a:t>
-            </a:r>
-          </a:p>
-          <a:p>
-            <a:pPr lvl="1"/>
-            <a:endParaRPr lang="en-US" sz="2400" dirty="0"/>
-          </a:p>
-          <a:p>
-            <a:pPr lvl="2"/>
-            <a:r>
-              <a:rPr lang="en-US" sz="2400" dirty="0"/>
-              <a:t> </a:t>
-            </a:r>
-            <a:r>
-              <a:rPr lang="en-US" sz="2400" b="1" dirty="0"/>
-              <a:t>file</a:t>
-            </a:r>
-            <a:r>
-              <a:rPr lang="en-US" sz="2400" dirty="0"/>
-              <a:t> – path to the file to render</a:t>
-            </a:r>
-          </a:p>
-          <a:p>
-            <a:pPr lvl="2"/>
-            <a:endParaRPr lang="en-US" sz="2400" dirty="0"/>
-          </a:p>
-          <a:p>
-            <a:pPr marL="342900" indent="-342900">
-              <a:buFont typeface="Arial" panose="020B0604020202020204" pitchFamily="34" charset="0"/>
-              <a:buChar char="•"/>
-            </a:pPr>
-            <a:r>
-              <a:rPr lang="en-US" sz="2400" dirty="0"/>
-              <a:t>Strips </a:t>
-            </a:r>
-            <a:r>
-              <a:rPr lang="en-US" sz="2400" dirty="0" err="1"/>
-              <a:t>roxygen</a:t>
-            </a:r>
-            <a:r>
-              <a:rPr lang="en-US" sz="2400" dirty="0"/>
-              <a:t> header and renders file into markdown</a:t>
-            </a:r>
-          </a:p>
-          <a:p>
-            <a:pPr marL="342900" indent="-342900">
-              <a:buFont typeface="Arial" panose="020B0604020202020204" pitchFamily="34" charset="0"/>
-              <a:buChar char="•"/>
-            </a:pPr>
-            <a:endParaRPr lang="en-US" sz="2400" dirty="0"/>
-          </a:p>
-          <a:p>
-            <a:pPr marL="342900" indent="-342900">
-              <a:buFont typeface="Arial" panose="020B0604020202020204" pitchFamily="34" charset="0"/>
-              <a:buChar char="•"/>
-            </a:pPr>
-            <a:r>
-              <a:rPr lang="en-US" sz="2400" dirty="0"/>
-              <a:t>Vectorized</a:t>
-            </a:r>
-          </a:p>
-          <a:p>
-            <a:pPr marL="342900" indent="-342900">
-              <a:buFont typeface="Arial" panose="020B0604020202020204" pitchFamily="34" charset="0"/>
-              <a:buChar char="•"/>
-            </a:pPr>
-            <a:endParaRPr lang="en-US" sz="2400" dirty="0"/>
-          </a:p>
-          <a:p>
-            <a:pPr marL="342900" indent="-342900">
-              <a:buFont typeface="Arial" panose="020B0604020202020204" pitchFamily="34" charset="0"/>
-              <a:buChar char="•"/>
-            </a:pPr>
-            <a:endParaRPr lang="en-US" sz="2400" dirty="0"/>
-          </a:p>
-          <a:p>
-            <a:pPr marL="742950" lvl="1" indent="-285750">
-              <a:buFont typeface="Arial" panose="020B0604020202020204" pitchFamily="34" charset="0"/>
-              <a:buChar char="•"/>
-            </a:pPr>
-            <a:endParaRPr lang="en-US" sz="2800" dirty="0"/>
+              <a:t>valtools</a:t>
+            </a:r>
+            <a:r>
+              <a:rPr lang="en-US" dirty="0"/>
+              <a:t>} infrastructure</a:t>
+            </a:r>
           </a:p>
         </p:txBody>
       </p:sp>
       <p:pic>
         <p:nvPicPr>
-          <p:cNvPr id="5" name="Picture 4">
+          <p:cNvPr id="6" name="Picture 5" descr="Screenshot of folder structure expected by valtools for validation elements">
             <a:extLst>
               <a:ext uri="{FF2B5EF4-FFF2-40B4-BE49-F238E27FC236}">
-                <a16:creationId xmlns:a16="http://schemas.microsoft.com/office/drawing/2014/main" id="{8531E89A-74E3-483A-8723-B1AEF282E002}"/>
+                <a16:creationId xmlns:a16="http://schemas.microsoft.com/office/drawing/2014/main" id="{E63E870D-0347-4322-B695-F267DBD63E13}"/>
               </a:ext>
             </a:extLst>
           </p:cNvPr>
@@ -13024,8 +13120,8 @@
         </p:blipFill>
         <p:spPr>
           <a:xfrm>
-            <a:off x="533400" y="5028454"/>
-            <a:ext cx="11125200" cy="1362075"/>
+            <a:off x="3908502" y="2014194"/>
+            <a:ext cx="4374995" cy="3602500"/>
           </a:xfrm>
           <a:prstGeom prst="rect">
             <a:avLst/>
@@ -13035,7 +13131,7 @@
     </p:spTree>
     <p:extLst>
       <p:ext uri="{BB962C8B-B14F-4D97-AF65-F5344CB8AC3E}">
-        <p14:creationId xmlns:p14="http://schemas.microsoft.com/office/powerpoint/2010/main" val="3101666288"/>
+        <p14:creationId xmlns:p14="http://schemas.microsoft.com/office/powerpoint/2010/main" val="39420264"/>
       </p:ext>
     </p:extLst>
   </p:cSld>
@@ -13089,7 +13185,7 @@
             </a:r>
             <a:r>
               <a:rPr lang="en-US" dirty="0" err="1"/>
-              <a:t>vt_path</a:t>
+              <a:t>vt_file</a:t>
             </a:r>
             <a:endParaRPr lang="en-US" dirty="0"/>
           </a:p>
@@ -13144,7 +13240,7 @@
             </a:r>
             <a:r>
               <a:rPr lang="en-US" sz="2400" dirty="0"/>
-              <a:t> – path components to a file</a:t>
+              <a:t> – path to the file to render</a:t>
             </a:r>
           </a:p>
           <a:p>
@@ -13158,17 +13254,15 @@
             </a:pPr>
             <a:r>
               <a:rPr lang="en-US" sz="2400" dirty="0"/>
-              <a:t>Like here::here(), reference is the validation folder</a:t>
-            </a:r>
-          </a:p>
-          <a:p>
-            <a:pPr marL="342900" indent="-342900">
-              <a:buFont typeface="Arial" panose="020B0604020202020204" pitchFamily="34" charset="0"/>
-              <a:buChar char="•"/>
-            </a:pPr>
+              <a:t>Strips </a:t>
+            </a:r>
+            <a:r>
+              <a:rPr lang="en-US" sz="2400" dirty="0" err="1"/>
+              <a:t>roxygen</a:t>
+            </a:r>
             <a:r>
               <a:rPr lang="en-US" sz="2400" dirty="0"/>
-              <a:t>Useful for other validation contexts (within package)</a:t>
+              <a:t> header and renders file into markdown</a:t>
             </a:r>
           </a:p>
           <a:p>
@@ -13179,7 +13273,14 @@
             <a:endParaRPr lang="en-US" sz="2400" dirty="0"/>
           </a:p>
           <a:p>
-            <a:endParaRPr lang="en-US" sz="2400" dirty="0"/>
+            <a:pPr marL="342900" indent="-342900">
+              <a:buFont typeface="Arial" panose="020B0604020202020204" pitchFamily="34" charset="0"/>
+              <a:buChar char="•"/>
+            </a:pPr>
+            <a:r>
+              <a:rPr lang="en-US" sz="2400" dirty="0"/>
+              <a:t>Vectorized</a:t>
+            </a:r>
           </a:p>
           <a:p>
             <a:pPr marL="342900" indent="-342900">
@@ -13189,6 +13290,13 @@
             <a:endParaRPr lang="en-US" sz="2400" dirty="0"/>
           </a:p>
           <a:p>
+            <a:pPr marL="342900" indent="-342900">
+              <a:buFont typeface="Arial" panose="020B0604020202020204" pitchFamily="34" charset="0"/>
+              <a:buChar char="•"/>
+            </a:pPr>
+            <a:endParaRPr lang="en-US" sz="2400" dirty="0"/>
+          </a:p>
+          <a:p>
             <a:pPr marL="742950" lvl="1" indent="-285750">
               <a:buFont typeface="Arial" panose="020B0604020202020204" pitchFamily="34" charset="0"/>
               <a:buChar char="•"/>
@@ -13199,10 +13307,10 @@
       </p:sp>
       <p:pic>
         <p:nvPicPr>
-          <p:cNvPr id="4" name="Picture 3">
+          <p:cNvPr id="5" name="Picture 4">
             <a:extLst>
               <a:ext uri="{FF2B5EF4-FFF2-40B4-BE49-F238E27FC236}">
-                <a16:creationId xmlns:a16="http://schemas.microsoft.com/office/drawing/2014/main" id="{B36A6C59-D156-4682-A2F2-74B1A47D1D23}"/>
+                <a16:creationId xmlns:a16="http://schemas.microsoft.com/office/drawing/2014/main" id="{8531E89A-74E3-483A-8723-B1AEF282E002}"/>
               </a:ext>
             </a:extLst>
           </p:cNvPr>
@@ -13219,8 +13327,8 @@
         </p:blipFill>
         <p:spPr>
           <a:xfrm>
-            <a:off x="1824037" y="4690087"/>
-            <a:ext cx="8543925" cy="1438275"/>
+            <a:off x="533400" y="5028454"/>
+            <a:ext cx="11125200" cy="1362075"/>
           </a:xfrm>
           <a:prstGeom prst="rect">
             <a:avLst/>
@@ -13230,7 +13338,7 @@
     </p:spTree>
     <p:extLst>
       <p:ext uri="{BB962C8B-B14F-4D97-AF65-F5344CB8AC3E}">
-        <p14:creationId xmlns:p14="http://schemas.microsoft.com/office/powerpoint/2010/main" val="145938641"/>
+        <p14:creationId xmlns:p14="http://schemas.microsoft.com/office/powerpoint/2010/main" val="3101666288"/>
       </p:ext>
     </p:extLst>
   </p:cSld>
@@ -13459,7 +13567,7 @@
             </a:r>
             <a:r>
               <a:rPr lang="en-US" sz="2400" dirty="0"/>
-              <a:t>} infrastructure</a:t>
+              <a:t>} setup</a:t>
             </a:r>
           </a:p>
           <a:p>
@@ -13598,7 +13706,7 @@
             </a:r>
             <a:r>
               <a:rPr lang="en-US" dirty="0"/>
-              <a:t>} infrastructure</a:t>
+              <a:t>} Packets</a:t>
             </a:r>
           </a:p>
         </p:txBody>
@@ -13631,117 +13739,59 @@
           </a:bodyPr>
           <a:lstStyle/>
           <a:p>
+            <a:r>
+              <a:rPr lang="en-US" sz="2800" dirty="0" err="1"/>
+              <a:t>vt_create_packet</a:t>
+            </a:r>
+            <a:r>
+              <a:rPr lang="en-US" sz="2800" dirty="0"/>
+              <a:t>()</a:t>
+            </a:r>
+          </a:p>
+          <a:p>
             <a:pPr lvl="1"/>
             <a:r>
-              <a:rPr lang="en-US" sz="3000" dirty="0" err="1"/>
-              <a:t>vt_create_packet</a:t>
-            </a:r>
-            <a:r>
-              <a:rPr lang="en-US" sz="3000" dirty="0"/>
-              <a:t>()</a:t>
+              <a:rPr lang="en-US" sz="2400" dirty="0"/>
+              <a:t>Location</a:t>
             </a:r>
           </a:p>
           <a:p>
             <a:pPr lvl="1"/>
-            <a:endParaRPr lang="en-US" sz="2900" dirty="0"/>
+            <a:r>
+              <a:rPr lang="en-US" sz="2400" dirty="0"/>
+              <a:t>Target of validation</a:t>
+            </a:r>
           </a:p>
           <a:p>
             <a:pPr lvl="1"/>
-            <a:r>
-              <a:rPr lang="en-US" sz="3000" dirty="0"/>
-              <a:t>Validation folder</a:t>
-            </a:r>
-          </a:p>
-          <a:p>
-            <a:pPr lvl="2"/>
-            <a:r>
-              <a:rPr lang="en-US" sz="2900" dirty="0"/>
-              <a:t>Validation Elements</a:t>
-            </a:r>
-          </a:p>
-          <a:p>
-            <a:pPr lvl="2"/>
-            <a:r>
-              <a:rPr lang="en-US" sz="2900" dirty="0" err="1"/>
-              <a:t>validation.yml</a:t>
-            </a:r>
-            <a:endParaRPr lang="en-US" sz="2900" dirty="0"/>
-          </a:p>
-          <a:p>
-            <a:pPr lvl="2"/>
-            <a:endParaRPr lang="en-US" sz="2900" dirty="0"/>
+            <a:endParaRPr lang="en-US" sz="2800" dirty="0"/>
           </a:p>
           <a:p>
             <a:pPr lvl="1"/>
-            <a:r>
-              <a:rPr lang="en-US" sz="3000" dirty="0" err="1"/>
-              <a:t>Rmarkdown</a:t>
-            </a:r>
-            <a:r>
-              <a:rPr lang="en-US" sz="3000" dirty="0"/>
-              <a:t> Report can be created within folder</a:t>
-            </a:r>
+            <a:endParaRPr lang="en-US" sz="2800" dirty="0"/>
           </a:p>
           <a:p>
             <a:pPr lvl="1"/>
-            <a:endParaRPr lang="en-US" sz="3000" dirty="0"/>
-          </a:p>
-          <a:p>
-            <a:pPr lvl="1"/>
-            <a:endParaRPr lang="en-US" sz="3000" dirty="0"/>
-          </a:p>
-          <a:p>
-            <a:pPr lvl="1"/>
-            <a:endParaRPr lang="en-US" sz="2400" dirty="0"/>
-          </a:p>
-          <a:p>
-            <a:pPr lvl="2"/>
-            <a:endParaRPr lang="en-US" sz="2400" dirty="0"/>
-          </a:p>
-          <a:p>
-            <a:pPr lvl="1"/>
-            <a:endParaRPr lang="en-US" sz="2400" dirty="0"/>
+            <a:endParaRPr lang="en-US" sz="2000" dirty="0"/>
           </a:p>
           <a:p>
             <a:pPr lvl="2"/>
             <a:endParaRPr lang="en-US" sz="2000" dirty="0"/>
           </a:p>
           <a:p>
+            <a:pPr lvl="1"/>
+            <a:endParaRPr lang="en-US" sz="2000" dirty="0"/>
+          </a:p>
+          <a:p>
+            <a:pPr lvl="2"/>
+            <a:endParaRPr lang="en-US" sz="1800" dirty="0"/>
+          </a:p>
+          <a:p>
             <a:pPr lvl="3"/>
-            <a:endParaRPr lang="en-US" sz="2900" dirty="0"/>
+            <a:endParaRPr lang="en-US" sz="2800" dirty="0"/>
           </a:p>
         </p:txBody>
       </p:sp>
-      <p:pic>
-        <p:nvPicPr>
-          <p:cNvPr id="6" name="Picture 5" descr="Screenshot of folder structure expected by valtools for validation elements">
-            <a:extLst>
-              <a:ext uri="{FF2B5EF4-FFF2-40B4-BE49-F238E27FC236}">
-                <a16:creationId xmlns:a16="http://schemas.microsoft.com/office/drawing/2014/main" id="{E63E870D-0347-4322-B695-F267DBD63E13}"/>
-              </a:ext>
-            </a:extLst>
-          </p:cNvPr>
-          <p:cNvPicPr>
-            <a:picLocks noChangeAspect="1"/>
-          </p:cNvPicPr>
-          <p:nvPr/>
-        </p:nvPicPr>
-        <p:blipFill>
-          <a:blip r:embed="rId3"/>
-          <a:stretch>
-            <a:fillRect/>
-          </a:stretch>
-        </p:blipFill>
-        <p:spPr>
-          <a:xfrm>
-            <a:off x="6831981" y="1919124"/>
-            <a:ext cx="4374995" cy="3602500"/>
-          </a:xfrm>
-          <a:prstGeom prst="rect">
-            <a:avLst/>
-          </a:prstGeom>
-        </p:spPr>
-      </p:pic>
     </p:spTree>
     <p:extLst>
       <p:ext uri="{BB962C8B-B14F-4D97-AF65-F5344CB8AC3E}">
@@ -13803,6 +13853,102 @@
             </a:r>
             <a:r>
               <a:rPr lang="en-US" dirty="0"/>
+              <a:t>} Packets</a:t>
+            </a:r>
+          </a:p>
+        </p:txBody>
+      </p:sp>
+      <p:pic>
+        <p:nvPicPr>
+          <p:cNvPr id="4" name="Picture 3" descr="Text&#10;&#10;Description automatically generated">
+            <a:extLst>
+              <a:ext uri="{FF2B5EF4-FFF2-40B4-BE49-F238E27FC236}">
+                <a16:creationId xmlns:a16="http://schemas.microsoft.com/office/drawing/2014/main" id="{B749766E-B760-4F5E-97FC-343B675C4051}"/>
+              </a:ext>
+            </a:extLst>
+          </p:cNvPr>
+          <p:cNvPicPr>
+            <a:picLocks noChangeAspect="1"/>
+          </p:cNvPicPr>
+          <p:nvPr/>
+        </p:nvPicPr>
+        <p:blipFill>
+          <a:blip r:embed="rId3"/>
+          <a:stretch>
+            <a:fillRect/>
+          </a:stretch>
+        </p:blipFill>
+        <p:spPr>
+          <a:xfrm>
+            <a:off x="394965" y="2014194"/>
+            <a:ext cx="11402069" cy="3925940"/>
+          </a:xfrm>
+          <a:prstGeom prst="rect">
+            <a:avLst/>
+          </a:prstGeom>
+        </p:spPr>
+      </p:pic>
+    </p:spTree>
+    <p:extLst>
+      <p:ext uri="{BB962C8B-B14F-4D97-AF65-F5344CB8AC3E}">
+        <p14:creationId xmlns:p14="http://schemas.microsoft.com/office/powerpoint/2010/main" val="2809763239"/>
+      </p:ext>
+    </p:extLst>
+  </p:cSld>
+  <p:clrMapOvr>
+    <a:masterClrMapping/>
+  </p:clrMapOvr>
+</p:sld>
+</file>
+
+<file path=ppt/slides/slide6.xml><?xml version="1.0" encoding="utf-8"?>
+<p:sld xmlns:a="http://schemas.openxmlformats.org/drawingml/2006/main" xmlns:r="http://schemas.openxmlformats.org/officeDocument/2006/relationships" xmlns:p="http://schemas.openxmlformats.org/presentationml/2006/main">
+  <p:cSld>
+    <p:spTree>
+      <p:nvGrpSpPr>
+        <p:cNvPr id="1" name=""/>
+        <p:cNvGrpSpPr/>
+        <p:nvPr/>
+      </p:nvGrpSpPr>
+      <p:grpSpPr>
+        <a:xfrm>
+          <a:off x="0" y="0"/>
+          <a:ext cx="0" cy="0"/>
+          <a:chOff x="0" y="0"/>
+          <a:chExt cx="0" cy="0"/>
+        </a:xfrm>
+      </p:grpSpPr>
+      <p:sp>
+        <p:nvSpPr>
+          <p:cNvPr id="2" name="Title 1">
+            <a:extLst>
+              <a:ext uri="{FF2B5EF4-FFF2-40B4-BE49-F238E27FC236}">
+                <a16:creationId xmlns:a16="http://schemas.microsoft.com/office/drawing/2014/main" id="{749E0D1B-C9EF-4CB6-9922-ED9D4AC52C59}"/>
+              </a:ext>
+            </a:extLst>
+          </p:cNvPr>
+          <p:cNvSpPr>
+            <a:spLocks noGrp="1"/>
+          </p:cNvSpPr>
+          <p:nvPr>
+            <p:ph type="title"/>
+          </p:nvPr>
+        </p:nvSpPr>
+        <p:spPr/>
+        <p:txBody>
+          <a:bodyPr/>
+          <a:lstStyle/>
+          <a:p>
+            <a:r>
+              <a:rPr lang="en-US" dirty="0"/>
+              <a:t>{</a:t>
+            </a:r>
+            <a:r>
+              <a:rPr lang="en-US" dirty="0" err="1"/>
+              <a:t>valtools</a:t>
+            </a:r>
+            <a:r>
+              <a:rPr lang="en-US" dirty="0"/>
               <a:t>} infrastructure</a:t>
             </a:r>
           </a:p>
@@ -13836,84 +13982,68 @@
           </a:bodyPr>
           <a:lstStyle/>
           <a:p>
+            <a:r>
+              <a:rPr lang="en-US" sz="2800" dirty="0"/>
+              <a:t>Validation folder</a:t>
+            </a:r>
+          </a:p>
+          <a:p>
             <a:pPr lvl="1"/>
             <a:r>
-              <a:rPr lang="en-US" sz="3000" dirty="0" err="1"/>
-              <a:t>vt_create_packet</a:t>
-            </a:r>
-            <a:r>
-              <a:rPr lang="en-US" sz="3000" dirty="0"/>
-              <a:t>()</a:t>
+              <a:rPr lang="en-US" sz="2400" dirty="0"/>
+              <a:t>Validation Elements</a:t>
             </a:r>
           </a:p>
           <a:p>
             <a:pPr lvl="1"/>
-            <a:endParaRPr lang="en-US" sz="2900" dirty="0"/>
+            <a:r>
+              <a:rPr lang="en-US" sz="2400" dirty="0" err="1"/>
+              <a:t>validation.yml</a:t>
+            </a:r>
+            <a:endParaRPr lang="en-US" sz="2400" dirty="0"/>
           </a:p>
           <a:p>
             <a:pPr lvl="1"/>
-            <a:r>
-              <a:rPr lang="en-US" sz="3000" dirty="0"/>
-              <a:t>Validation folder</a:t>
-            </a:r>
-          </a:p>
-          <a:p>
-            <a:pPr lvl="2"/>
-            <a:r>
-              <a:rPr lang="en-US" sz="2900" dirty="0"/>
-              <a:t>Validation Elements</a:t>
-            </a:r>
-          </a:p>
-          <a:p>
-            <a:pPr lvl="2"/>
-            <a:r>
-              <a:rPr lang="en-US" sz="2900" dirty="0" err="1"/>
-              <a:t>validation.yml</a:t>
-            </a:r>
-            <a:endParaRPr lang="en-US" sz="2900" dirty="0"/>
-          </a:p>
-          <a:p>
-            <a:pPr lvl="2"/>
-            <a:endParaRPr lang="en-US" sz="2900" dirty="0"/>
+            <a:endParaRPr lang="en-US" sz="2800" dirty="0"/>
+          </a:p>
+          <a:p>
+            <a:r>
+              <a:rPr lang="en-US" sz="2800" dirty="0"/>
+              <a:t>R Markdown Report located at the root directory</a:t>
+            </a:r>
           </a:p>
           <a:p>
             <a:pPr lvl="1"/>
             <a:r>
-              <a:rPr lang="en-US" sz="3000" dirty="0" err="1"/>
-              <a:t>Rmarkdown</a:t>
-            </a:r>
-            <a:r>
-              <a:rPr lang="en-US" sz="3000" dirty="0"/>
-              <a:t> Report can be created within folder</a:t>
-            </a:r>
+              <a:rPr lang="en-US" sz="2600" dirty="0"/>
+              <a:t>Not created by default</a:t>
+            </a:r>
+          </a:p>
+          <a:p>
+            <a:pPr marL="274320" lvl="1" indent="0">
+              <a:buNone/>
+            </a:pPr>
+            <a:endParaRPr lang="en-US" sz="2800" dirty="0"/>
           </a:p>
           <a:p>
             <a:pPr lvl="1"/>
-            <a:endParaRPr lang="en-US" sz="3000" dirty="0"/>
-          </a:p>
-          <a:p>
-            <a:pPr lvl="1"/>
-            <a:endParaRPr lang="en-US" sz="3000" dirty="0"/>
-          </a:p>
-          <a:p>
-            <a:pPr lvl="1"/>
-            <a:endParaRPr lang="en-US" sz="2400" dirty="0"/>
-          </a:p>
-          <a:p>
-            <a:pPr lvl="2"/>
-            <a:endParaRPr lang="en-US" sz="2400" dirty="0"/>
-          </a:p>
-          <a:p>
-            <a:pPr lvl="1"/>
-            <a:endParaRPr lang="en-US" sz="2400" dirty="0"/>
+            <a:endParaRPr lang="en-US" sz="2000" dirty="0"/>
           </a:p>
           <a:p>
             <a:pPr lvl="2"/>
             <a:endParaRPr lang="en-US" sz="2000" dirty="0"/>
           </a:p>
           <a:p>
+            <a:pPr lvl="1"/>
+            <a:endParaRPr lang="en-US" sz="2000" dirty="0"/>
+          </a:p>
+          <a:p>
+            <a:pPr lvl="2"/>
+            <a:endParaRPr lang="en-US" sz="1800" dirty="0"/>
+          </a:p>
+          <a:p>
             <a:pPr lvl="3"/>
-            <a:endParaRPr lang="en-US" sz="2900" dirty="0"/>
+            <a:endParaRPr lang="en-US" sz="2800" dirty="0"/>
           </a:p>
         </p:txBody>
       </p:sp>
@@ -13960,7 +14090,7 @@
 </p:sld>
 </file>
 
-<file path=ppt/slides/slide6.xml><?xml version="1.0" encoding="utf-8"?>
+<file path=ppt/slides/slide7.xml><?xml version="1.0" encoding="utf-8"?>
 <p:sld xmlns:a="http://schemas.openxmlformats.org/drawingml/2006/main" xmlns:r="http://schemas.openxmlformats.org/officeDocument/2006/relationships" xmlns:p="http://schemas.openxmlformats.org/presentationml/2006/main">
   <p:cSld>
     <p:spTree>
@@ -14016,98 +14146,6 @@
     <p:extLst>
       <p:ext uri="{BB962C8B-B14F-4D97-AF65-F5344CB8AC3E}">
         <p14:creationId xmlns:p14="http://schemas.microsoft.com/office/powerpoint/2010/main" val="2261856039"/>
-      </p:ext>
-    </p:extLst>
-  </p:cSld>
-  <p:clrMapOvr>
-    <a:masterClrMapping/>
-  </p:clrMapOvr>
-</p:sld>
-</file>
-
-<file path=ppt/slides/slide7.xml><?xml version="1.0" encoding="utf-8"?>
-<p:sld xmlns:a="http://schemas.openxmlformats.org/drawingml/2006/main" xmlns:r="http://schemas.openxmlformats.org/officeDocument/2006/relationships" xmlns:p="http://schemas.openxmlformats.org/presentationml/2006/main">
-  <p:cSld>
-    <p:spTree>
-      <p:nvGrpSpPr>
-        <p:cNvPr id="1" name=""/>
-        <p:cNvGrpSpPr/>
-        <p:nvPr/>
-      </p:nvGrpSpPr>
-      <p:grpSpPr>
-        <a:xfrm>
-          <a:off x="0" y="0"/>
-          <a:ext cx="0" cy="0"/>
-          <a:chOff x="0" y="0"/>
-          <a:chExt cx="0" cy="0"/>
-        </a:xfrm>
-      </p:grpSpPr>
-      <p:sp>
-        <p:nvSpPr>
-          <p:cNvPr id="2" name="Title 1">
-            <a:extLst>
-              <a:ext uri="{FF2B5EF4-FFF2-40B4-BE49-F238E27FC236}">
-                <a16:creationId xmlns:a16="http://schemas.microsoft.com/office/drawing/2014/main" id="{749E0D1B-C9EF-4CB6-9922-ED9D4AC52C59}"/>
-              </a:ext>
-            </a:extLst>
-          </p:cNvPr>
-          <p:cNvSpPr>
-            <a:spLocks noGrp="1"/>
-          </p:cNvSpPr>
-          <p:nvPr>
-            <p:ph type="title"/>
-          </p:nvPr>
-        </p:nvSpPr>
-        <p:spPr/>
-        <p:txBody>
-          <a:bodyPr/>
-          <a:lstStyle/>
-          <a:p>
-            <a:r>
-              <a:rPr lang="en-US" dirty="0"/>
-              <a:t>Validation Components</a:t>
-            </a:r>
-          </a:p>
-        </p:txBody>
-      </p:sp>
-      <p:sp>
-        <p:nvSpPr>
-          <p:cNvPr id="5" name="Content Placeholder 4">
-            <a:extLst>
-              <a:ext uri="{FF2B5EF4-FFF2-40B4-BE49-F238E27FC236}">
-                <a16:creationId xmlns:a16="http://schemas.microsoft.com/office/drawing/2014/main" id="{7E558183-391D-4056-BC02-A181C5440B05}"/>
-              </a:ext>
-            </a:extLst>
-          </p:cNvPr>
-          <p:cNvSpPr>
-            <a:spLocks noGrp="1"/>
-          </p:cNvSpPr>
-          <p:nvPr>
-            <p:ph idx="1"/>
-          </p:nvPr>
-        </p:nvSpPr>
-        <p:spPr/>
-        <p:txBody>
-          <a:bodyPr>
-            <a:normAutofit/>
-          </a:bodyPr>
-          <a:lstStyle/>
-          <a:p>
-            <a:pPr marL="274320" lvl="1" indent="0">
-              <a:buNone/>
-            </a:pPr>
-            <a:r>
-              <a:rPr lang="en-US" sz="3200" dirty="0"/>
-              <a:t>“confirmation by examination and provision of objective evidence that software specifications conform to user needs and intended uses, and that the particular requirements implemented through software can be consistently fulfilled.”</a:t>
-            </a:r>
-            <a:endParaRPr lang="en-US" sz="3000" dirty="0"/>
-          </a:p>
-        </p:txBody>
-      </p:sp>
-    </p:spTree>
-    <p:extLst>
-      <p:ext uri="{BB962C8B-B14F-4D97-AF65-F5344CB8AC3E}">
-        <p14:creationId xmlns:p14="http://schemas.microsoft.com/office/powerpoint/2010/main" val="3552858584"/>
       </p:ext>
     </p:extLst>
   </p:cSld>
@@ -14152,21 +14190,12 @@
         </p:nvSpPr>
         <p:spPr/>
         <p:txBody>
-          <a:bodyPr>
-            <a:normAutofit/>
-          </a:bodyPr>
+          <a:bodyPr/>
           <a:lstStyle/>
           <a:p>
             <a:r>
               <a:rPr lang="en-US" dirty="0"/>
-              <a:t>Validation Components – </a:t>
-            </a:r>
-            <a:br>
-              <a:rPr lang="en-US" dirty="0"/>
-            </a:br>
-            <a:r>
-              <a:rPr lang="en-US" sz="3200" dirty="0"/>
-              <a:t>what needs to be authored?</a:t>
+              <a:t>Validation Components</a:t>
             </a:r>
           </a:p>
         </p:txBody>
@@ -14194,32 +14223,21 @@
           </a:bodyPr>
           <a:lstStyle/>
           <a:p>
-            <a:pPr lvl="1"/>
-            <a:r>
-              <a:rPr lang="en-US" sz="3000" dirty="0"/>
-              <a:t>Requirements</a:t>
-            </a:r>
-          </a:p>
-          <a:p>
-            <a:pPr lvl="1"/>
-            <a:r>
-              <a:rPr lang="en-US" sz="3000" dirty="0"/>
-              <a:t>Test Cases</a:t>
-            </a:r>
-          </a:p>
-          <a:p>
-            <a:pPr lvl="1"/>
-            <a:r>
-              <a:rPr lang="en-US" sz="3000" dirty="0"/>
-              <a:t>Test Code</a:t>
-            </a:r>
+            <a:pPr marL="274320" lvl="1" indent="0">
+              <a:buNone/>
+            </a:pPr>
+            <a:r>
+              <a:rPr lang="en-US" sz="3200" dirty="0"/>
+              <a:t>“confirmation by examination and provision of objective evidence that software specifications conform to user needs and intended uses, and that the particular requirements implemented through software can be consistently fulfilled.”</a:t>
+            </a:r>
+            <a:endParaRPr lang="en-US" sz="3000" dirty="0"/>
           </a:p>
         </p:txBody>
       </p:sp>
     </p:spTree>
     <p:extLst>
       <p:ext uri="{BB962C8B-B14F-4D97-AF65-F5344CB8AC3E}">
-        <p14:creationId xmlns:p14="http://schemas.microsoft.com/office/powerpoint/2010/main" val="2952442741"/>
+        <p14:creationId xmlns:p14="http://schemas.microsoft.com/office/powerpoint/2010/main" val="3552858584"/>
       </p:ext>
     </p:extLst>
   </p:cSld>
@@ -14246,32 +14264,92 @@
           <a:chExt cx="0" cy="0"/>
         </a:xfrm>
       </p:grpSpPr>
-      <p:graphicFrame>
-        <p:nvGraphicFramePr>
-          <p:cNvPr id="4" name="Diagram 3">
+      <p:sp>
+        <p:nvSpPr>
+          <p:cNvPr id="2" name="Title 1">
             <a:extLst>
               <a:ext uri="{FF2B5EF4-FFF2-40B4-BE49-F238E27FC236}">
-                <a16:creationId xmlns:a16="http://schemas.microsoft.com/office/drawing/2014/main" id="{B053C177-3BA4-4E3A-B3A3-ED48137FC413}"/>
+                <a16:creationId xmlns:a16="http://schemas.microsoft.com/office/drawing/2014/main" id="{749E0D1B-C9EF-4CB6-9922-ED9D4AC52C59}"/>
               </a:ext>
             </a:extLst>
           </p:cNvPr>
-          <p:cNvGraphicFramePr/>
-          <p:nvPr/>
-        </p:nvGraphicFramePr>
-        <p:xfrm>
-          <a:off x="341290" y="1461752"/>
-          <a:ext cx="11509419" cy="3934496"/>
-        </p:xfrm>
-        <a:graphic>
-          <a:graphicData uri="http://schemas.openxmlformats.org/drawingml/2006/diagram">
-            <dgm:relIds xmlns:dgm="http://schemas.openxmlformats.org/drawingml/2006/diagram" xmlns:r="http://schemas.openxmlformats.org/officeDocument/2006/relationships" r:dm="rId3" r:lo="rId4" r:qs="rId5" r:cs="rId6"/>
-          </a:graphicData>
-        </a:graphic>
-      </p:graphicFrame>
+          <p:cNvSpPr>
+            <a:spLocks noGrp="1"/>
+          </p:cNvSpPr>
+          <p:nvPr>
+            <p:ph type="title"/>
+          </p:nvPr>
+        </p:nvSpPr>
+        <p:spPr/>
+        <p:txBody>
+          <a:bodyPr>
+            <a:normAutofit/>
+          </a:bodyPr>
+          <a:lstStyle/>
+          <a:p>
+            <a:r>
+              <a:rPr lang="en-US" dirty="0"/>
+              <a:t>Validation Components – </a:t>
+            </a:r>
+            <a:br>
+              <a:rPr lang="en-US" dirty="0"/>
+            </a:br>
+            <a:r>
+              <a:rPr lang="en-US" sz="3200" dirty="0"/>
+              <a:t>what needs to be authored?</a:t>
+            </a:r>
+          </a:p>
+        </p:txBody>
+      </p:sp>
+      <p:sp>
+        <p:nvSpPr>
+          <p:cNvPr id="5" name="Content Placeholder 4">
+            <a:extLst>
+              <a:ext uri="{FF2B5EF4-FFF2-40B4-BE49-F238E27FC236}">
+                <a16:creationId xmlns:a16="http://schemas.microsoft.com/office/drawing/2014/main" id="{7E558183-391D-4056-BC02-A181C5440B05}"/>
+              </a:ext>
+            </a:extLst>
+          </p:cNvPr>
+          <p:cNvSpPr>
+            <a:spLocks noGrp="1"/>
+          </p:cNvSpPr>
+          <p:nvPr>
+            <p:ph idx="1"/>
+          </p:nvPr>
+        </p:nvSpPr>
+        <p:spPr/>
+        <p:txBody>
+          <a:bodyPr>
+            <a:normAutofit/>
+          </a:bodyPr>
+          <a:lstStyle/>
+          <a:p>
+            <a:pPr lvl="1"/>
+            <a:r>
+              <a:rPr lang="en-US" sz="3000" dirty="0"/>
+              <a:t>Requirements</a:t>
+            </a:r>
+          </a:p>
+          <a:p>
+            <a:pPr lvl="1"/>
+            <a:r>
+              <a:rPr lang="en-US" sz="3000" dirty="0"/>
+              <a:t>Test Cases</a:t>
+            </a:r>
+          </a:p>
+          <a:p>
+            <a:pPr lvl="1"/>
+            <a:r>
+              <a:rPr lang="en-US" sz="3000" dirty="0"/>
+              <a:t>Test Code</a:t>
+            </a:r>
+          </a:p>
+        </p:txBody>
+      </p:sp>
     </p:spTree>
     <p:extLst>
       <p:ext uri="{BB962C8B-B14F-4D97-AF65-F5344CB8AC3E}">
-        <p14:creationId xmlns:p14="http://schemas.microsoft.com/office/powerpoint/2010/main" val="816482551"/>
+        <p14:creationId xmlns:p14="http://schemas.microsoft.com/office/powerpoint/2010/main" val="2952442741"/>
       </p:ext>
     </p:extLst>
   </p:cSld>
@@ -14853,12 +14931,12 @@
 </file>
 
 <file path=customXml/item1.xml><?xml version="1.0" encoding="utf-8"?>
-<?mso-contentType ?>
-<FormTemplates xmlns="http://schemas.microsoft.com/sharepoint/v3/contenttype/forms">
-  <Display>DocumentLibraryForm</Display>
-  <Edit>DocumentLibraryForm</Edit>
-  <New>DocumentLibraryForm</New>
-</FormTemplates>
+<p:properties xmlns:p="http://schemas.microsoft.com/office/2006/metadata/properties" xmlns:xsi="http://www.w3.org/2001/XMLSchema-instance" xmlns:pc="http://schemas.microsoft.com/office/infopath/2007/PartnerControls">
+  <documentManagement>
+    <Status xmlns="71af3243-3dd4-4a8d-8c0d-dd76da1f02a5">Not started</Status>
+    <MediaServiceKeyPoints xmlns="71af3243-3dd4-4a8d-8c0d-dd76da1f02a5" xsi:nil="true"/>
+  </documentManagement>
+</p:properties>
 </file>
 
 <file path=customXml/item2.xml><?xml version="1.0" encoding="utf-8"?>
@@ -15083,18 +15161,27 @@
 </file>
 
 <file path=customXml/item3.xml><?xml version="1.0" encoding="utf-8"?>
-<p:properties xmlns:p="http://schemas.microsoft.com/office/2006/metadata/properties" xmlns:xsi="http://www.w3.org/2001/XMLSchema-instance" xmlns:pc="http://schemas.microsoft.com/office/infopath/2007/PartnerControls">
-  <documentManagement>
-    <Status xmlns="71af3243-3dd4-4a8d-8c0d-dd76da1f02a5">Not started</Status>
-    <MediaServiceKeyPoints xmlns="71af3243-3dd4-4a8d-8c0d-dd76da1f02a5" xsi:nil="true"/>
-  </documentManagement>
-</p:properties>
+<?mso-contentType ?>
+<FormTemplates xmlns="http://schemas.microsoft.com/sharepoint/v3/contenttype/forms">
+  <Display>DocumentLibraryForm</Display>
+  <Edit>DocumentLibraryForm</Edit>
+  <New>DocumentLibraryForm</New>
+</FormTemplates>
 </file>
 
 <file path=customXml/itemProps1.xml><?xml version="1.0" encoding="utf-8"?>
-<ds:datastoreItem xmlns:ds="http://schemas.openxmlformats.org/officeDocument/2006/customXml" ds:itemID="{CDB58277-F8DF-46FF-84EC-EF41B835E69F}">
+<ds:datastoreItem xmlns:ds="http://schemas.openxmlformats.org/officeDocument/2006/customXml" ds:itemID="{137651BA-F45C-4845-9AB3-E0A65B39F5E1}">
   <ds:schemaRefs>
-    <ds:schemaRef ds:uri="http://schemas.microsoft.com/sharepoint/v3/contenttype/forms"/>
+    <ds:schemaRef ds:uri="http://schemas.microsoft.com/office/2006/documentManagement/types"/>
+    <ds:schemaRef ds:uri="http://schemas.openxmlformats.org/package/2006/metadata/core-properties"/>
+    <ds:schemaRef ds:uri="16c05727-aa75-4e4a-9b5f-8a80a1165891"/>
+    <ds:schemaRef ds:uri="http://purl.org/dc/elements/1.1/"/>
+    <ds:schemaRef ds:uri="http://schemas.microsoft.com/office/2006/metadata/properties"/>
+    <ds:schemaRef ds:uri="71af3243-3dd4-4a8d-8c0d-dd76da1f02a5"/>
+    <ds:schemaRef ds:uri="http://purl.org/dc/terms/"/>
+    <ds:schemaRef ds:uri="http://schemas.microsoft.com/office/infopath/2007/PartnerControls"/>
+    <ds:schemaRef ds:uri="http://www.w3.org/XML/1998/namespace"/>
+    <ds:schemaRef ds:uri="http://purl.org/dc/dcmitype/"/>
   </ds:schemaRefs>
 </ds:datastoreItem>
 </file>
@@ -15119,18 +15206,9 @@
 </file>
 
 <file path=customXml/itemProps3.xml><?xml version="1.0" encoding="utf-8"?>
-<ds:datastoreItem xmlns:ds="http://schemas.openxmlformats.org/officeDocument/2006/customXml" ds:itemID="{137651BA-F45C-4845-9AB3-E0A65B39F5E1}">
+<ds:datastoreItem xmlns:ds="http://schemas.openxmlformats.org/officeDocument/2006/customXml" ds:itemID="{CDB58277-F8DF-46FF-84EC-EF41B835E69F}">
   <ds:schemaRefs>
-    <ds:schemaRef ds:uri="http://schemas.microsoft.com/office/infopath/2007/PartnerControls"/>
-    <ds:schemaRef ds:uri="http://purl.org/dc/elements/1.1/"/>
-    <ds:schemaRef ds:uri="http://schemas.microsoft.com/office/2006/metadata/properties"/>
-    <ds:schemaRef ds:uri="http://purl.org/dc/terms/"/>
-    <ds:schemaRef ds:uri="http://schemas.openxmlformats.org/package/2006/metadata/core-properties"/>
-    <ds:schemaRef ds:uri="http://schemas.microsoft.com/office/2006/documentManagement/types"/>
-    <ds:schemaRef ds:uri="http://purl.org/dc/dcmitype/"/>
-    <ds:schemaRef ds:uri="16c05727-aa75-4e4a-9b5f-8a80a1165891"/>
-    <ds:schemaRef ds:uri="71af3243-3dd4-4a8d-8c0d-dd76da1f02a5"/>
-    <ds:schemaRef ds:uri="http://www.w3.org/XML/1998/namespace"/>
+    <ds:schemaRef ds:uri="http://schemas.microsoft.com/sharepoint/v3/contenttype/forms"/>
   </ds:schemaRefs>
 </ds:datastoreItem>
 </file>
</xml_diff>